<commit_message>
Maj journal d'activité + diagramme de classe
</commit_message>
<xml_diff>
--- a/Guillaume/Documents/Diapo Revues/Revue 2 de projet étudiant 1 Escape Game Téléthon.pptx
+++ b/Guillaume/Documents/Diapo Revues/Revue 2 de projet étudiant 1 Escape Game Téléthon.pptx
@@ -10949,6 +10949,580 @@
           </a:p>
         </p:txBody>
       </p:sp>
+      <p:sp>
+        <p:nvSpPr>
+          <p:cNvPr id="5" name="Rectangle 4">
+            <a:extLst>
+              <a:ext uri="{FF2B5EF4-FFF2-40B4-BE49-F238E27FC236}">
+                <a16:creationId xmlns:a16="http://schemas.microsoft.com/office/drawing/2014/main" id="{E8071899-BAB1-4FE1-A456-5AC697088E0D}"/>
+              </a:ext>
+            </a:extLst>
+          </p:cNvPr>
+          <p:cNvSpPr/>
+          <p:nvPr/>
+        </p:nvSpPr>
+        <p:spPr>
+          <a:xfrm>
+            <a:off x="367308" y="1122121"/>
+            <a:ext cx="1850002" cy="752399"/>
+          </a:xfrm>
+          <a:prstGeom prst="rect">
+            <a:avLst/>
+          </a:prstGeom>
+          <a:noFill/>
+          <a:ln w="28575">
+            <a:solidFill>
+              <a:srgbClr val="A51258"/>
+            </a:solidFill>
+          </a:ln>
+          <a:effectLst>
+            <a:glow rad="50800">
+              <a:schemeClr val="tx1"/>
+            </a:glow>
+          </a:effectLst>
+        </p:spPr>
+        <p:style>
+          <a:lnRef idx="2">
+            <a:schemeClr val="accent1">
+              <a:shade val="50000"/>
+            </a:schemeClr>
+          </a:lnRef>
+          <a:fillRef idx="1">
+            <a:schemeClr val="accent1"/>
+          </a:fillRef>
+          <a:effectRef idx="0">
+            <a:schemeClr val="accent1"/>
+          </a:effectRef>
+          <a:fontRef idx="minor">
+            <a:schemeClr val="lt1"/>
+          </a:fontRef>
+        </p:style>
+        <p:txBody>
+          <a:bodyPr rtlCol="0" anchor="ctr"/>
+          <a:lstStyle/>
+          <a:p>
+            <a:pPr algn="ctr"/>
+            <a:r>
+              <a:rPr lang="fr-FR" sz="1200" dirty="0">
+                <a:solidFill>
+                  <a:srgbClr val="A51258"/>
+                </a:solidFill>
+              </a:rPr>
+              <a:t>pi-rc522</a:t>
+            </a:r>
+            <a:r>
+              <a:rPr lang="fr-FR" sz="1200" dirty="0">
+                <a:solidFill>
+                  <a:schemeClr val="tx1"/>
+                </a:solidFill>
+              </a:rPr>
+              <a:t> est une librairie sous </a:t>
+            </a:r>
+            <a:r>
+              <a:rPr lang="fr-FR" sz="1200" dirty="0">
+                <a:solidFill>
+                  <a:srgbClr val="A51258"/>
+                </a:solidFill>
+              </a:rPr>
+              <a:t>licence MIT</a:t>
+            </a:r>
+          </a:p>
+        </p:txBody>
+      </p:sp>
+      <p:pic>
+        <p:nvPicPr>
+          <p:cNvPr id="6" name="Image 5" descr="Une image contenant dessin, signe&#10;&#10;Description générée automatiquement">
+            <a:extLst>
+              <a:ext uri="{FF2B5EF4-FFF2-40B4-BE49-F238E27FC236}">
+                <a16:creationId xmlns:a16="http://schemas.microsoft.com/office/drawing/2014/main" id="{1476270C-68DA-4E1A-A34E-FB102FA05834}"/>
+              </a:ext>
+            </a:extLst>
+          </p:cNvPr>
+          <p:cNvPicPr>
+            <a:picLocks noChangeAspect="1"/>
+          </p:cNvPicPr>
+          <p:nvPr/>
+        </p:nvPicPr>
+        <p:blipFill>
+          <a:blip r:embed="rId3"/>
+          <a:stretch>
+            <a:fillRect/>
+          </a:stretch>
+        </p:blipFill>
+        <p:spPr>
+          <a:xfrm>
+            <a:off x="3511551" y="944237"/>
+            <a:ext cx="1486846" cy="1108165"/>
+          </a:xfrm>
+          <a:prstGeom prst="rect">
+            <a:avLst/>
+          </a:prstGeom>
+        </p:spPr>
+      </p:pic>
+      <p:cxnSp>
+        <p:nvCxnSpPr>
+          <p:cNvPr id="8" name="Connecteur droit avec flèche 7">
+            <a:extLst>
+              <a:ext uri="{FF2B5EF4-FFF2-40B4-BE49-F238E27FC236}">
+                <a16:creationId xmlns:a16="http://schemas.microsoft.com/office/drawing/2014/main" id="{8991D987-C960-4F9B-B5A3-ED2CD4D77C48}"/>
+              </a:ext>
+            </a:extLst>
+          </p:cNvPr>
+          <p:cNvCxnSpPr>
+            <a:cxnSpLocks/>
+            <a:stCxn id="5" idx="3"/>
+            <a:endCxn id="6" idx="1"/>
+          </p:cNvCxnSpPr>
+          <p:nvPr/>
+        </p:nvCxnSpPr>
+        <p:spPr>
+          <a:xfrm flipV="1">
+            <a:off x="2217310" y="1498320"/>
+            <a:ext cx="1294241" cy="1"/>
+          </a:xfrm>
+          <a:prstGeom prst="straightConnector1">
+            <a:avLst/>
+          </a:prstGeom>
+          <a:ln w="38100">
+            <a:solidFill>
+              <a:srgbClr val="A51258"/>
+            </a:solidFill>
+            <a:tailEnd type="triangle"/>
+          </a:ln>
+          <a:effectLst>
+            <a:glow rad="50800">
+              <a:schemeClr val="tx1"/>
+            </a:glow>
+          </a:effectLst>
+        </p:spPr>
+        <p:style>
+          <a:lnRef idx="1">
+            <a:schemeClr val="accent1"/>
+          </a:lnRef>
+          <a:fillRef idx="0">
+            <a:schemeClr val="accent1"/>
+          </a:fillRef>
+          <a:effectRef idx="0">
+            <a:schemeClr val="accent1"/>
+          </a:effectRef>
+          <a:fontRef idx="minor">
+            <a:schemeClr val="tx1"/>
+          </a:fontRef>
+        </p:style>
+      </p:cxnSp>
+      <p:pic>
+        <p:nvPicPr>
+          <p:cNvPr id="19" name="Image 18" descr="Une image contenant moniteur, intérieur, écran, noir&#10;&#10;Description générée automatiquement">
+            <a:extLst>
+              <a:ext uri="{FF2B5EF4-FFF2-40B4-BE49-F238E27FC236}">
+                <a16:creationId xmlns:a16="http://schemas.microsoft.com/office/drawing/2014/main" id="{78013C0C-D50E-4F62-A056-A002A217DCDE}"/>
+              </a:ext>
+            </a:extLst>
+          </p:cNvPr>
+          <p:cNvPicPr>
+            <a:picLocks noChangeAspect="1"/>
+          </p:cNvPicPr>
+          <p:nvPr/>
+        </p:nvPicPr>
+        <p:blipFill>
+          <a:blip r:embed="rId4"/>
+          <a:stretch>
+            <a:fillRect/>
+          </a:stretch>
+        </p:blipFill>
+        <p:spPr>
+          <a:xfrm>
+            <a:off x="456141" y="4723757"/>
+            <a:ext cx="4041872" cy="2024244"/>
+          </a:xfrm>
+          <a:prstGeom prst="rect">
+            <a:avLst/>
+          </a:prstGeom>
+          <a:ln w="38100">
+            <a:solidFill>
+              <a:srgbClr val="A51258"/>
+            </a:solidFill>
+          </a:ln>
+        </p:spPr>
+      </p:pic>
+      <p:pic>
+        <p:nvPicPr>
+          <p:cNvPr id="21" name="Image 20">
+            <a:extLst>
+              <a:ext uri="{FF2B5EF4-FFF2-40B4-BE49-F238E27FC236}">
+                <a16:creationId xmlns:a16="http://schemas.microsoft.com/office/drawing/2014/main" id="{900F7095-20DC-455F-BC6B-604E670A9783}"/>
+              </a:ext>
+            </a:extLst>
+          </p:cNvPr>
+          <p:cNvPicPr>
+            <a:picLocks noChangeAspect="1"/>
+          </p:cNvPicPr>
+          <p:nvPr/>
+        </p:nvPicPr>
+        <p:blipFill>
+          <a:blip r:embed="rId5"/>
+          <a:stretch>
+            <a:fillRect/>
+          </a:stretch>
+        </p:blipFill>
+        <p:spPr>
+          <a:xfrm>
+            <a:off x="5269770" y="944237"/>
+            <a:ext cx="4211613" cy="3601135"/>
+          </a:xfrm>
+          <a:prstGeom prst="rect">
+            <a:avLst/>
+          </a:prstGeom>
+          <a:ln w="28575">
+            <a:solidFill>
+              <a:srgbClr val="A51258"/>
+            </a:solidFill>
+          </a:ln>
+          <a:effectLst>
+            <a:glow>
+              <a:schemeClr val="bg1"/>
+            </a:glow>
+          </a:effectLst>
+        </p:spPr>
+      </p:pic>
+      <p:sp>
+        <p:nvSpPr>
+          <p:cNvPr id="26" name="Rectangle 25">
+            <a:extLst>
+              <a:ext uri="{FF2B5EF4-FFF2-40B4-BE49-F238E27FC236}">
+                <a16:creationId xmlns:a16="http://schemas.microsoft.com/office/drawing/2014/main" id="{8FD411F7-8FA0-48E4-817D-10CB94BCD191}"/>
+              </a:ext>
+            </a:extLst>
+          </p:cNvPr>
+          <p:cNvSpPr/>
+          <p:nvPr/>
+        </p:nvSpPr>
+        <p:spPr>
+          <a:xfrm>
+            <a:off x="6450575" y="5359679"/>
+            <a:ext cx="1850002" cy="752399"/>
+          </a:xfrm>
+          <a:prstGeom prst="rect">
+            <a:avLst/>
+          </a:prstGeom>
+          <a:noFill/>
+          <a:ln w="28575">
+            <a:solidFill>
+              <a:srgbClr val="A51258"/>
+            </a:solidFill>
+          </a:ln>
+          <a:effectLst>
+            <a:glow rad="50800">
+              <a:schemeClr val="tx1"/>
+            </a:glow>
+          </a:effectLst>
+        </p:spPr>
+        <p:style>
+          <a:lnRef idx="2">
+            <a:schemeClr val="accent1">
+              <a:shade val="50000"/>
+            </a:schemeClr>
+          </a:lnRef>
+          <a:fillRef idx="1">
+            <a:schemeClr val="accent1"/>
+          </a:fillRef>
+          <a:effectRef idx="0">
+            <a:schemeClr val="accent1"/>
+          </a:effectRef>
+          <a:fontRef idx="minor">
+            <a:schemeClr val="lt1"/>
+          </a:fontRef>
+        </p:style>
+        <p:txBody>
+          <a:bodyPr rtlCol="0" anchor="ctr"/>
+          <a:lstStyle/>
+          <a:p>
+            <a:pPr algn="ctr"/>
+            <a:r>
+              <a:rPr lang="fr-FR" sz="1200" dirty="0">
+                <a:solidFill>
+                  <a:srgbClr val="A51258"/>
+                </a:solidFill>
+              </a:rPr>
+              <a:t>Exemples</a:t>
+            </a:r>
+          </a:p>
+        </p:txBody>
+      </p:sp>
+      <p:cxnSp>
+        <p:nvCxnSpPr>
+          <p:cNvPr id="27" name="Connecteur droit avec flèche 26">
+            <a:extLst>
+              <a:ext uri="{FF2B5EF4-FFF2-40B4-BE49-F238E27FC236}">
+                <a16:creationId xmlns:a16="http://schemas.microsoft.com/office/drawing/2014/main" id="{9EA8D079-5BB8-4541-BAA5-902C067C3205}"/>
+              </a:ext>
+            </a:extLst>
+          </p:cNvPr>
+          <p:cNvCxnSpPr>
+            <a:cxnSpLocks/>
+            <a:stCxn id="26" idx="0"/>
+            <a:endCxn id="21" idx="2"/>
+          </p:cNvCxnSpPr>
+          <p:nvPr/>
+        </p:nvCxnSpPr>
+        <p:spPr>
+          <a:xfrm flipV="1">
+            <a:off x="7375576" y="4545372"/>
+            <a:ext cx="1" cy="814307"/>
+          </a:xfrm>
+          <a:prstGeom prst="straightConnector1">
+            <a:avLst/>
+          </a:prstGeom>
+          <a:ln w="38100">
+            <a:solidFill>
+              <a:srgbClr val="A51258"/>
+            </a:solidFill>
+            <a:tailEnd type="triangle"/>
+          </a:ln>
+          <a:effectLst>
+            <a:glow rad="50800">
+              <a:schemeClr val="tx1"/>
+            </a:glow>
+          </a:effectLst>
+        </p:spPr>
+        <p:style>
+          <a:lnRef idx="1">
+            <a:schemeClr val="accent1"/>
+          </a:lnRef>
+          <a:fillRef idx="0">
+            <a:schemeClr val="accent1"/>
+          </a:fillRef>
+          <a:effectRef idx="0">
+            <a:schemeClr val="accent1"/>
+          </a:effectRef>
+          <a:fontRef idx="minor">
+            <a:schemeClr val="tx1"/>
+          </a:fontRef>
+        </p:style>
+      </p:cxnSp>
+      <p:cxnSp>
+        <p:nvCxnSpPr>
+          <p:cNvPr id="30" name="Connecteur droit avec flèche 29">
+            <a:extLst>
+              <a:ext uri="{FF2B5EF4-FFF2-40B4-BE49-F238E27FC236}">
+                <a16:creationId xmlns:a16="http://schemas.microsoft.com/office/drawing/2014/main" id="{B1D6E6A8-FC45-4AFC-AAC2-664A3ECDE1DF}"/>
+              </a:ext>
+            </a:extLst>
+          </p:cNvPr>
+          <p:cNvCxnSpPr>
+            <a:cxnSpLocks/>
+            <a:stCxn id="26" idx="1"/>
+            <a:endCxn id="19" idx="3"/>
+          </p:cNvCxnSpPr>
+          <p:nvPr/>
+        </p:nvCxnSpPr>
+        <p:spPr>
+          <a:xfrm flipH="1">
+            <a:off x="4498013" y="5735879"/>
+            <a:ext cx="1952562" cy="0"/>
+          </a:xfrm>
+          <a:prstGeom prst="straightConnector1">
+            <a:avLst/>
+          </a:prstGeom>
+          <a:ln w="38100">
+            <a:solidFill>
+              <a:srgbClr val="A51258"/>
+            </a:solidFill>
+            <a:tailEnd type="triangle"/>
+          </a:ln>
+          <a:effectLst>
+            <a:glow rad="50800">
+              <a:schemeClr val="tx1"/>
+            </a:glow>
+          </a:effectLst>
+        </p:spPr>
+        <p:style>
+          <a:lnRef idx="1">
+            <a:schemeClr val="accent1"/>
+          </a:lnRef>
+          <a:fillRef idx="0">
+            <a:schemeClr val="accent1"/>
+          </a:fillRef>
+          <a:effectRef idx="0">
+            <a:schemeClr val="accent1"/>
+          </a:effectRef>
+          <a:fontRef idx="minor">
+            <a:schemeClr val="tx1"/>
+          </a:fontRef>
+        </p:style>
+      </p:cxnSp>
+      <p:sp>
+        <p:nvSpPr>
+          <p:cNvPr id="34" name="Rectangle 33">
+            <a:extLst>
+              <a:ext uri="{FF2B5EF4-FFF2-40B4-BE49-F238E27FC236}">
+                <a16:creationId xmlns:a16="http://schemas.microsoft.com/office/drawing/2014/main" id="{FE8A38AC-578F-4101-BB2A-5429A32B752B}"/>
+              </a:ext>
+            </a:extLst>
+          </p:cNvPr>
+          <p:cNvSpPr/>
+          <p:nvPr/>
+        </p:nvSpPr>
+        <p:spPr>
+          <a:xfrm>
+            <a:off x="367308" y="2922939"/>
+            <a:ext cx="1850002" cy="752399"/>
+          </a:xfrm>
+          <a:prstGeom prst="rect">
+            <a:avLst/>
+          </a:prstGeom>
+          <a:noFill/>
+          <a:ln w="28575">
+            <a:solidFill>
+              <a:srgbClr val="A51258"/>
+            </a:solidFill>
+          </a:ln>
+          <a:effectLst>
+            <a:glow rad="50800">
+              <a:schemeClr val="tx1"/>
+            </a:glow>
+          </a:effectLst>
+        </p:spPr>
+        <p:style>
+          <a:lnRef idx="2">
+            <a:schemeClr val="accent1">
+              <a:shade val="50000"/>
+            </a:schemeClr>
+          </a:lnRef>
+          <a:fillRef idx="1">
+            <a:schemeClr val="accent1"/>
+          </a:fillRef>
+          <a:effectRef idx="0">
+            <a:schemeClr val="accent1"/>
+          </a:effectRef>
+          <a:fontRef idx="minor">
+            <a:schemeClr val="lt1"/>
+          </a:fontRef>
+        </p:style>
+        <p:txBody>
+          <a:bodyPr rtlCol="0" anchor="ctr"/>
+          <a:lstStyle/>
+          <a:p>
+            <a:pPr algn="ctr"/>
+            <a:r>
+              <a:rPr lang="fr-FR" sz="1200" dirty="0">
+                <a:solidFill>
+                  <a:srgbClr val="A51258"/>
+                </a:solidFill>
+              </a:rPr>
+              <a:t>Facilite </a:t>
+            </a:r>
+            <a:r>
+              <a:rPr lang="fr-FR" sz="1200" dirty="0">
+                <a:solidFill>
+                  <a:schemeClr val="tx1"/>
+                </a:solidFill>
+              </a:rPr>
+              <a:t>l’utilisation des les lecteurs RFID</a:t>
+            </a:r>
+          </a:p>
+        </p:txBody>
+      </p:sp>
+      <p:cxnSp>
+        <p:nvCxnSpPr>
+          <p:cNvPr id="35" name="Connecteur droit avec flèche 34">
+            <a:extLst>
+              <a:ext uri="{FF2B5EF4-FFF2-40B4-BE49-F238E27FC236}">
+                <a16:creationId xmlns:a16="http://schemas.microsoft.com/office/drawing/2014/main" id="{B5957FC1-7DE0-4701-AB56-118B48A89468}"/>
+              </a:ext>
+            </a:extLst>
+          </p:cNvPr>
+          <p:cNvCxnSpPr>
+            <a:cxnSpLocks/>
+            <a:stCxn id="5" idx="2"/>
+            <a:endCxn id="34" idx="0"/>
+          </p:cNvCxnSpPr>
+          <p:nvPr/>
+        </p:nvCxnSpPr>
+        <p:spPr>
+          <a:xfrm>
+            <a:off x="1292309" y="1874520"/>
+            <a:ext cx="0" cy="1048419"/>
+          </a:xfrm>
+          <a:prstGeom prst="straightConnector1">
+            <a:avLst/>
+          </a:prstGeom>
+          <a:ln w="38100">
+            <a:solidFill>
+              <a:srgbClr val="A51258"/>
+            </a:solidFill>
+            <a:tailEnd type="triangle"/>
+          </a:ln>
+          <a:effectLst>
+            <a:glow rad="50800">
+              <a:schemeClr val="tx1"/>
+            </a:glow>
+          </a:effectLst>
+        </p:spPr>
+        <p:style>
+          <a:lnRef idx="1">
+            <a:schemeClr val="accent1"/>
+          </a:lnRef>
+          <a:fillRef idx="0">
+            <a:schemeClr val="accent1"/>
+          </a:fillRef>
+          <a:effectRef idx="0">
+            <a:schemeClr val="accent1"/>
+          </a:effectRef>
+          <a:fontRef idx="minor">
+            <a:schemeClr val="tx1"/>
+          </a:fontRef>
+        </p:style>
+      </p:cxnSp>
+      <p:cxnSp>
+        <p:nvCxnSpPr>
+          <p:cNvPr id="38" name="Connecteur droit avec flèche 37">
+            <a:extLst>
+              <a:ext uri="{FF2B5EF4-FFF2-40B4-BE49-F238E27FC236}">
+                <a16:creationId xmlns:a16="http://schemas.microsoft.com/office/drawing/2014/main" id="{85E766C0-203C-4472-B192-909211381607}"/>
+              </a:ext>
+            </a:extLst>
+          </p:cNvPr>
+          <p:cNvCxnSpPr>
+            <a:cxnSpLocks/>
+          </p:cNvCxnSpPr>
+          <p:nvPr/>
+        </p:nvCxnSpPr>
+        <p:spPr>
+          <a:xfrm>
+            <a:off x="2217310" y="3424390"/>
+            <a:ext cx="4233265" cy="1935289"/>
+          </a:xfrm>
+          <a:prstGeom prst="straightConnector1">
+            <a:avLst/>
+          </a:prstGeom>
+          <a:ln w="38100">
+            <a:solidFill>
+              <a:srgbClr val="A51258"/>
+            </a:solidFill>
+            <a:tailEnd type="triangle"/>
+          </a:ln>
+          <a:effectLst>
+            <a:glow rad="50800">
+              <a:schemeClr val="tx1"/>
+            </a:glow>
+          </a:effectLst>
+        </p:spPr>
+        <p:style>
+          <a:lnRef idx="1">
+            <a:schemeClr val="accent1"/>
+          </a:lnRef>
+          <a:fillRef idx="0">
+            <a:schemeClr val="accent1"/>
+          </a:fillRef>
+          <a:effectRef idx="0">
+            <a:schemeClr val="accent1"/>
+          </a:effectRef>
+          <a:fontRef idx="minor">
+            <a:schemeClr val="tx1"/>
+          </a:fontRef>
+        </p:style>
+      </p:cxnSp>
     </p:spTree>
     <p:extLst>
       <p:ext uri="{BB962C8B-B14F-4D97-AF65-F5344CB8AC3E}">

</xml_diff>

<commit_message>
Maj diapo + UML
</commit_message>
<xml_diff>
--- a/Guillaume/Documents/Diapo Revues/Revue 2 de projet étudiant 1 Escape Game Téléthon.pptx
+++ b/Guillaume/Documents/Diapo Revues/Revue 2 de projet étudiant 1 Escape Game Téléthon.pptx
@@ -12,14 +12,15 @@
     <p:sldId id="262" r:id="rId6"/>
     <p:sldId id="267" r:id="rId7"/>
     <p:sldId id="270" r:id="rId8"/>
-    <p:sldId id="269" r:id="rId9"/>
-    <p:sldId id="260" r:id="rId10"/>
-    <p:sldId id="265" r:id="rId11"/>
-    <p:sldId id="268" r:id="rId12"/>
-    <p:sldId id="266" r:id="rId13"/>
-    <p:sldId id="271" r:id="rId14"/>
-    <p:sldId id="272" r:id="rId15"/>
-    <p:sldId id="273" r:id="rId16"/>
+    <p:sldId id="273" r:id="rId9"/>
+    <p:sldId id="269" r:id="rId10"/>
+    <p:sldId id="260" r:id="rId11"/>
+    <p:sldId id="265" r:id="rId12"/>
+    <p:sldId id="268" r:id="rId13"/>
+    <p:sldId id="266" r:id="rId14"/>
+    <p:sldId id="274" r:id="rId15"/>
+    <p:sldId id="271" r:id="rId16"/>
+    <p:sldId id="272" r:id="rId17"/>
   </p:sldIdLst>
   <p:sldSz cx="12192000" cy="6858000"/>
   <p:notesSz cx="6858000" cy="9144000"/>
@@ -849,7 +850,7 @@
             <a:fld id="{B61BEF0D-F0BB-DE4B-95CE-6DB70DBA9567}" type="datetimeFigureOut">
               <a:rPr lang="en-US" dirty="0"/>
               <a:pPr/>
-              <a:t>3/10/2020</a:t>
+              <a:t>3/11/2020</a:t>
             </a:fld>
             <a:endParaRPr lang="en-US" dirty="0"/>
           </a:p>
@@ -1097,7 +1098,7 @@
             <a:fld id="{B61BEF0D-F0BB-DE4B-95CE-6DB70DBA9567}" type="datetimeFigureOut">
               <a:rPr lang="en-US" dirty="0"/>
               <a:pPr/>
-              <a:t>3/10/2020</a:t>
+              <a:t>3/11/2020</a:t>
             </a:fld>
             <a:endParaRPr lang="en-US" dirty="0"/>
           </a:p>
@@ -1408,7 +1409,7 @@
             <a:fld id="{B61BEF0D-F0BB-DE4B-95CE-6DB70DBA9567}" type="datetimeFigureOut">
               <a:rPr lang="en-US" dirty="0"/>
               <a:pPr/>
-              <a:t>3/10/2020</a:t>
+              <a:t>3/11/2020</a:t>
             </a:fld>
             <a:endParaRPr lang="en-US" dirty="0"/>
           </a:p>
@@ -1746,7 +1747,7 @@
             <a:fld id="{B61BEF0D-F0BB-DE4B-95CE-6DB70DBA9567}" type="datetimeFigureOut">
               <a:rPr lang="en-US" dirty="0"/>
               <a:pPr/>
-              <a:t>3/10/2020</a:t>
+              <a:t>3/11/2020</a:t>
             </a:fld>
             <a:endParaRPr lang="en-US" dirty="0"/>
           </a:p>
@@ -2057,7 +2058,7 @@
             <a:fld id="{B61BEF0D-F0BB-DE4B-95CE-6DB70DBA9567}" type="datetimeFigureOut">
               <a:rPr lang="en-US" dirty="0"/>
               <a:pPr/>
-              <a:t>3/10/2020</a:t>
+              <a:t>3/11/2020</a:t>
             </a:fld>
             <a:endParaRPr lang="en-US" dirty="0"/>
           </a:p>
@@ -2447,7 +2448,7 @@
             <a:fld id="{B61BEF0D-F0BB-DE4B-95CE-6DB70DBA9567}" type="datetimeFigureOut">
               <a:rPr lang="en-US" dirty="0"/>
               <a:pPr/>
-              <a:t>3/10/2020</a:t>
+              <a:t>3/11/2020</a:t>
             </a:fld>
             <a:endParaRPr lang="en-US" dirty="0"/>
           </a:p>
@@ -2613,7 +2614,7 @@
           <a:p>
             <a:fld id="{55C6B4A9-1611-4792-9094-5F34BCA07E0B}" type="datetimeFigureOut">
               <a:rPr lang="en-US" dirty="0"/>
-              <a:t>3/10/2020</a:t>
+              <a:t>3/11/2020</a:t>
             </a:fld>
             <a:endParaRPr lang="en-US" dirty="0"/>
           </a:p>
@@ -2789,7 +2790,7 @@
             <a:fld id="{B61BEF0D-F0BB-DE4B-95CE-6DB70DBA9567}" type="datetimeFigureOut">
               <a:rPr lang="en-US" dirty="0"/>
               <a:pPr/>
-              <a:t>3/10/2020</a:t>
+              <a:t>3/11/2020</a:t>
             </a:fld>
             <a:endParaRPr lang="en-US" dirty="0"/>
           </a:p>
@@ -2962,7 +2963,7 @@
             <a:fld id="{B61BEF0D-F0BB-DE4B-95CE-6DB70DBA9567}" type="datetimeFigureOut">
               <a:rPr lang="en-US" dirty="0"/>
               <a:pPr/>
-              <a:t>3/10/2020</a:t>
+              <a:t>3/11/2020</a:t>
             </a:fld>
             <a:endParaRPr lang="en-US" dirty="0"/>
           </a:p>
@@ -3206,7 +3207,7 @@
             <a:fld id="{B61BEF0D-F0BB-DE4B-95CE-6DB70DBA9567}" type="datetimeFigureOut">
               <a:rPr lang="en-US" dirty="0"/>
               <a:pPr/>
-              <a:t>3/10/2020</a:t>
+              <a:t>3/11/2020</a:t>
             </a:fld>
             <a:endParaRPr lang="en-US" dirty="0"/>
           </a:p>
@@ -3434,7 +3435,7 @@
           <a:p>
             <a:fld id="{EB712588-04B1-427B-82EE-E8DB90309F08}" type="datetimeFigureOut">
               <a:rPr lang="en-US" dirty="0"/>
-              <a:t>3/10/2020</a:t>
+              <a:t>3/11/2020</a:t>
             </a:fld>
             <a:endParaRPr lang="en-US" dirty="0"/>
           </a:p>
@@ -3804,7 +3805,7 @@
             <a:fld id="{B61BEF0D-F0BB-DE4B-95CE-6DB70DBA9567}" type="datetimeFigureOut">
               <a:rPr lang="en-US" dirty="0"/>
               <a:pPr/>
-              <a:t>3/10/2020</a:t>
+              <a:t>3/11/2020</a:t>
             </a:fld>
             <a:endParaRPr lang="en-US" dirty="0"/>
           </a:p>
@@ -3924,7 +3925,7 @@
             <a:fld id="{B61BEF0D-F0BB-DE4B-95CE-6DB70DBA9567}" type="datetimeFigureOut">
               <a:rPr lang="en-US" dirty="0"/>
               <a:pPr/>
-              <a:t>3/10/2020</a:t>
+              <a:t>3/11/2020</a:t>
             </a:fld>
             <a:endParaRPr lang="en-US" dirty="0"/>
           </a:p>
@@ -4016,7 +4017,7 @@
             <a:fld id="{B61BEF0D-F0BB-DE4B-95CE-6DB70DBA9567}" type="datetimeFigureOut">
               <a:rPr lang="en-US" dirty="0"/>
               <a:pPr/>
-              <a:t>3/10/2020</a:t>
+              <a:t>3/11/2020</a:t>
             </a:fld>
             <a:endParaRPr lang="en-US" dirty="0"/>
           </a:p>
@@ -4267,7 +4268,7 @@
           <a:p>
             <a:fld id="{42A54C80-263E-416B-A8E0-580EDEADCBDC}" type="datetimeFigureOut">
               <a:rPr lang="en-US" dirty="0"/>
-              <a:t>3/10/2020</a:t>
+              <a:t>3/11/2020</a:t>
             </a:fld>
             <a:endParaRPr lang="en-US" dirty="0"/>
           </a:p>
@@ -4526,7 +4527,7 @@
             <a:fld id="{B61BEF0D-F0BB-DE4B-95CE-6DB70DBA9567}" type="datetimeFigureOut">
               <a:rPr lang="en-US" dirty="0"/>
               <a:pPr/>
-              <a:t>3/10/2020</a:t>
+              <a:t>3/11/2020</a:t>
             </a:fld>
             <a:endParaRPr lang="en-US" dirty="0"/>
           </a:p>
@@ -5266,7 +5267,7 @@
             <a:fld id="{B61BEF0D-F0BB-DE4B-95CE-6DB70DBA9567}" type="datetimeFigureOut">
               <a:rPr lang="en-US" dirty="0"/>
               <a:pPr/>
-              <a:t>3/10/2020</a:t>
+              <a:t>3/11/2020</a:t>
             </a:fld>
             <a:endParaRPr lang="en-US" dirty="0"/>
           </a:p>
@@ -8128,8 +8129,8 @@
         </p:nvSpPr>
         <p:spPr>
           <a:xfrm>
-            <a:off x="-301752" y="2554862"/>
-            <a:ext cx="3758184" cy="646331"/>
+            <a:off x="2587752" y="143435"/>
+            <a:ext cx="6437376" cy="646331"/>
           </a:xfrm>
           <a:prstGeom prst="rect">
             <a:avLst/>
@@ -8144,7 +8145,7 @@
           <a:p>
             <a:pPr algn="ctr"/>
             <a:r>
-              <a:rPr lang="fr-FR" sz="2000" b="1" dirty="0">
+              <a:rPr lang="fr-FR" sz="3600" b="1" dirty="0">
                 <a:effectLst>
                   <a:outerShdw blurRad="38100" dist="38100" dir="2700000" algn="tl">
                     <a:srgbClr val="000000">
@@ -8154,15 +8155,12 @@
                 </a:effectLst>
                 <a:latin typeface="Eras Medium ITC" panose="020B0602030504020804" pitchFamily="34" charset="0"/>
               </a:rPr>
-              <a:t>Diagramme de séquence :</a:t>
-            </a:r>
-          </a:p>
-          <a:p>
-            <a:pPr algn="ctr"/>
-            <a:r>
-              <a:rPr lang="fr-FR" sz="1600" b="1" dirty="0">
+              <a:t>Diagramme de cas </a:t>
+            </a:r>
+            <a:r>
+              <a:rPr lang="fr-FR" sz="3600" b="1" dirty="0">
                 <a:solidFill>
-                  <a:srgbClr val="A51258"/>
+                  <a:srgbClr val="A31257"/>
                 </a:solidFill>
                 <a:effectLst>
                   <a:outerShdw blurRad="38100" dist="38100" dir="2700000" algn="tl">
@@ -8173,13 +8171,10 @@
                 </a:effectLst>
                 <a:latin typeface="Eras Medium ITC" panose="020B0602030504020804" pitchFamily="34" charset="0"/>
               </a:rPr>
-              <a:t>Système sous </a:t>
-            </a:r>
-            <a:r>
-              <a:rPr lang="fr-FR" sz="1600" b="1" dirty="0" err="1">
-                <a:solidFill>
-                  <a:srgbClr val="A51258"/>
-                </a:solidFill>
+              <a:t>d’utilisation</a:t>
+            </a:r>
+            <a:r>
+              <a:rPr lang="fr-FR" sz="3600" b="1" dirty="0">
                 <a:effectLst>
                   <a:outerShdw blurRad="38100" dist="38100" dir="2700000" algn="tl">
                     <a:srgbClr val="000000">
@@ -8189,27 +8184,40 @@
                 </a:effectLst>
                 <a:latin typeface="Eras Medium ITC" panose="020B0602030504020804" pitchFamily="34" charset="0"/>
               </a:rPr>
-              <a:t>raspberry</a:t>
-            </a:r>
-            <a:r>
-              <a:rPr lang="fr-FR" sz="1600" b="1" dirty="0">
-                <a:solidFill>
-                  <a:srgbClr val="A51258"/>
-                </a:solidFill>
-                <a:effectLst>
-                  <a:outerShdw blurRad="38100" dist="38100" dir="2700000" algn="tl">
-                    <a:srgbClr val="000000">
-                      <a:alpha val="43137"/>
-                    </a:srgbClr>
-                  </a:outerShdw>
-                </a:effectLst>
-                <a:latin typeface="Eras Medium ITC" panose="020B0602030504020804" pitchFamily="34" charset="0"/>
-              </a:rPr>
-              <a:t>, partie 1 </a:t>
-            </a:r>
-          </a:p>
-        </p:txBody>
-      </p:sp>
+              <a:t>  </a:t>
+            </a:r>
+          </a:p>
+        </p:txBody>
+      </p:sp>
+      <p:pic>
+        <p:nvPicPr>
+          <p:cNvPr id="5" name="Image 4" descr="Une image contenant texte, carte, capture d’écran&#10;&#10;Description générée automatiquement">
+            <a:extLst>
+              <a:ext uri="{FF2B5EF4-FFF2-40B4-BE49-F238E27FC236}">
+                <a16:creationId xmlns:a16="http://schemas.microsoft.com/office/drawing/2014/main" id="{F3CC10DC-37D4-43BE-BB94-2AA6BA44EF0A}"/>
+              </a:ext>
+            </a:extLst>
+          </p:cNvPr>
+          <p:cNvPicPr>
+            <a:picLocks noChangeAspect="1"/>
+          </p:cNvPicPr>
+          <p:nvPr/>
+        </p:nvPicPr>
+        <p:blipFill rotWithShape="1">
+          <a:blip r:embed="rId3"/>
+          <a:srcRect l="1206" t="3761" r="2523" b="2393"/>
+          <a:stretch/>
+        </p:blipFill>
+        <p:spPr>
+          <a:xfrm>
+            <a:off x="2796424" y="1022694"/>
+            <a:ext cx="4798345" cy="5405538"/>
+          </a:xfrm>
+          <a:prstGeom prst="rect">
+            <a:avLst/>
+          </a:prstGeom>
+        </p:spPr>
+      </p:pic>
       <p:sp>
         <p:nvSpPr>
           <p:cNvPr id="6" name="Organigramme : Terminateur 5">
@@ -8778,39 +8786,10 @@
           </a:p>
         </p:txBody>
       </p:sp>
-      <p:pic>
-        <p:nvPicPr>
-          <p:cNvPr id="4" name="Image 3">
-            <a:extLst>
-              <a:ext uri="{FF2B5EF4-FFF2-40B4-BE49-F238E27FC236}">
-                <a16:creationId xmlns:a16="http://schemas.microsoft.com/office/drawing/2014/main" id="{F6F50CF8-8F97-49CE-8AC9-109901FFB29C}"/>
-              </a:ext>
-            </a:extLst>
-          </p:cNvPr>
-          <p:cNvPicPr>
-            <a:picLocks noChangeAspect="1"/>
-          </p:cNvPicPr>
-          <p:nvPr/>
-        </p:nvPicPr>
-        <p:blipFill rotWithShape="1">
-          <a:blip r:embed="rId3"/>
-          <a:srcRect r="35426" b="36133"/>
-          <a:stretch/>
-        </p:blipFill>
-        <p:spPr>
-          <a:xfrm>
-            <a:off x="3513019" y="0"/>
-            <a:ext cx="5223127" cy="6858000"/>
-          </a:xfrm>
-          <a:prstGeom prst="rect">
-            <a:avLst/>
-          </a:prstGeom>
-        </p:spPr>
-      </p:pic>
     </p:spTree>
     <p:extLst>
       <p:ext uri="{BB962C8B-B14F-4D97-AF65-F5344CB8AC3E}">
-        <p14:creationId xmlns:p14="http://schemas.microsoft.com/office/powerpoint/2010/main" val="1939906211"/>
+        <p14:creationId xmlns:p14="http://schemas.microsoft.com/office/powerpoint/2010/main" val="1377170629"/>
       </p:ext>
     </p:extLst>
   </p:cSld>
@@ -8908,7 +8887,7 @@
         </p:nvSpPr>
         <p:spPr>
           <a:xfrm>
-            <a:off x="3704463" y="309052"/>
+            <a:off x="-301752" y="2554862"/>
             <a:ext cx="3758184" cy="646331"/>
           </a:xfrm>
           <a:prstGeom prst="rect">
@@ -8985,7 +8964,7 @@
                 </a:effectLst>
                 <a:latin typeface="Eras Medium ITC" panose="020B0602030504020804" pitchFamily="34" charset="0"/>
               </a:rPr>
-              <a:t>, partie 2 </a:t>
+              <a:t>, partie 1 </a:t>
             </a:r>
           </a:p>
         </p:txBody>
@@ -9574,13 +9553,13 @@
         </p:nvPicPr>
         <p:blipFill rotWithShape="1">
           <a:blip r:embed="rId3"/>
-          <a:srcRect t="63122" r="7042" b="1467"/>
+          <a:srcRect r="35426" b="36133"/>
           <a:stretch/>
         </p:blipFill>
         <p:spPr>
           <a:xfrm>
-            <a:off x="751403" y="1600200"/>
-            <a:ext cx="8968354" cy="4535424"/>
+            <a:off x="3513019" y="0"/>
+            <a:ext cx="5223127" cy="6858000"/>
           </a:xfrm>
           <a:prstGeom prst="rect">
             <a:avLst/>
@@ -9590,7 +9569,7 @@
     </p:spTree>
     <p:extLst>
       <p:ext uri="{BB962C8B-B14F-4D97-AF65-F5344CB8AC3E}">
-        <p14:creationId xmlns:p14="http://schemas.microsoft.com/office/powerpoint/2010/main" val="673851662"/>
+        <p14:creationId xmlns:p14="http://schemas.microsoft.com/office/powerpoint/2010/main" val="1939906211"/>
       </p:ext>
     </p:extLst>
   </p:cSld>
@@ -9688,8 +9667,8 @@
         </p:nvSpPr>
         <p:spPr>
           <a:xfrm>
-            <a:off x="2587752" y="143435"/>
-            <a:ext cx="6437376" cy="1077218"/>
+            <a:off x="3704463" y="309052"/>
+            <a:ext cx="3758184" cy="646331"/>
           </a:xfrm>
           <a:prstGeom prst="rect">
             <a:avLst/>
@@ -9704,7 +9683,7 @@
           <a:p>
             <a:pPr algn="ctr"/>
             <a:r>
-              <a:rPr lang="fr-FR" sz="3600" b="1" dirty="0">
+              <a:rPr lang="fr-FR" sz="2000" b="1" dirty="0">
                 <a:effectLst>
                   <a:outerShdw blurRad="38100" dist="38100" dir="2700000" algn="tl">
                     <a:srgbClr val="000000">
@@ -9720,7 +9699,7 @@
           <a:p>
             <a:pPr algn="ctr"/>
             <a:r>
-              <a:rPr lang="fr-FR" sz="2800" b="1" dirty="0">
+              <a:rPr lang="fr-FR" sz="1600" b="1" dirty="0">
                 <a:solidFill>
                   <a:srgbClr val="A51258"/>
                 </a:solidFill>
@@ -9733,7 +9712,39 @@
                 </a:effectLst>
                 <a:latin typeface="Eras Medium ITC" panose="020B0602030504020804" pitchFamily="34" charset="0"/>
               </a:rPr>
-              <a:t>Serveur socket</a:t>
+              <a:t>Système sous </a:t>
+            </a:r>
+            <a:r>
+              <a:rPr lang="fr-FR" sz="1600" b="1" dirty="0" err="1">
+                <a:solidFill>
+                  <a:srgbClr val="A51258"/>
+                </a:solidFill>
+                <a:effectLst>
+                  <a:outerShdw blurRad="38100" dist="38100" dir="2700000" algn="tl">
+                    <a:srgbClr val="000000">
+                      <a:alpha val="43137"/>
+                    </a:srgbClr>
+                  </a:outerShdw>
+                </a:effectLst>
+                <a:latin typeface="Eras Medium ITC" panose="020B0602030504020804" pitchFamily="34" charset="0"/>
+              </a:rPr>
+              <a:t>raspberry</a:t>
+            </a:r>
+            <a:r>
+              <a:rPr lang="fr-FR" sz="1600" b="1" dirty="0">
+                <a:solidFill>
+                  <a:srgbClr val="A51258"/>
+                </a:solidFill>
+                <a:effectLst>
+                  <a:outerShdw blurRad="38100" dist="38100" dir="2700000" algn="tl">
+                    <a:srgbClr val="000000">
+                      <a:alpha val="43137"/>
+                    </a:srgbClr>
+                  </a:outerShdw>
+                </a:effectLst>
+                <a:latin typeface="Eras Medium ITC" panose="020B0602030504020804" pitchFamily="34" charset="0"/>
+              </a:rPr>
+              <a:t>, partie 2 </a:t>
             </a:r>
           </a:p>
         </p:txBody>
@@ -10308,10 +10319,10 @@
       </p:sp>
       <p:pic>
         <p:nvPicPr>
-          <p:cNvPr id="4" name="Image 3" descr="Une image contenant capture d’écran&#10;&#10;Description générée automatiquement">
-            <a:extLst>
-              <a:ext uri="{FF2B5EF4-FFF2-40B4-BE49-F238E27FC236}">
-                <a16:creationId xmlns:a16="http://schemas.microsoft.com/office/drawing/2014/main" id="{54B866ED-4CFF-44BC-9BA8-DD16A9967414}"/>
+          <p:cNvPr id="4" name="Image 3">
+            <a:extLst>
+              <a:ext uri="{FF2B5EF4-FFF2-40B4-BE49-F238E27FC236}">
+                <a16:creationId xmlns:a16="http://schemas.microsoft.com/office/drawing/2014/main" id="{F6F50CF8-8F97-49CE-8AC9-109901FFB29C}"/>
               </a:ext>
             </a:extLst>
           </p:cNvPr>
@@ -10322,13 +10333,13 @@
         </p:nvPicPr>
         <p:blipFill rotWithShape="1">
           <a:blip r:embed="rId3"/>
-          <a:srcRect l="-781" t="593" r="47706" b="14900"/>
+          <a:srcRect t="63122" r="7042" b="1467"/>
           <a:stretch/>
         </p:blipFill>
         <p:spPr>
           <a:xfrm>
-            <a:off x="1919294" y="1220653"/>
-            <a:ext cx="5615362" cy="5659756"/>
+            <a:off x="751403" y="1600200"/>
+            <a:ext cx="8968354" cy="4535424"/>
           </a:xfrm>
           <a:prstGeom prst="rect">
             <a:avLst/>
@@ -10338,7 +10349,7 @@
     </p:spTree>
     <p:extLst>
       <p:ext uri="{BB962C8B-B14F-4D97-AF65-F5344CB8AC3E}">
-        <p14:creationId xmlns:p14="http://schemas.microsoft.com/office/powerpoint/2010/main" val="793625063"/>
+        <p14:creationId xmlns:p14="http://schemas.microsoft.com/office/powerpoint/2010/main" val="673851662"/>
       </p:ext>
     </p:extLst>
   </p:cSld>
@@ -10424,10 +10435,10 @@
       </p:pic>
       <p:sp>
         <p:nvSpPr>
-          <p:cNvPr id="3" name="ZoneTexte 2">
-            <a:extLst>
-              <a:ext uri="{FF2B5EF4-FFF2-40B4-BE49-F238E27FC236}">
-                <a16:creationId xmlns:a16="http://schemas.microsoft.com/office/drawing/2014/main" id="{1582123C-25BF-42F1-97F8-35FFB48DFFAA}"/>
+          <p:cNvPr id="2" name="ZoneTexte 1">
+            <a:extLst>
+              <a:ext uri="{FF2B5EF4-FFF2-40B4-BE49-F238E27FC236}">
+                <a16:creationId xmlns:a16="http://schemas.microsoft.com/office/drawing/2014/main" id="{144597CC-5B36-42C7-952E-C2CE1E34CACD}"/>
               </a:ext>
             </a:extLst>
           </p:cNvPr>
@@ -10436,43 +10447,13 @@
         </p:nvSpPr>
         <p:spPr>
           <a:xfrm>
-            <a:off x="2497873" y="143435"/>
-            <a:ext cx="6188927" cy="1138773"/>
+            <a:off x="2587752" y="143435"/>
+            <a:ext cx="6437376" cy="1077218"/>
           </a:xfrm>
           <a:prstGeom prst="rect">
             <a:avLst/>
           </a:prstGeom>
           <a:noFill/>
-          <a:ln>
-            <a:noFill/>
-          </a:ln>
-          <a:effectLst>
-            <a:glow rad="63500">
-              <a:schemeClr val="accent4">
-                <a:satMod val="175000"/>
-                <a:alpha val="40000"/>
-              </a:schemeClr>
-            </a:glow>
-            <a:outerShdw blurRad="50800" dist="38100" dir="5400000" algn="t" rotWithShape="0">
-              <a:prstClr val="black">
-                <a:alpha val="40000"/>
-              </a:prstClr>
-            </a:outerShdw>
-          </a:effectLst>
-          <a:scene3d>
-            <a:camera prst="orthographicFront">
-              <a:rot lat="0" lon="0" rev="0"/>
-            </a:camera>
-            <a:lightRig rig="soft" dir="t">
-              <a:rot lat="0" lon="0" rev="0"/>
-            </a:lightRig>
-          </a:scene3d>
-          <a:sp3d contourW="44450" prstMaterial="matte">
-            <a:bevelT w="63500" h="63500" prst="artDeco"/>
-            <a:contourClr>
-              <a:srgbClr val="FFFFFF"/>
-            </a:contourClr>
-          </a:sp3d>
         </p:spPr>
         <p:txBody>
           <a:bodyPr wrap="square" rtlCol="0">
@@ -10483,34 +10464,613 @@
             <a:pPr algn="ctr"/>
             <a:r>
               <a:rPr lang="fr-FR" sz="3600" b="1" dirty="0">
+                <a:effectLst>
+                  <a:outerShdw blurRad="38100" dist="38100" dir="2700000" algn="tl">
+                    <a:srgbClr val="000000">
+                      <a:alpha val="43137"/>
+                    </a:srgbClr>
+                  </a:outerShdw>
+                </a:effectLst>
                 <a:latin typeface="Eras Medium ITC" panose="020B0602030504020804" pitchFamily="34" charset="0"/>
               </a:rPr>
-              <a:t>Planification Gantt           </a:t>
-            </a:r>
-            <a:r>
-              <a:rPr lang="fr-FR" sz="3200" b="1" dirty="0">
+              <a:t>Diagramme de séquence :</a:t>
+            </a:r>
+          </a:p>
+          <a:p>
+            <a:pPr algn="ctr"/>
+            <a:r>
+              <a:rPr lang="fr-FR" sz="2800" b="1" dirty="0">
                 <a:solidFill>
-                  <a:srgbClr val="A41258"/>
+                  <a:srgbClr val="A51258"/>
                 </a:solidFill>
+                <a:effectLst>
+                  <a:outerShdw blurRad="38100" dist="38100" dir="2700000" algn="tl">
+                    <a:srgbClr val="000000">
+                      <a:alpha val="43137"/>
+                    </a:srgbClr>
+                  </a:outerShdw>
+                </a:effectLst>
                 <a:latin typeface="Eras Medium ITC" panose="020B0602030504020804" pitchFamily="34" charset="0"/>
               </a:rPr>
-              <a:t>Partie commune </a:t>
-            </a:r>
-            <a:r>
-              <a:rPr lang="fr-FR" sz="3200" b="1" dirty="0">
+              <a:t>Serveur socket</a:t>
+            </a:r>
+          </a:p>
+        </p:txBody>
+      </p:sp>
+      <p:sp>
+        <p:nvSpPr>
+          <p:cNvPr id="6" name="Organigramme : Terminateur 5">
+            <a:extLst>
+              <a:ext uri="{FF2B5EF4-FFF2-40B4-BE49-F238E27FC236}">
+                <a16:creationId xmlns:a16="http://schemas.microsoft.com/office/drawing/2014/main" id="{D0388349-375C-432D-95E5-4335229F72C4}"/>
+              </a:ext>
+            </a:extLst>
+          </p:cNvPr>
+          <p:cNvSpPr/>
+          <p:nvPr/>
+        </p:nvSpPr>
+        <p:spPr>
+          <a:xfrm>
+            <a:off x="11405115" y="1514475"/>
+            <a:ext cx="358260" cy="85725"/>
+          </a:xfrm>
+          <a:prstGeom prst="flowChartTerminator">
+            <a:avLst/>
+          </a:prstGeom>
+          <a:solidFill>
+            <a:srgbClr val="A8135A"/>
+          </a:solidFill>
+          <a:ln>
+            <a:solidFill>
+              <a:schemeClr val="bg1"/>
+            </a:solidFill>
+          </a:ln>
+        </p:spPr>
+        <p:style>
+          <a:lnRef idx="2">
+            <a:schemeClr val="accent1">
+              <a:shade val="50000"/>
+            </a:schemeClr>
+          </a:lnRef>
+          <a:fillRef idx="1">
+            <a:schemeClr val="accent1"/>
+          </a:fillRef>
+          <a:effectRef idx="0">
+            <a:schemeClr val="accent1"/>
+          </a:effectRef>
+          <a:fontRef idx="minor">
+            <a:schemeClr val="lt1"/>
+          </a:fontRef>
+        </p:style>
+        <p:txBody>
+          <a:bodyPr rtlCol="0" anchor="ctr"/>
+          <a:lstStyle/>
+          <a:p>
+            <a:pPr algn="ctr"/>
+            <a:endParaRPr lang="fr-FR"/>
+          </a:p>
+        </p:txBody>
+      </p:sp>
+      <p:sp>
+        <p:nvSpPr>
+          <p:cNvPr id="7" name="Rectangle 6">
+            <a:extLst>
+              <a:ext uri="{FF2B5EF4-FFF2-40B4-BE49-F238E27FC236}">
+                <a16:creationId xmlns:a16="http://schemas.microsoft.com/office/drawing/2014/main" id="{7965C92B-62A3-4F91-80E9-84A7357D8ED7}"/>
+              </a:ext>
+            </a:extLst>
+          </p:cNvPr>
+          <p:cNvSpPr/>
+          <p:nvPr/>
+        </p:nvSpPr>
+        <p:spPr>
+          <a:xfrm>
+            <a:off x="11658600" y="753035"/>
+            <a:ext cx="104775" cy="5614778"/>
+          </a:xfrm>
+          <a:prstGeom prst="rect">
+            <a:avLst/>
+          </a:prstGeom>
+          <a:solidFill>
+            <a:schemeClr val="bg1"/>
+          </a:solidFill>
+          <a:ln>
+            <a:solidFill>
+              <a:schemeClr val="bg1"/>
+            </a:solidFill>
+          </a:ln>
+        </p:spPr>
+        <p:style>
+          <a:lnRef idx="2">
+            <a:schemeClr val="accent1">
+              <a:shade val="50000"/>
+            </a:schemeClr>
+          </a:lnRef>
+          <a:fillRef idx="1">
+            <a:schemeClr val="accent1"/>
+          </a:fillRef>
+          <a:effectRef idx="0">
+            <a:schemeClr val="accent1"/>
+          </a:effectRef>
+          <a:fontRef idx="minor">
+            <a:schemeClr val="lt1"/>
+          </a:fontRef>
+        </p:style>
+        <p:txBody>
+          <a:bodyPr rtlCol="0" anchor="ctr"/>
+          <a:lstStyle/>
+          <a:p>
+            <a:pPr algn="ctr"/>
+            <a:endParaRPr lang="fr-FR"/>
+          </a:p>
+        </p:txBody>
+      </p:sp>
+      <p:sp>
+        <p:nvSpPr>
+          <p:cNvPr id="9" name="Ellipse 8">
+            <a:extLst>
+              <a:ext uri="{FF2B5EF4-FFF2-40B4-BE49-F238E27FC236}">
+                <a16:creationId xmlns:a16="http://schemas.microsoft.com/office/drawing/2014/main" id="{76D06B21-1630-4698-BFB5-5F24222D7239}"/>
+              </a:ext>
+            </a:extLst>
+          </p:cNvPr>
+          <p:cNvSpPr/>
+          <p:nvPr/>
+        </p:nvSpPr>
+        <p:spPr>
+          <a:xfrm>
+            <a:off x="11428928" y="5851700"/>
+            <a:ext cx="564118" cy="542925"/>
+          </a:xfrm>
+          <a:prstGeom prst="ellipse">
+            <a:avLst/>
+          </a:prstGeom>
+          <a:solidFill>
+            <a:schemeClr val="bg1"/>
+          </a:solidFill>
+          <a:ln>
+            <a:solidFill>
+              <a:schemeClr val="bg1"/>
+            </a:solidFill>
+          </a:ln>
+        </p:spPr>
+        <p:style>
+          <a:lnRef idx="2">
+            <a:schemeClr val="accent1">
+              <a:shade val="50000"/>
+            </a:schemeClr>
+          </a:lnRef>
+          <a:fillRef idx="1">
+            <a:schemeClr val="accent1"/>
+          </a:fillRef>
+          <a:effectRef idx="0">
+            <a:schemeClr val="accent1"/>
+          </a:effectRef>
+          <a:fontRef idx="minor">
+            <a:schemeClr val="lt1"/>
+          </a:fontRef>
+        </p:style>
+        <p:txBody>
+          <a:bodyPr rtlCol="0" anchor="ctr"/>
+          <a:lstStyle/>
+          <a:p>
+            <a:pPr algn="ctr"/>
+            <a:endParaRPr lang="fr-FR"/>
+          </a:p>
+        </p:txBody>
+      </p:sp>
+      <p:sp>
+        <p:nvSpPr>
+          <p:cNvPr id="10" name="Organigramme : Terminateur 9">
+            <a:extLst>
+              <a:ext uri="{FF2B5EF4-FFF2-40B4-BE49-F238E27FC236}">
+                <a16:creationId xmlns:a16="http://schemas.microsoft.com/office/drawing/2014/main" id="{CB8C87E6-B87B-4E15-81CC-6DBA23DB12CA}"/>
+              </a:ext>
+            </a:extLst>
+          </p:cNvPr>
+          <p:cNvSpPr/>
+          <p:nvPr/>
+        </p:nvSpPr>
+        <p:spPr>
+          <a:xfrm>
+            <a:off x="11405114" y="2347824"/>
+            <a:ext cx="358259" cy="85725"/>
+          </a:xfrm>
+          <a:prstGeom prst="flowChartTerminator">
+            <a:avLst/>
+          </a:prstGeom>
+          <a:solidFill>
+            <a:srgbClr val="A8135A"/>
+          </a:solidFill>
+          <a:ln>
+            <a:solidFill>
+              <a:schemeClr val="bg1"/>
+            </a:solidFill>
+          </a:ln>
+        </p:spPr>
+        <p:style>
+          <a:lnRef idx="2">
+            <a:schemeClr val="accent1">
+              <a:shade val="50000"/>
+            </a:schemeClr>
+          </a:lnRef>
+          <a:fillRef idx="1">
+            <a:schemeClr val="accent1"/>
+          </a:fillRef>
+          <a:effectRef idx="0">
+            <a:schemeClr val="accent1"/>
+          </a:effectRef>
+          <a:fontRef idx="minor">
+            <a:schemeClr val="lt1"/>
+          </a:fontRef>
+        </p:style>
+        <p:txBody>
+          <a:bodyPr rtlCol="0" anchor="ctr"/>
+          <a:lstStyle/>
+          <a:p>
+            <a:pPr algn="ctr"/>
+            <a:endParaRPr lang="fr-FR"/>
+          </a:p>
+        </p:txBody>
+      </p:sp>
+      <p:sp>
+        <p:nvSpPr>
+          <p:cNvPr id="11" name="ZoneTexte 10">
+            <a:extLst>
+              <a:ext uri="{FF2B5EF4-FFF2-40B4-BE49-F238E27FC236}">
+                <a16:creationId xmlns:a16="http://schemas.microsoft.com/office/drawing/2014/main" id="{470680A5-31CA-4A5F-A91F-7E3BEF289E7E}"/>
+              </a:ext>
+            </a:extLst>
+          </p:cNvPr>
+          <p:cNvSpPr txBox="1"/>
+          <p:nvPr/>
+        </p:nvSpPr>
+        <p:spPr>
+          <a:xfrm>
+            <a:off x="10299143" y="558449"/>
+            <a:ext cx="1129785" cy="461665"/>
+          </a:xfrm>
+          <a:prstGeom prst="rect">
+            <a:avLst/>
+          </a:prstGeom>
+          <a:noFill/>
+        </p:spPr>
+        <p:txBody>
+          <a:bodyPr wrap="square" rtlCol="0">
+            <a:spAutoFit/>
+          </a:bodyPr>
+          <a:lstStyle/>
+          <a:p>
+            <a:pPr algn="r"/>
+            <a:r>
+              <a:rPr lang="fr-FR" sz="1200" dirty="0">
                 <a:latin typeface="Eras Medium ITC" panose="020B0602030504020804" pitchFamily="34" charset="0"/>
               </a:rPr>
-              <a:t>:</a:t>
-            </a:r>
+              <a:t>Présentation du projet</a:t>
+            </a:r>
+          </a:p>
+        </p:txBody>
+      </p:sp>
+      <p:sp>
+        <p:nvSpPr>
+          <p:cNvPr id="12" name="ZoneTexte 11">
+            <a:extLst>
+              <a:ext uri="{FF2B5EF4-FFF2-40B4-BE49-F238E27FC236}">
+                <a16:creationId xmlns:a16="http://schemas.microsoft.com/office/drawing/2014/main" id="{118F324A-9355-4439-8D28-46B0B893CC58}"/>
+              </a:ext>
+            </a:extLst>
+          </p:cNvPr>
+          <p:cNvSpPr txBox="1"/>
+          <p:nvPr/>
+        </p:nvSpPr>
+        <p:spPr>
+          <a:xfrm>
+            <a:off x="10275329" y="1418837"/>
+            <a:ext cx="1129785" cy="276999"/>
+          </a:xfrm>
+          <a:prstGeom prst="rect">
+            <a:avLst/>
+          </a:prstGeom>
+          <a:noFill/>
+        </p:spPr>
+        <p:txBody>
+          <a:bodyPr wrap="square" rtlCol="0">
+            <a:spAutoFit/>
+          </a:bodyPr>
+          <a:lstStyle/>
+          <a:p>
+            <a:pPr algn="r"/>
+            <a:r>
+              <a:rPr lang="fr-FR" sz="1200" dirty="0">
+                <a:latin typeface="Eras Medium ITC" panose="020B0602030504020804" pitchFamily="34" charset="0"/>
+              </a:rPr>
+              <a:t>Générale</a:t>
+            </a:r>
+          </a:p>
+        </p:txBody>
+      </p:sp>
+      <p:sp>
+        <p:nvSpPr>
+          <p:cNvPr id="13" name="ZoneTexte 12">
+            <a:extLst>
+              <a:ext uri="{FF2B5EF4-FFF2-40B4-BE49-F238E27FC236}">
+                <a16:creationId xmlns:a16="http://schemas.microsoft.com/office/drawing/2014/main" id="{B0B65B09-BAE9-45E1-8DDD-BE198E82EA10}"/>
+              </a:ext>
+            </a:extLst>
+          </p:cNvPr>
+          <p:cNvSpPr txBox="1"/>
+          <p:nvPr/>
+        </p:nvSpPr>
+        <p:spPr>
+          <a:xfrm>
+            <a:off x="10310812" y="2252186"/>
+            <a:ext cx="1129785" cy="276999"/>
+          </a:xfrm>
+          <a:prstGeom prst="rect">
+            <a:avLst/>
+          </a:prstGeom>
+          <a:noFill/>
+        </p:spPr>
+        <p:txBody>
+          <a:bodyPr wrap="square" rtlCol="0">
+            <a:spAutoFit/>
+          </a:bodyPr>
+          <a:lstStyle/>
+          <a:p>
+            <a:pPr algn="r"/>
+            <a:r>
+              <a:rPr lang="fr-FR" sz="1200" dirty="0">
+                <a:latin typeface="Eras Medium ITC" panose="020B0602030504020804" pitchFamily="34" charset="0"/>
+              </a:rPr>
+              <a:t>Personnalisée</a:t>
+            </a:r>
+          </a:p>
+        </p:txBody>
+      </p:sp>
+      <p:sp>
+        <p:nvSpPr>
+          <p:cNvPr id="14" name="ZoneTexte 13">
+            <a:extLst>
+              <a:ext uri="{FF2B5EF4-FFF2-40B4-BE49-F238E27FC236}">
+                <a16:creationId xmlns:a16="http://schemas.microsoft.com/office/drawing/2014/main" id="{B5E860DF-2164-46BA-A256-EAAC919881DC}"/>
+              </a:ext>
+            </a:extLst>
+          </p:cNvPr>
+          <p:cNvSpPr txBox="1"/>
+          <p:nvPr/>
+        </p:nvSpPr>
+        <p:spPr>
+          <a:xfrm>
+            <a:off x="10113406" y="3241822"/>
+            <a:ext cx="1315522" cy="461665"/>
+          </a:xfrm>
+          <a:prstGeom prst="rect">
+            <a:avLst/>
+          </a:prstGeom>
+          <a:noFill/>
+        </p:spPr>
+        <p:txBody>
+          <a:bodyPr wrap="square" rtlCol="0">
+            <a:spAutoFit/>
+          </a:bodyPr>
+          <a:lstStyle/>
+          <a:p>
+            <a:pPr algn="r"/>
+            <a:r>
+              <a:rPr lang="fr-FR" sz="1200" dirty="0">
+                <a:latin typeface="Eras Medium ITC" panose="020B0602030504020804" pitchFamily="34" charset="0"/>
+              </a:rPr>
+              <a:t>Diagramme de cas d’utilisation</a:t>
+            </a:r>
+          </a:p>
+        </p:txBody>
+      </p:sp>
+      <p:sp>
+        <p:nvSpPr>
+          <p:cNvPr id="15" name="ZoneTexte 14">
+            <a:extLst>
+              <a:ext uri="{FF2B5EF4-FFF2-40B4-BE49-F238E27FC236}">
+                <a16:creationId xmlns:a16="http://schemas.microsoft.com/office/drawing/2014/main" id="{0E549171-6603-40D1-AACC-954D9ECD3358}"/>
+              </a:ext>
+            </a:extLst>
+          </p:cNvPr>
+          <p:cNvSpPr txBox="1"/>
+          <p:nvPr/>
+        </p:nvSpPr>
+        <p:spPr>
+          <a:xfrm>
+            <a:off x="10299143" y="5892329"/>
+            <a:ext cx="1129785" cy="461665"/>
+          </a:xfrm>
+          <a:prstGeom prst="rect">
+            <a:avLst/>
+          </a:prstGeom>
+          <a:noFill/>
+        </p:spPr>
+        <p:txBody>
+          <a:bodyPr wrap="square" rtlCol="0">
+            <a:spAutoFit/>
+          </a:bodyPr>
+          <a:lstStyle/>
+          <a:p>
+            <a:pPr algn="r"/>
+            <a:r>
+              <a:rPr lang="fr-FR" sz="1200" dirty="0">
+                <a:latin typeface="Eras Medium ITC" panose="020B0602030504020804" pitchFamily="34" charset="0"/>
+              </a:rPr>
+              <a:t>Les tâches personnelles</a:t>
+            </a:r>
+          </a:p>
+        </p:txBody>
+      </p:sp>
+      <p:sp>
+        <p:nvSpPr>
+          <p:cNvPr id="16" name="Rectangle 15">
+            <a:extLst>
+              <a:ext uri="{FF2B5EF4-FFF2-40B4-BE49-F238E27FC236}">
+                <a16:creationId xmlns:a16="http://schemas.microsoft.com/office/drawing/2014/main" id="{1D13FD37-1228-4A08-9F72-D32CBA322FEC}"/>
+              </a:ext>
+            </a:extLst>
+          </p:cNvPr>
+          <p:cNvSpPr/>
+          <p:nvPr/>
+        </p:nvSpPr>
+        <p:spPr>
+          <a:xfrm>
+            <a:off x="11658600" y="955383"/>
+            <a:ext cx="104773" cy="2245810"/>
+          </a:xfrm>
+          <a:prstGeom prst="rect">
+            <a:avLst/>
+          </a:prstGeom>
+          <a:solidFill>
+            <a:srgbClr val="A8135A"/>
+          </a:solidFill>
+          <a:ln>
+            <a:solidFill>
+              <a:schemeClr val="bg1"/>
+            </a:solidFill>
+          </a:ln>
+        </p:spPr>
+        <p:style>
+          <a:lnRef idx="2">
+            <a:schemeClr val="accent1">
+              <a:shade val="50000"/>
+            </a:schemeClr>
+          </a:lnRef>
+          <a:fillRef idx="1">
+            <a:schemeClr val="accent1"/>
+          </a:fillRef>
+          <a:effectRef idx="0">
+            <a:schemeClr val="accent1"/>
+          </a:effectRef>
+          <a:fontRef idx="minor">
+            <a:schemeClr val="lt1"/>
+          </a:fontRef>
+        </p:style>
+        <p:txBody>
+          <a:bodyPr rtlCol="0" anchor="ctr"/>
+          <a:lstStyle/>
+          <a:p>
+            <a:pPr algn="ctr"/>
+            <a:endParaRPr lang="fr-FR"/>
+          </a:p>
+        </p:txBody>
+      </p:sp>
+      <p:sp>
+        <p:nvSpPr>
+          <p:cNvPr id="17" name="Ellipse 16">
+            <a:extLst>
+              <a:ext uri="{FF2B5EF4-FFF2-40B4-BE49-F238E27FC236}">
+                <a16:creationId xmlns:a16="http://schemas.microsoft.com/office/drawing/2014/main" id="{9F704096-5C9D-41FD-B6A4-68CA21735651}"/>
+              </a:ext>
+            </a:extLst>
+          </p:cNvPr>
+          <p:cNvSpPr/>
+          <p:nvPr/>
+        </p:nvSpPr>
+        <p:spPr>
+          <a:xfrm>
+            <a:off x="11428928" y="550687"/>
+            <a:ext cx="564118" cy="542925"/>
+          </a:xfrm>
+          <a:prstGeom prst="ellipse">
+            <a:avLst/>
+          </a:prstGeom>
+          <a:solidFill>
+            <a:srgbClr val="A8135A"/>
+          </a:solidFill>
+          <a:ln>
+            <a:solidFill>
+              <a:schemeClr val="bg1"/>
+            </a:solidFill>
+          </a:ln>
+        </p:spPr>
+        <p:style>
+          <a:lnRef idx="2">
+            <a:schemeClr val="accent1">
+              <a:shade val="50000"/>
+            </a:schemeClr>
+          </a:lnRef>
+          <a:fillRef idx="1">
+            <a:schemeClr val="accent1"/>
+          </a:fillRef>
+          <a:effectRef idx="0">
+            <a:schemeClr val="accent1"/>
+          </a:effectRef>
+          <a:fontRef idx="minor">
+            <a:schemeClr val="lt1"/>
+          </a:fontRef>
+        </p:style>
+        <p:txBody>
+          <a:bodyPr rtlCol="0" anchor="ctr"/>
+          <a:lstStyle/>
+          <a:p>
+            <a:pPr algn="ctr"/>
+            <a:endParaRPr lang="fr-FR"/>
+          </a:p>
+        </p:txBody>
+      </p:sp>
+      <p:sp>
+        <p:nvSpPr>
+          <p:cNvPr id="8" name="Ellipse 7">
+            <a:extLst>
+              <a:ext uri="{FF2B5EF4-FFF2-40B4-BE49-F238E27FC236}">
+                <a16:creationId xmlns:a16="http://schemas.microsoft.com/office/drawing/2014/main" id="{527A32BE-E971-4F22-BE27-E8B13A47BF8B}"/>
+              </a:ext>
+            </a:extLst>
+          </p:cNvPr>
+          <p:cNvSpPr/>
+          <p:nvPr/>
+        </p:nvSpPr>
+        <p:spPr>
+          <a:xfrm>
+            <a:off x="11428928" y="3201193"/>
+            <a:ext cx="564118" cy="542925"/>
+          </a:xfrm>
+          <a:prstGeom prst="ellipse">
+            <a:avLst/>
+          </a:prstGeom>
+          <a:solidFill>
+            <a:srgbClr val="A8135A"/>
+          </a:solidFill>
+          <a:ln>
+            <a:solidFill>
+              <a:schemeClr val="bg1"/>
+            </a:solidFill>
+          </a:ln>
+        </p:spPr>
+        <p:style>
+          <a:lnRef idx="2">
+            <a:schemeClr val="accent1">
+              <a:shade val="50000"/>
+            </a:schemeClr>
+          </a:lnRef>
+          <a:fillRef idx="1">
+            <a:schemeClr val="accent1"/>
+          </a:fillRef>
+          <a:effectRef idx="0">
+            <a:schemeClr val="accent1"/>
+          </a:effectRef>
+          <a:fontRef idx="minor">
+            <a:schemeClr val="lt1"/>
+          </a:fontRef>
+        </p:style>
+        <p:txBody>
+          <a:bodyPr rtlCol="0" anchor="ctr"/>
+          <a:lstStyle/>
+          <a:p>
+            <a:pPr algn="ctr"/>
+            <a:endParaRPr lang="fr-FR"/>
           </a:p>
         </p:txBody>
       </p:sp>
       <p:pic>
         <p:nvPicPr>
-          <p:cNvPr id="6" name="Image 5" descr="Une image contenant capture d’écran&#10;&#10;Description générée automatiquement">
-            <a:extLst>
-              <a:ext uri="{FF2B5EF4-FFF2-40B4-BE49-F238E27FC236}">
-                <a16:creationId xmlns:a16="http://schemas.microsoft.com/office/drawing/2014/main" id="{612B15C4-79FA-4966-8D88-BD60FB5BE23E}"/>
+          <p:cNvPr id="4" name="Image 3" descr="Une image contenant capture d’écran&#10;&#10;Description générée automatiquement">
+            <a:extLst>
+              <a:ext uri="{FF2B5EF4-FFF2-40B4-BE49-F238E27FC236}">
+                <a16:creationId xmlns:a16="http://schemas.microsoft.com/office/drawing/2014/main" id="{54B866ED-4CFF-44BC-9BA8-DD16A9967414}"/>
               </a:ext>
             </a:extLst>
           </p:cNvPr>
@@ -10519,76 +11079,25 @@
           </p:cNvPicPr>
           <p:nvPr/>
         </p:nvPicPr>
-        <p:blipFill>
+        <p:blipFill rotWithShape="1">
           <a:blip r:embed="rId3"/>
-          <a:stretch>
-            <a:fillRect/>
-          </a:stretch>
+          <a:srcRect l="-781" t="593" r="47706" b="14900"/>
+          <a:stretch/>
         </p:blipFill>
         <p:spPr>
           <a:xfrm>
-            <a:off x="0" y="4248029"/>
-            <a:ext cx="10426390" cy="2013259"/>
+            <a:off x="1919294" y="1220653"/>
+            <a:ext cx="5615362" cy="5659756"/>
           </a:xfrm>
           <a:prstGeom prst="rect">
             <a:avLst/>
           </a:prstGeom>
-          <a:ln>
-            <a:noFill/>
-          </a:ln>
-          <a:effectLst>
-            <a:outerShdw blurRad="292100" dist="139700" dir="2700000" algn="tl" rotWithShape="0">
-              <a:srgbClr val="333333">
-                <a:alpha val="65000"/>
-              </a:srgbClr>
-            </a:outerShdw>
-          </a:effectLst>
-        </p:spPr>
-      </p:pic>
-      <p:pic>
-        <p:nvPicPr>
-          <p:cNvPr id="9" name="Image 8" descr="Une image contenant capture d’écran, ordinateur&#10;&#10;Description générée automatiquement">
-            <a:extLst>
-              <a:ext uri="{FF2B5EF4-FFF2-40B4-BE49-F238E27FC236}">
-                <a16:creationId xmlns:a16="http://schemas.microsoft.com/office/drawing/2014/main" id="{FA1C4999-4C72-456A-BFF1-A458813D70F4}"/>
-              </a:ext>
-            </a:extLst>
-          </p:cNvPr>
-          <p:cNvPicPr>
-            <a:picLocks noChangeAspect="1"/>
-          </p:cNvPicPr>
-          <p:nvPr/>
-        </p:nvPicPr>
-        <p:blipFill>
-          <a:blip r:embed="rId4"/>
-          <a:stretch>
-            <a:fillRect/>
-          </a:stretch>
-        </p:blipFill>
-        <p:spPr>
-          <a:xfrm>
-            <a:off x="0" y="1442053"/>
-            <a:ext cx="10426390" cy="2335835"/>
-          </a:xfrm>
-          <a:prstGeom prst="rect">
-            <a:avLst/>
-          </a:prstGeom>
-          <a:ln>
-            <a:noFill/>
-          </a:ln>
-          <a:effectLst>
-            <a:outerShdw blurRad="292100" dist="139700" dir="2700000" algn="tl" rotWithShape="0">
-              <a:srgbClr val="333333">
-                <a:alpha val="65000"/>
-              </a:srgbClr>
-            </a:outerShdw>
-          </a:effectLst>
         </p:spPr>
       </p:pic>
     </p:spTree>
     <p:extLst>
       <p:ext uri="{BB962C8B-B14F-4D97-AF65-F5344CB8AC3E}">
-        <p14:creationId xmlns:p14="http://schemas.microsoft.com/office/powerpoint/2010/main" val="779748466"/>
+        <p14:creationId xmlns:p14="http://schemas.microsoft.com/office/powerpoint/2010/main" val="793625063"/>
       </p:ext>
     </p:extLst>
   </p:cSld>
@@ -10674,10 +11183,10 @@
       </p:pic>
       <p:sp>
         <p:nvSpPr>
-          <p:cNvPr id="3" name="ZoneTexte 2">
-            <a:extLst>
-              <a:ext uri="{FF2B5EF4-FFF2-40B4-BE49-F238E27FC236}">
-                <a16:creationId xmlns:a16="http://schemas.microsoft.com/office/drawing/2014/main" id="{1582123C-25BF-42F1-97F8-35FFB48DFFAA}"/>
+          <p:cNvPr id="2" name="ZoneTexte 1">
+            <a:extLst>
+              <a:ext uri="{FF2B5EF4-FFF2-40B4-BE49-F238E27FC236}">
+                <a16:creationId xmlns:a16="http://schemas.microsoft.com/office/drawing/2014/main" id="{144597CC-5B36-42C7-952E-C2CE1E34CACD}"/>
               </a:ext>
             </a:extLst>
           </p:cNvPr>
@@ -10686,43 +11195,13 @@
         </p:nvSpPr>
         <p:spPr>
           <a:xfrm>
-            <a:off x="2477079" y="168260"/>
-            <a:ext cx="6848856" cy="584775"/>
+            <a:off x="2587752" y="143435"/>
+            <a:ext cx="6437376" cy="646331"/>
           </a:xfrm>
           <a:prstGeom prst="rect">
             <a:avLst/>
           </a:prstGeom>
           <a:noFill/>
-          <a:ln>
-            <a:noFill/>
-          </a:ln>
-          <a:effectLst>
-            <a:glow rad="63500">
-              <a:schemeClr val="accent4">
-                <a:satMod val="175000"/>
-                <a:alpha val="40000"/>
-              </a:schemeClr>
-            </a:glow>
-            <a:outerShdw blurRad="50800" dist="38100" dir="5400000" algn="t" rotWithShape="0">
-              <a:prstClr val="black">
-                <a:alpha val="40000"/>
-              </a:prstClr>
-            </a:outerShdw>
-          </a:effectLst>
-          <a:scene3d>
-            <a:camera prst="orthographicFront">
-              <a:rot lat="0" lon="0" rev="0"/>
-            </a:camera>
-            <a:lightRig rig="soft" dir="t">
-              <a:rot lat="0" lon="0" rev="0"/>
-            </a:lightRig>
-          </a:scene3d>
-          <a:sp3d contourW="44450" prstMaterial="matte">
-            <a:bevelT w="63500" h="63500" prst="artDeco"/>
-            <a:contourClr>
-              <a:srgbClr val="FFFFFF"/>
-            </a:contourClr>
-          </a:sp3d>
         </p:spPr>
         <p:txBody>
           <a:bodyPr wrap="square" rtlCol="0">
@@ -10732,35 +11211,611 @@
           <a:p>
             <a:pPr algn="ctr"/>
             <a:r>
-              <a:rPr lang="fr-FR" sz="3200" b="1" dirty="0">
+              <a:rPr lang="fr-FR" sz="3600" b="1" dirty="0">
+                <a:effectLst>
+                  <a:outerShdw blurRad="38100" dist="38100" dir="2700000" algn="tl">
+                    <a:srgbClr val="000000">
+                      <a:alpha val="43137"/>
+                    </a:srgbClr>
+                  </a:outerShdw>
+                </a:effectLst>
                 <a:latin typeface="Eras Medium ITC" panose="020B0602030504020804" pitchFamily="34" charset="0"/>
               </a:rPr>
-              <a:t>Planification Gantt - </a:t>
-            </a:r>
-            <a:r>
-              <a:rPr lang="fr-FR" sz="2800" b="1" dirty="0">
+              <a:t>Diagramme de </a:t>
+            </a:r>
+            <a:r>
+              <a:rPr lang="fr-FR" sz="3600" b="1" dirty="0">
                 <a:solidFill>
-                  <a:srgbClr val="A41258"/>
+                  <a:srgbClr val="A51258"/>
                 </a:solidFill>
+                <a:effectLst>
+                  <a:outerShdw blurRad="38100" dist="38100" dir="2700000" algn="tl">
+                    <a:srgbClr val="000000">
+                      <a:alpha val="43137"/>
+                    </a:srgbClr>
+                  </a:outerShdw>
+                </a:effectLst>
                 <a:latin typeface="Eras Medium ITC" panose="020B0602030504020804" pitchFamily="34" charset="0"/>
               </a:rPr>
-              <a:t>Partie personnelle </a:t>
-            </a:r>
-            <a:r>
-              <a:rPr lang="fr-FR" sz="2800" b="1" dirty="0">
+              <a:t>Classes</a:t>
+            </a:r>
+          </a:p>
+        </p:txBody>
+      </p:sp>
+      <p:sp>
+        <p:nvSpPr>
+          <p:cNvPr id="6" name="Organigramme : Terminateur 5">
+            <a:extLst>
+              <a:ext uri="{FF2B5EF4-FFF2-40B4-BE49-F238E27FC236}">
+                <a16:creationId xmlns:a16="http://schemas.microsoft.com/office/drawing/2014/main" id="{D0388349-375C-432D-95E5-4335229F72C4}"/>
+              </a:ext>
+            </a:extLst>
+          </p:cNvPr>
+          <p:cNvSpPr/>
+          <p:nvPr/>
+        </p:nvSpPr>
+        <p:spPr>
+          <a:xfrm>
+            <a:off x="11405115" y="1514475"/>
+            <a:ext cx="358260" cy="85725"/>
+          </a:xfrm>
+          <a:prstGeom prst="flowChartTerminator">
+            <a:avLst/>
+          </a:prstGeom>
+          <a:solidFill>
+            <a:srgbClr val="A8135A"/>
+          </a:solidFill>
+          <a:ln>
+            <a:solidFill>
+              <a:schemeClr val="bg1"/>
+            </a:solidFill>
+          </a:ln>
+        </p:spPr>
+        <p:style>
+          <a:lnRef idx="2">
+            <a:schemeClr val="accent1">
+              <a:shade val="50000"/>
+            </a:schemeClr>
+          </a:lnRef>
+          <a:fillRef idx="1">
+            <a:schemeClr val="accent1"/>
+          </a:fillRef>
+          <a:effectRef idx="0">
+            <a:schemeClr val="accent1"/>
+          </a:effectRef>
+          <a:fontRef idx="minor">
+            <a:schemeClr val="lt1"/>
+          </a:fontRef>
+        </p:style>
+        <p:txBody>
+          <a:bodyPr rtlCol="0" anchor="ctr"/>
+          <a:lstStyle/>
+          <a:p>
+            <a:pPr algn="ctr"/>
+            <a:endParaRPr lang="fr-FR"/>
+          </a:p>
+        </p:txBody>
+      </p:sp>
+      <p:sp>
+        <p:nvSpPr>
+          <p:cNvPr id="7" name="Rectangle 6">
+            <a:extLst>
+              <a:ext uri="{FF2B5EF4-FFF2-40B4-BE49-F238E27FC236}">
+                <a16:creationId xmlns:a16="http://schemas.microsoft.com/office/drawing/2014/main" id="{7965C92B-62A3-4F91-80E9-84A7357D8ED7}"/>
+              </a:ext>
+            </a:extLst>
+          </p:cNvPr>
+          <p:cNvSpPr/>
+          <p:nvPr/>
+        </p:nvSpPr>
+        <p:spPr>
+          <a:xfrm>
+            <a:off x="11658600" y="753035"/>
+            <a:ext cx="104775" cy="5614778"/>
+          </a:xfrm>
+          <a:prstGeom prst="rect">
+            <a:avLst/>
+          </a:prstGeom>
+          <a:solidFill>
+            <a:schemeClr val="bg1"/>
+          </a:solidFill>
+          <a:ln>
+            <a:solidFill>
+              <a:schemeClr val="bg1"/>
+            </a:solidFill>
+          </a:ln>
+        </p:spPr>
+        <p:style>
+          <a:lnRef idx="2">
+            <a:schemeClr val="accent1">
+              <a:shade val="50000"/>
+            </a:schemeClr>
+          </a:lnRef>
+          <a:fillRef idx="1">
+            <a:schemeClr val="accent1"/>
+          </a:fillRef>
+          <a:effectRef idx="0">
+            <a:schemeClr val="accent1"/>
+          </a:effectRef>
+          <a:fontRef idx="minor">
+            <a:schemeClr val="lt1"/>
+          </a:fontRef>
+        </p:style>
+        <p:txBody>
+          <a:bodyPr rtlCol="0" anchor="ctr"/>
+          <a:lstStyle/>
+          <a:p>
+            <a:pPr algn="ctr"/>
+            <a:endParaRPr lang="fr-FR"/>
+          </a:p>
+        </p:txBody>
+      </p:sp>
+      <p:sp>
+        <p:nvSpPr>
+          <p:cNvPr id="9" name="Ellipse 8">
+            <a:extLst>
+              <a:ext uri="{FF2B5EF4-FFF2-40B4-BE49-F238E27FC236}">
+                <a16:creationId xmlns:a16="http://schemas.microsoft.com/office/drawing/2014/main" id="{76D06B21-1630-4698-BFB5-5F24222D7239}"/>
+              </a:ext>
+            </a:extLst>
+          </p:cNvPr>
+          <p:cNvSpPr/>
+          <p:nvPr/>
+        </p:nvSpPr>
+        <p:spPr>
+          <a:xfrm>
+            <a:off x="11428928" y="5851700"/>
+            <a:ext cx="564118" cy="542925"/>
+          </a:xfrm>
+          <a:prstGeom prst="ellipse">
+            <a:avLst/>
+          </a:prstGeom>
+          <a:solidFill>
+            <a:schemeClr val="bg1"/>
+          </a:solidFill>
+          <a:ln>
+            <a:solidFill>
+              <a:schemeClr val="bg1"/>
+            </a:solidFill>
+          </a:ln>
+        </p:spPr>
+        <p:style>
+          <a:lnRef idx="2">
+            <a:schemeClr val="accent1">
+              <a:shade val="50000"/>
+            </a:schemeClr>
+          </a:lnRef>
+          <a:fillRef idx="1">
+            <a:schemeClr val="accent1"/>
+          </a:fillRef>
+          <a:effectRef idx="0">
+            <a:schemeClr val="accent1"/>
+          </a:effectRef>
+          <a:fontRef idx="minor">
+            <a:schemeClr val="lt1"/>
+          </a:fontRef>
+        </p:style>
+        <p:txBody>
+          <a:bodyPr rtlCol="0" anchor="ctr"/>
+          <a:lstStyle/>
+          <a:p>
+            <a:pPr algn="ctr"/>
+            <a:endParaRPr lang="fr-FR"/>
+          </a:p>
+        </p:txBody>
+      </p:sp>
+      <p:sp>
+        <p:nvSpPr>
+          <p:cNvPr id="10" name="Organigramme : Terminateur 9">
+            <a:extLst>
+              <a:ext uri="{FF2B5EF4-FFF2-40B4-BE49-F238E27FC236}">
+                <a16:creationId xmlns:a16="http://schemas.microsoft.com/office/drawing/2014/main" id="{CB8C87E6-B87B-4E15-81CC-6DBA23DB12CA}"/>
+              </a:ext>
+            </a:extLst>
+          </p:cNvPr>
+          <p:cNvSpPr/>
+          <p:nvPr/>
+        </p:nvSpPr>
+        <p:spPr>
+          <a:xfrm>
+            <a:off x="11405114" y="2347824"/>
+            <a:ext cx="358259" cy="85725"/>
+          </a:xfrm>
+          <a:prstGeom prst="flowChartTerminator">
+            <a:avLst/>
+          </a:prstGeom>
+          <a:solidFill>
+            <a:srgbClr val="A8135A"/>
+          </a:solidFill>
+          <a:ln>
+            <a:solidFill>
+              <a:schemeClr val="bg1"/>
+            </a:solidFill>
+          </a:ln>
+        </p:spPr>
+        <p:style>
+          <a:lnRef idx="2">
+            <a:schemeClr val="accent1">
+              <a:shade val="50000"/>
+            </a:schemeClr>
+          </a:lnRef>
+          <a:fillRef idx="1">
+            <a:schemeClr val="accent1"/>
+          </a:fillRef>
+          <a:effectRef idx="0">
+            <a:schemeClr val="accent1"/>
+          </a:effectRef>
+          <a:fontRef idx="minor">
+            <a:schemeClr val="lt1"/>
+          </a:fontRef>
+        </p:style>
+        <p:txBody>
+          <a:bodyPr rtlCol="0" anchor="ctr"/>
+          <a:lstStyle/>
+          <a:p>
+            <a:pPr algn="ctr"/>
+            <a:endParaRPr lang="fr-FR"/>
+          </a:p>
+        </p:txBody>
+      </p:sp>
+      <p:sp>
+        <p:nvSpPr>
+          <p:cNvPr id="11" name="ZoneTexte 10">
+            <a:extLst>
+              <a:ext uri="{FF2B5EF4-FFF2-40B4-BE49-F238E27FC236}">
+                <a16:creationId xmlns:a16="http://schemas.microsoft.com/office/drawing/2014/main" id="{470680A5-31CA-4A5F-A91F-7E3BEF289E7E}"/>
+              </a:ext>
+            </a:extLst>
+          </p:cNvPr>
+          <p:cNvSpPr txBox="1"/>
+          <p:nvPr/>
+        </p:nvSpPr>
+        <p:spPr>
+          <a:xfrm>
+            <a:off x="10299143" y="558449"/>
+            <a:ext cx="1129785" cy="461665"/>
+          </a:xfrm>
+          <a:prstGeom prst="rect">
+            <a:avLst/>
+          </a:prstGeom>
+          <a:noFill/>
+        </p:spPr>
+        <p:txBody>
+          <a:bodyPr wrap="square" rtlCol="0">
+            <a:spAutoFit/>
+          </a:bodyPr>
+          <a:lstStyle/>
+          <a:p>
+            <a:pPr algn="r"/>
+            <a:r>
+              <a:rPr lang="fr-FR" sz="1200" dirty="0">
                 <a:latin typeface="Eras Medium ITC" panose="020B0602030504020804" pitchFamily="34" charset="0"/>
               </a:rPr>
-              <a:t>:</a:t>
-            </a:r>
+              <a:t>Présentation du projet</a:t>
+            </a:r>
+          </a:p>
+        </p:txBody>
+      </p:sp>
+      <p:sp>
+        <p:nvSpPr>
+          <p:cNvPr id="12" name="ZoneTexte 11">
+            <a:extLst>
+              <a:ext uri="{FF2B5EF4-FFF2-40B4-BE49-F238E27FC236}">
+                <a16:creationId xmlns:a16="http://schemas.microsoft.com/office/drawing/2014/main" id="{118F324A-9355-4439-8D28-46B0B893CC58}"/>
+              </a:ext>
+            </a:extLst>
+          </p:cNvPr>
+          <p:cNvSpPr txBox="1"/>
+          <p:nvPr/>
+        </p:nvSpPr>
+        <p:spPr>
+          <a:xfrm>
+            <a:off x="10275329" y="1418837"/>
+            <a:ext cx="1129785" cy="276999"/>
+          </a:xfrm>
+          <a:prstGeom prst="rect">
+            <a:avLst/>
+          </a:prstGeom>
+          <a:noFill/>
+        </p:spPr>
+        <p:txBody>
+          <a:bodyPr wrap="square" rtlCol="0">
+            <a:spAutoFit/>
+          </a:bodyPr>
+          <a:lstStyle/>
+          <a:p>
+            <a:pPr algn="r"/>
+            <a:r>
+              <a:rPr lang="fr-FR" sz="1200" dirty="0">
+                <a:latin typeface="Eras Medium ITC" panose="020B0602030504020804" pitchFamily="34" charset="0"/>
+              </a:rPr>
+              <a:t>Générale</a:t>
+            </a:r>
+          </a:p>
+        </p:txBody>
+      </p:sp>
+      <p:sp>
+        <p:nvSpPr>
+          <p:cNvPr id="13" name="ZoneTexte 12">
+            <a:extLst>
+              <a:ext uri="{FF2B5EF4-FFF2-40B4-BE49-F238E27FC236}">
+                <a16:creationId xmlns:a16="http://schemas.microsoft.com/office/drawing/2014/main" id="{B0B65B09-BAE9-45E1-8DDD-BE198E82EA10}"/>
+              </a:ext>
+            </a:extLst>
+          </p:cNvPr>
+          <p:cNvSpPr txBox="1"/>
+          <p:nvPr/>
+        </p:nvSpPr>
+        <p:spPr>
+          <a:xfrm>
+            <a:off x="10310812" y="2252186"/>
+            <a:ext cx="1129785" cy="276999"/>
+          </a:xfrm>
+          <a:prstGeom prst="rect">
+            <a:avLst/>
+          </a:prstGeom>
+          <a:noFill/>
+        </p:spPr>
+        <p:txBody>
+          <a:bodyPr wrap="square" rtlCol="0">
+            <a:spAutoFit/>
+          </a:bodyPr>
+          <a:lstStyle/>
+          <a:p>
+            <a:pPr algn="r"/>
+            <a:r>
+              <a:rPr lang="fr-FR" sz="1200" dirty="0">
+                <a:latin typeface="Eras Medium ITC" panose="020B0602030504020804" pitchFamily="34" charset="0"/>
+              </a:rPr>
+              <a:t>Personnalisée</a:t>
+            </a:r>
+          </a:p>
+        </p:txBody>
+      </p:sp>
+      <p:sp>
+        <p:nvSpPr>
+          <p:cNvPr id="14" name="ZoneTexte 13">
+            <a:extLst>
+              <a:ext uri="{FF2B5EF4-FFF2-40B4-BE49-F238E27FC236}">
+                <a16:creationId xmlns:a16="http://schemas.microsoft.com/office/drawing/2014/main" id="{B5E860DF-2164-46BA-A256-EAAC919881DC}"/>
+              </a:ext>
+            </a:extLst>
+          </p:cNvPr>
+          <p:cNvSpPr txBox="1"/>
+          <p:nvPr/>
+        </p:nvSpPr>
+        <p:spPr>
+          <a:xfrm>
+            <a:off x="10113406" y="3241822"/>
+            <a:ext cx="1315522" cy="461665"/>
+          </a:xfrm>
+          <a:prstGeom prst="rect">
+            <a:avLst/>
+          </a:prstGeom>
+          <a:noFill/>
+        </p:spPr>
+        <p:txBody>
+          <a:bodyPr wrap="square" rtlCol="0">
+            <a:spAutoFit/>
+          </a:bodyPr>
+          <a:lstStyle/>
+          <a:p>
+            <a:pPr algn="r"/>
+            <a:r>
+              <a:rPr lang="fr-FR" sz="1200" dirty="0">
+                <a:latin typeface="Eras Medium ITC" panose="020B0602030504020804" pitchFamily="34" charset="0"/>
+              </a:rPr>
+              <a:t>Diagramme de cas d’utilisation</a:t>
+            </a:r>
+          </a:p>
+        </p:txBody>
+      </p:sp>
+      <p:sp>
+        <p:nvSpPr>
+          <p:cNvPr id="15" name="ZoneTexte 14">
+            <a:extLst>
+              <a:ext uri="{FF2B5EF4-FFF2-40B4-BE49-F238E27FC236}">
+                <a16:creationId xmlns:a16="http://schemas.microsoft.com/office/drawing/2014/main" id="{0E549171-6603-40D1-AACC-954D9ECD3358}"/>
+              </a:ext>
+            </a:extLst>
+          </p:cNvPr>
+          <p:cNvSpPr txBox="1"/>
+          <p:nvPr/>
+        </p:nvSpPr>
+        <p:spPr>
+          <a:xfrm>
+            <a:off x="10299143" y="5892329"/>
+            <a:ext cx="1129785" cy="461665"/>
+          </a:xfrm>
+          <a:prstGeom prst="rect">
+            <a:avLst/>
+          </a:prstGeom>
+          <a:noFill/>
+        </p:spPr>
+        <p:txBody>
+          <a:bodyPr wrap="square" rtlCol="0">
+            <a:spAutoFit/>
+          </a:bodyPr>
+          <a:lstStyle/>
+          <a:p>
+            <a:pPr algn="r"/>
+            <a:r>
+              <a:rPr lang="fr-FR" sz="1200" dirty="0">
+                <a:latin typeface="Eras Medium ITC" panose="020B0602030504020804" pitchFamily="34" charset="0"/>
+              </a:rPr>
+              <a:t>Les tâches personnelles</a:t>
+            </a:r>
+          </a:p>
+        </p:txBody>
+      </p:sp>
+      <p:sp>
+        <p:nvSpPr>
+          <p:cNvPr id="16" name="Rectangle 15">
+            <a:extLst>
+              <a:ext uri="{FF2B5EF4-FFF2-40B4-BE49-F238E27FC236}">
+                <a16:creationId xmlns:a16="http://schemas.microsoft.com/office/drawing/2014/main" id="{1D13FD37-1228-4A08-9F72-D32CBA322FEC}"/>
+              </a:ext>
+            </a:extLst>
+          </p:cNvPr>
+          <p:cNvSpPr/>
+          <p:nvPr/>
+        </p:nvSpPr>
+        <p:spPr>
+          <a:xfrm>
+            <a:off x="11658600" y="955383"/>
+            <a:ext cx="104773" cy="2245810"/>
+          </a:xfrm>
+          <a:prstGeom prst="rect">
+            <a:avLst/>
+          </a:prstGeom>
+          <a:solidFill>
+            <a:srgbClr val="A8135A"/>
+          </a:solidFill>
+          <a:ln>
+            <a:solidFill>
+              <a:schemeClr val="bg1"/>
+            </a:solidFill>
+          </a:ln>
+        </p:spPr>
+        <p:style>
+          <a:lnRef idx="2">
+            <a:schemeClr val="accent1">
+              <a:shade val="50000"/>
+            </a:schemeClr>
+          </a:lnRef>
+          <a:fillRef idx="1">
+            <a:schemeClr val="accent1"/>
+          </a:fillRef>
+          <a:effectRef idx="0">
+            <a:schemeClr val="accent1"/>
+          </a:effectRef>
+          <a:fontRef idx="minor">
+            <a:schemeClr val="lt1"/>
+          </a:fontRef>
+        </p:style>
+        <p:txBody>
+          <a:bodyPr rtlCol="0" anchor="ctr"/>
+          <a:lstStyle/>
+          <a:p>
+            <a:pPr algn="ctr"/>
+            <a:endParaRPr lang="fr-FR"/>
+          </a:p>
+        </p:txBody>
+      </p:sp>
+      <p:sp>
+        <p:nvSpPr>
+          <p:cNvPr id="17" name="Ellipse 16">
+            <a:extLst>
+              <a:ext uri="{FF2B5EF4-FFF2-40B4-BE49-F238E27FC236}">
+                <a16:creationId xmlns:a16="http://schemas.microsoft.com/office/drawing/2014/main" id="{9F704096-5C9D-41FD-B6A4-68CA21735651}"/>
+              </a:ext>
+            </a:extLst>
+          </p:cNvPr>
+          <p:cNvSpPr/>
+          <p:nvPr/>
+        </p:nvSpPr>
+        <p:spPr>
+          <a:xfrm>
+            <a:off x="11428928" y="550687"/>
+            <a:ext cx="564118" cy="542925"/>
+          </a:xfrm>
+          <a:prstGeom prst="ellipse">
+            <a:avLst/>
+          </a:prstGeom>
+          <a:solidFill>
+            <a:srgbClr val="A8135A"/>
+          </a:solidFill>
+          <a:ln>
+            <a:solidFill>
+              <a:schemeClr val="bg1"/>
+            </a:solidFill>
+          </a:ln>
+        </p:spPr>
+        <p:style>
+          <a:lnRef idx="2">
+            <a:schemeClr val="accent1">
+              <a:shade val="50000"/>
+            </a:schemeClr>
+          </a:lnRef>
+          <a:fillRef idx="1">
+            <a:schemeClr val="accent1"/>
+          </a:fillRef>
+          <a:effectRef idx="0">
+            <a:schemeClr val="accent1"/>
+          </a:effectRef>
+          <a:fontRef idx="minor">
+            <a:schemeClr val="lt1"/>
+          </a:fontRef>
+        </p:style>
+        <p:txBody>
+          <a:bodyPr rtlCol="0" anchor="ctr"/>
+          <a:lstStyle/>
+          <a:p>
+            <a:pPr algn="ctr"/>
+            <a:endParaRPr lang="fr-FR"/>
+          </a:p>
+        </p:txBody>
+      </p:sp>
+      <p:sp>
+        <p:nvSpPr>
+          <p:cNvPr id="8" name="Ellipse 7">
+            <a:extLst>
+              <a:ext uri="{FF2B5EF4-FFF2-40B4-BE49-F238E27FC236}">
+                <a16:creationId xmlns:a16="http://schemas.microsoft.com/office/drawing/2014/main" id="{527A32BE-E971-4F22-BE27-E8B13A47BF8B}"/>
+              </a:ext>
+            </a:extLst>
+          </p:cNvPr>
+          <p:cNvSpPr/>
+          <p:nvPr/>
+        </p:nvSpPr>
+        <p:spPr>
+          <a:xfrm>
+            <a:off x="11428928" y="3201193"/>
+            <a:ext cx="564118" cy="542925"/>
+          </a:xfrm>
+          <a:prstGeom prst="ellipse">
+            <a:avLst/>
+          </a:prstGeom>
+          <a:solidFill>
+            <a:srgbClr val="A8135A"/>
+          </a:solidFill>
+          <a:ln>
+            <a:solidFill>
+              <a:schemeClr val="bg1"/>
+            </a:solidFill>
+          </a:ln>
+        </p:spPr>
+        <p:style>
+          <a:lnRef idx="2">
+            <a:schemeClr val="accent1">
+              <a:shade val="50000"/>
+            </a:schemeClr>
+          </a:lnRef>
+          <a:fillRef idx="1">
+            <a:schemeClr val="accent1"/>
+          </a:fillRef>
+          <a:effectRef idx="0">
+            <a:schemeClr val="accent1"/>
+          </a:effectRef>
+          <a:fontRef idx="minor">
+            <a:schemeClr val="lt1"/>
+          </a:fontRef>
+        </p:style>
+        <p:txBody>
+          <a:bodyPr rtlCol="0" anchor="ctr"/>
+          <a:lstStyle/>
+          <a:p>
+            <a:pPr algn="ctr"/>
+            <a:endParaRPr lang="fr-FR"/>
           </a:p>
         </p:txBody>
       </p:sp>
       <p:pic>
         <p:nvPicPr>
-          <p:cNvPr id="4" name="Image 3">
-            <a:extLst>
-              <a:ext uri="{FF2B5EF4-FFF2-40B4-BE49-F238E27FC236}">
-                <a16:creationId xmlns:a16="http://schemas.microsoft.com/office/drawing/2014/main" id="{1F9A3EA9-0811-4B17-BBFD-30A0FB67957A}"/>
+          <p:cNvPr id="5" name="Image 4" descr="Une image contenant capture d’écran&#10;&#10;Description générée automatiquement">
+            <a:extLst>
+              <a:ext uri="{FF2B5EF4-FFF2-40B4-BE49-F238E27FC236}">
+                <a16:creationId xmlns:a16="http://schemas.microsoft.com/office/drawing/2014/main" id="{D927C046-ECF5-41E7-9886-C4626BE4554C}"/>
               </a:ext>
             </a:extLst>
           </p:cNvPr>
@@ -10777,8 +11832,8 @@
         </p:blipFill>
         <p:spPr>
           <a:xfrm>
-            <a:off x="420624" y="822273"/>
-            <a:ext cx="8595602" cy="5867467"/>
+            <a:off x="1343575" y="2002457"/>
+            <a:ext cx="6946533" cy="3115934"/>
           </a:xfrm>
           <a:prstGeom prst="rect">
             <a:avLst/>
@@ -10788,7 +11843,7 @@
     </p:spTree>
     <p:extLst>
       <p:ext uri="{BB962C8B-B14F-4D97-AF65-F5344CB8AC3E}">
-        <p14:creationId xmlns:p14="http://schemas.microsoft.com/office/powerpoint/2010/main" val="1042172690"/>
+        <p14:creationId xmlns:p14="http://schemas.microsoft.com/office/powerpoint/2010/main" val="83879156"/>
       </p:ext>
     </p:extLst>
   </p:cSld>
@@ -10886,8 +11941,8 @@
         </p:nvSpPr>
         <p:spPr>
           <a:xfrm>
-            <a:off x="2477079" y="168260"/>
-            <a:ext cx="6848856" cy="584775"/>
+            <a:off x="2497873" y="143435"/>
+            <a:ext cx="6188927" cy="1138773"/>
           </a:xfrm>
           <a:prstGeom prst="rect">
             <a:avLst/>
@@ -10932,109 +11987,35 @@
           <a:p>
             <a:pPr algn="ctr"/>
             <a:r>
+              <a:rPr lang="fr-FR" sz="3600" b="1" dirty="0">
+                <a:latin typeface="Eras Medium ITC" panose="020B0602030504020804" pitchFamily="34" charset="0"/>
+              </a:rPr>
+              <a:t>Planification Gantt           </a:t>
+            </a:r>
+            <a:r>
               <a:rPr lang="fr-FR" sz="3200" b="1" dirty="0">
                 <a:solidFill>
-                  <a:srgbClr val="A51258"/>
+                  <a:srgbClr val="A41258"/>
                 </a:solidFill>
                 <a:latin typeface="Eras Medium ITC" panose="020B0602030504020804" pitchFamily="34" charset="0"/>
               </a:rPr>
-              <a:t>Librairie</a:t>
-            </a:r>
-            <a:endParaRPr lang="fr-FR" sz="2800" b="1" dirty="0">
-              <a:solidFill>
-                <a:srgbClr val="A51258"/>
-              </a:solidFill>
-              <a:latin typeface="Eras Medium ITC" panose="020B0602030504020804" pitchFamily="34" charset="0"/>
-            </a:endParaRPr>
-          </a:p>
-        </p:txBody>
-      </p:sp>
-      <p:sp>
-        <p:nvSpPr>
-          <p:cNvPr id="5" name="Rectangle 4">
-            <a:extLst>
-              <a:ext uri="{FF2B5EF4-FFF2-40B4-BE49-F238E27FC236}">
-                <a16:creationId xmlns:a16="http://schemas.microsoft.com/office/drawing/2014/main" id="{E8071899-BAB1-4FE1-A456-5AC697088E0D}"/>
-              </a:ext>
-            </a:extLst>
-          </p:cNvPr>
-          <p:cNvSpPr/>
-          <p:nvPr/>
-        </p:nvSpPr>
-        <p:spPr>
-          <a:xfrm>
-            <a:off x="367308" y="1122121"/>
-            <a:ext cx="1850002" cy="752399"/>
-          </a:xfrm>
-          <a:prstGeom prst="rect">
-            <a:avLst/>
-          </a:prstGeom>
-          <a:noFill/>
-          <a:ln w="28575">
-            <a:solidFill>
-              <a:srgbClr val="A51258"/>
-            </a:solidFill>
-          </a:ln>
-          <a:effectLst>
-            <a:glow rad="50800">
-              <a:schemeClr val="tx1"/>
-            </a:glow>
-          </a:effectLst>
-        </p:spPr>
-        <p:style>
-          <a:lnRef idx="2">
-            <a:schemeClr val="accent1">
-              <a:shade val="50000"/>
-            </a:schemeClr>
-          </a:lnRef>
-          <a:fillRef idx="1">
-            <a:schemeClr val="accent1"/>
-          </a:fillRef>
-          <a:effectRef idx="0">
-            <a:schemeClr val="accent1"/>
-          </a:effectRef>
-          <a:fontRef idx="minor">
-            <a:schemeClr val="lt1"/>
-          </a:fontRef>
-        </p:style>
-        <p:txBody>
-          <a:bodyPr rtlCol="0" anchor="ctr"/>
-          <a:lstStyle/>
-          <a:p>
-            <a:pPr algn="ctr"/>
-            <a:r>
-              <a:rPr lang="fr-FR" sz="1200" dirty="0">
-                <a:solidFill>
-                  <a:srgbClr val="A51258"/>
-                </a:solidFill>
+              <a:t>Partie commune </a:t>
+            </a:r>
+            <a:r>
+              <a:rPr lang="fr-FR" sz="3200" b="1" dirty="0">
+                <a:latin typeface="Eras Medium ITC" panose="020B0602030504020804" pitchFamily="34" charset="0"/>
               </a:rPr>
-              <a:t>pi-rc522</a:t>
-            </a:r>
-            <a:r>
-              <a:rPr lang="fr-FR" sz="1200" dirty="0">
-                <a:solidFill>
-                  <a:schemeClr val="tx1"/>
-                </a:solidFill>
-              </a:rPr>
-              <a:t> est une librairie sous </a:t>
-            </a:r>
-            <a:r>
-              <a:rPr lang="fr-FR" sz="1200" dirty="0">
-                <a:solidFill>
-                  <a:srgbClr val="A51258"/>
-                </a:solidFill>
-              </a:rPr>
-              <a:t>licence MIT</a:t>
+              <a:t>:</a:t>
             </a:r>
           </a:p>
         </p:txBody>
       </p:sp>
       <p:pic>
         <p:nvPicPr>
-          <p:cNvPr id="6" name="Image 5" descr="Une image contenant dessin, signe&#10;&#10;Description générée automatiquement">
-            <a:extLst>
-              <a:ext uri="{FF2B5EF4-FFF2-40B4-BE49-F238E27FC236}">
-                <a16:creationId xmlns:a16="http://schemas.microsoft.com/office/drawing/2014/main" id="{1476270C-68DA-4E1A-A34E-FB102FA05834}"/>
+          <p:cNvPr id="6" name="Image 5" descr="Une image contenant capture d’écran&#10;&#10;Description générée automatiquement">
+            <a:extLst>
+              <a:ext uri="{FF2B5EF4-FFF2-40B4-BE49-F238E27FC236}">
+                <a16:creationId xmlns:a16="http://schemas.microsoft.com/office/drawing/2014/main" id="{612B15C4-79FA-4966-8D88-BD60FB5BE23E}"/>
               </a:ext>
             </a:extLst>
           </p:cNvPr>
@@ -11051,71 +12032,30 @@
         </p:blipFill>
         <p:spPr>
           <a:xfrm>
-            <a:off x="3511551" y="944237"/>
-            <a:ext cx="1486846" cy="1108165"/>
+            <a:off x="0" y="4248029"/>
+            <a:ext cx="10426390" cy="2013259"/>
           </a:xfrm>
           <a:prstGeom prst="rect">
             <a:avLst/>
           </a:prstGeom>
-        </p:spPr>
-      </p:pic>
-      <p:cxnSp>
-        <p:nvCxnSpPr>
-          <p:cNvPr id="8" name="Connecteur droit avec flèche 7">
-            <a:extLst>
-              <a:ext uri="{FF2B5EF4-FFF2-40B4-BE49-F238E27FC236}">
-                <a16:creationId xmlns:a16="http://schemas.microsoft.com/office/drawing/2014/main" id="{8991D987-C960-4F9B-B5A3-ED2CD4D77C48}"/>
-              </a:ext>
-            </a:extLst>
-          </p:cNvPr>
-          <p:cNvCxnSpPr>
-            <a:cxnSpLocks/>
-            <a:stCxn id="5" idx="3"/>
-            <a:endCxn id="6" idx="1"/>
-          </p:cNvCxnSpPr>
-          <p:nvPr/>
-        </p:nvCxnSpPr>
-        <p:spPr>
-          <a:xfrm flipV="1">
-            <a:off x="2217310" y="1498320"/>
-            <a:ext cx="1294241" cy="1"/>
-          </a:xfrm>
-          <a:prstGeom prst="straightConnector1">
-            <a:avLst/>
-          </a:prstGeom>
-          <a:ln w="38100">
-            <a:solidFill>
-              <a:srgbClr val="A51258"/>
-            </a:solidFill>
-            <a:tailEnd type="triangle"/>
+          <a:ln>
+            <a:noFill/>
           </a:ln>
           <a:effectLst>
-            <a:glow rad="50800">
-              <a:schemeClr val="tx1"/>
-            </a:glow>
+            <a:outerShdw blurRad="292100" dist="139700" dir="2700000" algn="tl" rotWithShape="0">
+              <a:srgbClr val="333333">
+                <a:alpha val="65000"/>
+              </a:srgbClr>
+            </a:outerShdw>
           </a:effectLst>
         </p:spPr>
-        <p:style>
-          <a:lnRef idx="1">
-            <a:schemeClr val="accent1"/>
-          </a:lnRef>
-          <a:fillRef idx="0">
-            <a:schemeClr val="accent1"/>
-          </a:fillRef>
-          <a:effectRef idx="0">
-            <a:schemeClr val="accent1"/>
-          </a:effectRef>
-          <a:fontRef idx="minor">
-            <a:schemeClr val="tx1"/>
-          </a:fontRef>
-        </p:style>
-      </p:cxnSp>
+      </p:pic>
       <p:pic>
         <p:nvPicPr>
-          <p:cNvPr id="19" name="Image 18" descr="Une image contenant moniteur, intérieur, écran, noir&#10;&#10;Description générée automatiquement">
-            <a:extLst>
-              <a:ext uri="{FF2B5EF4-FFF2-40B4-BE49-F238E27FC236}">
-                <a16:creationId xmlns:a16="http://schemas.microsoft.com/office/drawing/2014/main" id="{78013C0C-D50E-4F62-A056-A002A217DCDE}"/>
+          <p:cNvPr id="9" name="Image 8" descr="Une image contenant capture d’écran, ordinateur&#10;&#10;Description générée automatiquement">
+            <a:extLst>
+              <a:ext uri="{FF2B5EF4-FFF2-40B4-BE49-F238E27FC236}">
+                <a16:creationId xmlns:a16="http://schemas.microsoft.com/office/drawing/2014/main" id="{FA1C4999-4C72-456A-BFF1-A458813D70F4}"/>
               </a:ext>
             </a:extLst>
           </p:cNvPr>
@@ -11132,25 +12072,200 @@
         </p:blipFill>
         <p:spPr>
           <a:xfrm>
-            <a:off x="456141" y="4723757"/>
-            <a:ext cx="4041872" cy="2024244"/>
+            <a:off x="0" y="1442053"/>
+            <a:ext cx="10426390" cy="2335835"/>
           </a:xfrm>
           <a:prstGeom prst="rect">
             <a:avLst/>
           </a:prstGeom>
-          <a:ln w="38100">
-            <a:solidFill>
-              <a:srgbClr val="A51258"/>
-            </a:solidFill>
+          <a:ln>
+            <a:noFill/>
           </a:ln>
+          <a:effectLst>
+            <a:outerShdw blurRad="292100" dist="139700" dir="2700000" algn="tl" rotWithShape="0">
+              <a:srgbClr val="333333">
+                <a:alpha val="65000"/>
+              </a:srgbClr>
+            </a:outerShdw>
+          </a:effectLst>
         </p:spPr>
       </p:pic>
+    </p:spTree>
+    <p:extLst>
+      <p:ext uri="{BB962C8B-B14F-4D97-AF65-F5344CB8AC3E}">
+        <p14:creationId xmlns:p14="http://schemas.microsoft.com/office/powerpoint/2010/main" val="779748466"/>
+      </p:ext>
+    </p:extLst>
+  </p:cSld>
+  <p:clrMapOvr>
+    <a:masterClrMapping/>
+  </p:clrMapOvr>
+  <mc:AlternateContent xmlns:mc="http://schemas.openxmlformats.org/markup-compatibility/2006" xmlns:p159="http://schemas.microsoft.com/office/powerpoint/2015/09/main">
+    <mc:Choice Requires="p159">
+      <p:transition xmlns:p14="http://schemas.microsoft.com/office/powerpoint/2010/main" spd="slow" p14:dur="2000">
+        <p159:morph option="byObject"/>
+      </p:transition>
+    </mc:Choice>
+    <mc:Fallback xmlns="">
+      <p:transition spd="slow">
+        <p:fade/>
+      </p:transition>
+    </mc:Fallback>
+  </mc:AlternateContent>
+</p:sld>
+</file>
+
+<file path=ppt/slides/slide16.xml><?xml version="1.0" encoding="utf-8"?>
+<p:sld xmlns:a="http://schemas.openxmlformats.org/drawingml/2006/main" xmlns:r="http://schemas.openxmlformats.org/officeDocument/2006/relationships" xmlns:p="http://schemas.openxmlformats.org/presentationml/2006/main">
+  <p:cSld>
+    <p:spTree>
+      <p:nvGrpSpPr>
+        <p:cNvPr id="1" name=""/>
+        <p:cNvGrpSpPr/>
+        <p:nvPr/>
+      </p:nvGrpSpPr>
+      <p:grpSpPr>
+        <a:xfrm>
+          <a:off x="0" y="0"/>
+          <a:ext cx="0" cy="0"/>
+          <a:chOff x="0" y="0"/>
+          <a:chExt cx="0" cy="0"/>
+        </a:xfrm>
+      </p:grpSpPr>
       <p:pic>
         <p:nvPicPr>
-          <p:cNvPr id="21" name="Image 20">
-            <a:extLst>
-              <a:ext uri="{FF2B5EF4-FFF2-40B4-BE49-F238E27FC236}">
-                <a16:creationId xmlns:a16="http://schemas.microsoft.com/office/drawing/2014/main" id="{900F7095-20DC-455F-BC6B-604E670A9783}"/>
+          <p:cNvPr id="1026" name="Picture 2" descr="Image associée">
+            <a:extLst>
+              <a:ext uri="{FF2B5EF4-FFF2-40B4-BE49-F238E27FC236}">
+                <a16:creationId xmlns:a16="http://schemas.microsoft.com/office/drawing/2014/main" id="{C816F3D8-CC4C-46B3-A21E-58AE9AD30454}"/>
+              </a:ext>
+            </a:extLst>
+          </p:cNvPr>
+          <p:cNvPicPr>
+            <a:picLocks noChangeAspect="1" noChangeArrowheads="1"/>
+          </p:cNvPicPr>
+          <p:nvPr/>
+        </p:nvPicPr>
+        <p:blipFill rotWithShape="1">
+          <a:blip r:embed="rId2">
+            <a:extLst>
+              <a:ext uri="{28A0092B-C50C-407E-A947-70E740481C1C}">
+                <a14:useLocalDpi xmlns:a14="http://schemas.microsoft.com/office/drawing/2010/main" val="0"/>
+              </a:ext>
+            </a:extLst>
+          </a:blip>
+          <a:srcRect l="18677" r="15441"/>
+          <a:stretch/>
+        </p:blipFill>
+        <p:spPr bwMode="auto">
+          <a:xfrm>
+            <a:off x="143436" y="143435"/>
+            <a:ext cx="2269635" cy="609600"/>
+          </a:xfrm>
+          <a:prstGeom prst="rect">
+            <a:avLst/>
+          </a:prstGeom>
+          <a:noFill/>
+          <a:extLst>
+            <a:ext uri="{909E8E84-426E-40DD-AFC4-6F175D3DCCD1}">
+              <a14:hiddenFill xmlns:a14="http://schemas.microsoft.com/office/drawing/2010/main">
+                <a:solidFill>
+                  <a:srgbClr val="FFFFFF"/>
+                </a:solidFill>
+              </a14:hiddenFill>
+            </a:ext>
+          </a:extLst>
+        </p:spPr>
+      </p:pic>
+      <p:sp>
+        <p:nvSpPr>
+          <p:cNvPr id="3" name="ZoneTexte 2">
+            <a:extLst>
+              <a:ext uri="{FF2B5EF4-FFF2-40B4-BE49-F238E27FC236}">
+                <a16:creationId xmlns:a16="http://schemas.microsoft.com/office/drawing/2014/main" id="{1582123C-25BF-42F1-97F8-35FFB48DFFAA}"/>
+              </a:ext>
+            </a:extLst>
+          </p:cNvPr>
+          <p:cNvSpPr txBox="1"/>
+          <p:nvPr/>
+        </p:nvSpPr>
+        <p:spPr>
+          <a:xfrm>
+            <a:off x="2477079" y="168260"/>
+            <a:ext cx="6848856" cy="584775"/>
+          </a:xfrm>
+          <a:prstGeom prst="rect">
+            <a:avLst/>
+          </a:prstGeom>
+          <a:noFill/>
+          <a:ln>
+            <a:noFill/>
+          </a:ln>
+          <a:effectLst>
+            <a:glow rad="63500">
+              <a:schemeClr val="accent4">
+                <a:satMod val="175000"/>
+                <a:alpha val="40000"/>
+              </a:schemeClr>
+            </a:glow>
+            <a:outerShdw blurRad="50800" dist="38100" dir="5400000" algn="t" rotWithShape="0">
+              <a:prstClr val="black">
+                <a:alpha val="40000"/>
+              </a:prstClr>
+            </a:outerShdw>
+          </a:effectLst>
+          <a:scene3d>
+            <a:camera prst="orthographicFront">
+              <a:rot lat="0" lon="0" rev="0"/>
+            </a:camera>
+            <a:lightRig rig="soft" dir="t">
+              <a:rot lat="0" lon="0" rev="0"/>
+            </a:lightRig>
+          </a:scene3d>
+          <a:sp3d contourW="44450" prstMaterial="matte">
+            <a:bevelT w="63500" h="63500" prst="artDeco"/>
+            <a:contourClr>
+              <a:srgbClr val="FFFFFF"/>
+            </a:contourClr>
+          </a:sp3d>
+        </p:spPr>
+        <p:txBody>
+          <a:bodyPr wrap="square" rtlCol="0">
+            <a:spAutoFit/>
+          </a:bodyPr>
+          <a:lstStyle/>
+          <a:p>
+            <a:pPr algn="ctr"/>
+            <a:r>
+              <a:rPr lang="fr-FR" sz="3200" b="1" dirty="0">
+                <a:latin typeface="Eras Medium ITC" panose="020B0602030504020804" pitchFamily="34" charset="0"/>
+              </a:rPr>
+              <a:t>Planification Gantt - </a:t>
+            </a:r>
+            <a:r>
+              <a:rPr lang="fr-FR" sz="2800" b="1" dirty="0">
+                <a:solidFill>
+                  <a:srgbClr val="A41258"/>
+                </a:solidFill>
+                <a:latin typeface="Eras Medium ITC" panose="020B0602030504020804" pitchFamily="34" charset="0"/>
+              </a:rPr>
+              <a:t>Partie personnelle </a:t>
+            </a:r>
+            <a:r>
+              <a:rPr lang="fr-FR" sz="2800" b="1" dirty="0">
+                <a:latin typeface="Eras Medium ITC" panose="020B0602030504020804" pitchFamily="34" charset="0"/>
+              </a:rPr>
+              <a:t>:</a:t>
+            </a:r>
+          </a:p>
+        </p:txBody>
+      </p:sp>
+      <p:pic>
+        <p:nvPicPr>
+          <p:cNvPr id="4" name="Image 3">
+            <a:extLst>
+              <a:ext uri="{FF2B5EF4-FFF2-40B4-BE49-F238E27FC236}">
+                <a16:creationId xmlns:a16="http://schemas.microsoft.com/office/drawing/2014/main" id="{1F9A3EA9-0811-4B17-BBFD-30A0FB67957A}"/>
               </a:ext>
             </a:extLst>
           </p:cNvPr>
@@ -11160,373 +12275,25 @@
           <p:nvPr/>
         </p:nvPicPr>
         <p:blipFill>
-          <a:blip r:embed="rId5"/>
+          <a:blip r:embed="rId3"/>
           <a:stretch>
             <a:fillRect/>
           </a:stretch>
         </p:blipFill>
         <p:spPr>
           <a:xfrm>
-            <a:off x="5269770" y="944237"/>
-            <a:ext cx="4211613" cy="3601135"/>
+            <a:off x="420624" y="822273"/>
+            <a:ext cx="8595602" cy="5867467"/>
           </a:xfrm>
           <a:prstGeom prst="rect">
             <a:avLst/>
           </a:prstGeom>
-          <a:ln w="28575">
-            <a:solidFill>
-              <a:srgbClr val="A51258"/>
-            </a:solidFill>
-          </a:ln>
-          <a:effectLst>
-            <a:glow>
-              <a:schemeClr val="bg1"/>
-            </a:glow>
-          </a:effectLst>
         </p:spPr>
       </p:pic>
-      <p:sp>
-        <p:nvSpPr>
-          <p:cNvPr id="26" name="Rectangle 25">
-            <a:extLst>
-              <a:ext uri="{FF2B5EF4-FFF2-40B4-BE49-F238E27FC236}">
-                <a16:creationId xmlns:a16="http://schemas.microsoft.com/office/drawing/2014/main" id="{8FD411F7-8FA0-48E4-817D-10CB94BCD191}"/>
-              </a:ext>
-            </a:extLst>
-          </p:cNvPr>
-          <p:cNvSpPr/>
-          <p:nvPr/>
-        </p:nvSpPr>
-        <p:spPr>
-          <a:xfrm>
-            <a:off x="6450575" y="5359679"/>
-            <a:ext cx="1850002" cy="752399"/>
-          </a:xfrm>
-          <a:prstGeom prst="rect">
-            <a:avLst/>
-          </a:prstGeom>
-          <a:noFill/>
-          <a:ln w="28575">
-            <a:solidFill>
-              <a:srgbClr val="A51258"/>
-            </a:solidFill>
-          </a:ln>
-          <a:effectLst>
-            <a:glow rad="50800">
-              <a:schemeClr val="tx1"/>
-            </a:glow>
-          </a:effectLst>
-        </p:spPr>
-        <p:style>
-          <a:lnRef idx="2">
-            <a:schemeClr val="accent1">
-              <a:shade val="50000"/>
-            </a:schemeClr>
-          </a:lnRef>
-          <a:fillRef idx="1">
-            <a:schemeClr val="accent1"/>
-          </a:fillRef>
-          <a:effectRef idx="0">
-            <a:schemeClr val="accent1"/>
-          </a:effectRef>
-          <a:fontRef idx="minor">
-            <a:schemeClr val="lt1"/>
-          </a:fontRef>
-        </p:style>
-        <p:txBody>
-          <a:bodyPr rtlCol="0" anchor="ctr"/>
-          <a:lstStyle/>
-          <a:p>
-            <a:pPr algn="ctr"/>
-            <a:r>
-              <a:rPr lang="fr-FR" sz="1200" dirty="0">
-                <a:solidFill>
-                  <a:srgbClr val="A51258"/>
-                </a:solidFill>
-              </a:rPr>
-              <a:t>Exemples</a:t>
-            </a:r>
-          </a:p>
-        </p:txBody>
-      </p:sp>
-      <p:cxnSp>
-        <p:nvCxnSpPr>
-          <p:cNvPr id="27" name="Connecteur droit avec flèche 26">
-            <a:extLst>
-              <a:ext uri="{FF2B5EF4-FFF2-40B4-BE49-F238E27FC236}">
-                <a16:creationId xmlns:a16="http://schemas.microsoft.com/office/drawing/2014/main" id="{9EA8D079-5BB8-4541-BAA5-902C067C3205}"/>
-              </a:ext>
-            </a:extLst>
-          </p:cNvPr>
-          <p:cNvCxnSpPr>
-            <a:cxnSpLocks/>
-            <a:stCxn id="26" idx="0"/>
-            <a:endCxn id="21" idx="2"/>
-          </p:cNvCxnSpPr>
-          <p:nvPr/>
-        </p:nvCxnSpPr>
-        <p:spPr>
-          <a:xfrm flipV="1">
-            <a:off x="7375576" y="4545372"/>
-            <a:ext cx="1" cy="814307"/>
-          </a:xfrm>
-          <a:prstGeom prst="straightConnector1">
-            <a:avLst/>
-          </a:prstGeom>
-          <a:ln w="38100">
-            <a:solidFill>
-              <a:srgbClr val="A51258"/>
-            </a:solidFill>
-            <a:tailEnd type="triangle"/>
-          </a:ln>
-          <a:effectLst>
-            <a:glow rad="50800">
-              <a:schemeClr val="tx1"/>
-            </a:glow>
-          </a:effectLst>
-        </p:spPr>
-        <p:style>
-          <a:lnRef idx="1">
-            <a:schemeClr val="accent1"/>
-          </a:lnRef>
-          <a:fillRef idx="0">
-            <a:schemeClr val="accent1"/>
-          </a:fillRef>
-          <a:effectRef idx="0">
-            <a:schemeClr val="accent1"/>
-          </a:effectRef>
-          <a:fontRef idx="minor">
-            <a:schemeClr val="tx1"/>
-          </a:fontRef>
-        </p:style>
-      </p:cxnSp>
-      <p:cxnSp>
-        <p:nvCxnSpPr>
-          <p:cNvPr id="30" name="Connecteur droit avec flèche 29">
-            <a:extLst>
-              <a:ext uri="{FF2B5EF4-FFF2-40B4-BE49-F238E27FC236}">
-                <a16:creationId xmlns:a16="http://schemas.microsoft.com/office/drawing/2014/main" id="{B1D6E6A8-FC45-4AFC-AAC2-664A3ECDE1DF}"/>
-              </a:ext>
-            </a:extLst>
-          </p:cNvPr>
-          <p:cNvCxnSpPr>
-            <a:cxnSpLocks/>
-            <a:stCxn id="26" idx="1"/>
-            <a:endCxn id="19" idx="3"/>
-          </p:cNvCxnSpPr>
-          <p:nvPr/>
-        </p:nvCxnSpPr>
-        <p:spPr>
-          <a:xfrm flipH="1">
-            <a:off x="4498013" y="5735879"/>
-            <a:ext cx="1952562" cy="0"/>
-          </a:xfrm>
-          <a:prstGeom prst="straightConnector1">
-            <a:avLst/>
-          </a:prstGeom>
-          <a:ln w="38100">
-            <a:solidFill>
-              <a:srgbClr val="A51258"/>
-            </a:solidFill>
-            <a:tailEnd type="triangle"/>
-          </a:ln>
-          <a:effectLst>
-            <a:glow rad="50800">
-              <a:schemeClr val="tx1"/>
-            </a:glow>
-          </a:effectLst>
-        </p:spPr>
-        <p:style>
-          <a:lnRef idx="1">
-            <a:schemeClr val="accent1"/>
-          </a:lnRef>
-          <a:fillRef idx="0">
-            <a:schemeClr val="accent1"/>
-          </a:fillRef>
-          <a:effectRef idx="0">
-            <a:schemeClr val="accent1"/>
-          </a:effectRef>
-          <a:fontRef idx="minor">
-            <a:schemeClr val="tx1"/>
-          </a:fontRef>
-        </p:style>
-      </p:cxnSp>
-      <p:sp>
-        <p:nvSpPr>
-          <p:cNvPr id="34" name="Rectangle 33">
-            <a:extLst>
-              <a:ext uri="{FF2B5EF4-FFF2-40B4-BE49-F238E27FC236}">
-                <a16:creationId xmlns:a16="http://schemas.microsoft.com/office/drawing/2014/main" id="{FE8A38AC-578F-4101-BB2A-5429A32B752B}"/>
-              </a:ext>
-            </a:extLst>
-          </p:cNvPr>
-          <p:cNvSpPr/>
-          <p:nvPr/>
-        </p:nvSpPr>
-        <p:spPr>
-          <a:xfrm>
-            <a:off x="367308" y="2922939"/>
-            <a:ext cx="1850002" cy="752399"/>
-          </a:xfrm>
-          <a:prstGeom prst="rect">
-            <a:avLst/>
-          </a:prstGeom>
-          <a:noFill/>
-          <a:ln w="28575">
-            <a:solidFill>
-              <a:srgbClr val="A51258"/>
-            </a:solidFill>
-          </a:ln>
-          <a:effectLst>
-            <a:glow rad="50800">
-              <a:schemeClr val="tx1"/>
-            </a:glow>
-          </a:effectLst>
-        </p:spPr>
-        <p:style>
-          <a:lnRef idx="2">
-            <a:schemeClr val="accent1">
-              <a:shade val="50000"/>
-            </a:schemeClr>
-          </a:lnRef>
-          <a:fillRef idx="1">
-            <a:schemeClr val="accent1"/>
-          </a:fillRef>
-          <a:effectRef idx="0">
-            <a:schemeClr val="accent1"/>
-          </a:effectRef>
-          <a:fontRef idx="minor">
-            <a:schemeClr val="lt1"/>
-          </a:fontRef>
-        </p:style>
-        <p:txBody>
-          <a:bodyPr rtlCol="0" anchor="ctr"/>
-          <a:lstStyle/>
-          <a:p>
-            <a:pPr algn="ctr"/>
-            <a:r>
-              <a:rPr lang="fr-FR" sz="1200" dirty="0">
-                <a:solidFill>
-                  <a:srgbClr val="A51258"/>
-                </a:solidFill>
-              </a:rPr>
-              <a:t>Facilite </a:t>
-            </a:r>
-            <a:r>
-              <a:rPr lang="fr-FR" sz="1200" dirty="0">
-                <a:solidFill>
-                  <a:schemeClr val="tx1"/>
-                </a:solidFill>
-              </a:rPr>
-              <a:t>l’utilisation des les lecteurs RFID</a:t>
-            </a:r>
-          </a:p>
-        </p:txBody>
-      </p:sp>
-      <p:cxnSp>
-        <p:nvCxnSpPr>
-          <p:cNvPr id="35" name="Connecteur droit avec flèche 34">
-            <a:extLst>
-              <a:ext uri="{FF2B5EF4-FFF2-40B4-BE49-F238E27FC236}">
-                <a16:creationId xmlns:a16="http://schemas.microsoft.com/office/drawing/2014/main" id="{B5957FC1-7DE0-4701-AB56-118B48A89468}"/>
-              </a:ext>
-            </a:extLst>
-          </p:cNvPr>
-          <p:cNvCxnSpPr>
-            <a:cxnSpLocks/>
-            <a:stCxn id="5" idx="2"/>
-            <a:endCxn id="34" idx="0"/>
-          </p:cNvCxnSpPr>
-          <p:nvPr/>
-        </p:nvCxnSpPr>
-        <p:spPr>
-          <a:xfrm>
-            <a:off x="1292309" y="1874520"/>
-            <a:ext cx="0" cy="1048419"/>
-          </a:xfrm>
-          <a:prstGeom prst="straightConnector1">
-            <a:avLst/>
-          </a:prstGeom>
-          <a:ln w="38100">
-            <a:solidFill>
-              <a:srgbClr val="A51258"/>
-            </a:solidFill>
-            <a:tailEnd type="triangle"/>
-          </a:ln>
-          <a:effectLst>
-            <a:glow rad="50800">
-              <a:schemeClr val="tx1"/>
-            </a:glow>
-          </a:effectLst>
-        </p:spPr>
-        <p:style>
-          <a:lnRef idx="1">
-            <a:schemeClr val="accent1"/>
-          </a:lnRef>
-          <a:fillRef idx="0">
-            <a:schemeClr val="accent1"/>
-          </a:fillRef>
-          <a:effectRef idx="0">
-            <a:schemeClr val="accent1"/>
-          </a:effectRef>
-          <a:fontRef idx="minor">
-            <a:schemeClr val="tx1"/>
-          </a:fontRef>
-        </p:style>
-      </p:cxnSp>
-      <p:cxnSp>
-        <p:nvCxnSpPr>
-          <p:cNvPr id="38" name="Connecteur droit avec flèche 37">
-            <a:extLst>
-              <a:ext uri="{FF2B5EF4-FFF2-40B4-BE49-F238E27FC236}">
-                <a16:creationId xmlns:a16="http://schemas.microsoft.com/office/drawing/2014/main" id="{85E766C0-203C-4472-B192-909211381607}"/>
-              </a:ext>
-            </a:extLst>
-          </p:cNvPr>
-          <p:cNvCxnSpPr>
-            <a:cxnSpLocks/>
-          </p:cNvCxnSpPr>
-          <p:nvPr/>
-        </p:nvCxnSpPr>
-        <p:spPr>
-          <a:xfrm>
-            <a:off x="2217310" y="3424390"/>
-            <a:ext cx="4233265" cy="1935289"/>
-          </a:xfrm>
-          <a:prstGeom prst="straightConnector1">
-            <a:avLst/>
-          </a:prstGeom>
-          <a:ln w="38100">
-            <a:solidFill>
-              <a:srgbClr val="A51258"/>
-            </a:solidFill>
-            <a:tailEnd type="triangle"/>
-          </a:ln>
-          <a:effectLst>
-            <a:glow rad="50800">
-              <a:schemeClr val="tx1"/>
-            </a:glow>
-          </a:effectLst>
-        </p:spPr>
-        <p:style>
-          <a:lnRef idx="1">
-            <a:schemeClr val="accent1"/>
-          </a:lnRef>
-          <a:fillRef idx="0">
-            <a:schemeClr val="accent1"/>
-          </a:fillRef>
-          <a:effectRef idx="0">
-            <a:schemeClr val="accent1"/>
-          </a:effectRef>
-          <a:fontRef idx="minor">
-            <a:schemeClr val="tx1"/>
-          </a:fontRef>
-        </p:style>
-      </p:cxnSp>
     </p:spTree>
     <p:extLst>
       <p:ext uri="{BB962C8B-B14F-4D97-AF65-F5344CB8AC3E}">
-        <p14:creationId xmlns:p14="http://schemas.microsoft.com/office/powerpoint/2010/main" val="3952120001"/>
+        <p14:creationId xmlns:p14="http://schemas.microsoft.com/office/powerpoint/2010/main" val="1042172690"/>
       </p:ext>
     </p:extLst>
   </p:cSld>
@@ -11567,6 +12334,114 @@
       </p:grpSpPr>
       <p:sp>
         <p:nvSpPr>
+          <p:cNvPr id="25" name="Organigramme : Terminateur 24">
+            <a:extLst>
+              <a:ext uri="{FF2B5EF4-FFF2-40B4-BE49-F238E27FC236}">
+                <a16:creationId xmlns:a16="http://schemas.microsoft.com/office/drawing/2014/main" id="{A3E96C3B-DEAC-405A-8CE9-01A73EC9C13F}"/>
+              </a:ext>
+            </a:extLst>
+          </p:cNvPr>
+          <p:cNvSpPr/>
+          <p:nvPr/>
+        </p:nvSpPr>
+        <p:spPr>
+          <a:xfrm rot="16200000">
+            <a:off x="3616965" y="2992938"/>
+            <a:ext cx="358260" cy="85725"/>
+          </a:xfrm>
+          <a:prstGeom prst="flowChartTerminator">
+            <a:avLst/>
+          </a:prstGeom>
+          <a:solidFill>
+            <a:srgbClr val="A8135A"/>
+          </a:solidFill>
+          <a:ln>
+            <a:solidFill>
+              <a:schemeClr val="tx1"/>
+            </a:solidFill>
+          </a:ln>
+        </p:spPr>
+        <p:style>
+          <a:lnRef idx="2">
+            <a:schemeClr val="accent1">
+              <a:shade val="50000"/>
+            </a:schemeClr>
+          </a:lnRef>
+          <a:fillRef idx="1">
+            <a:schemeClr val="accent1"/>
+          </a:fillRef>
+          <a:effectRef idx="0">
+            <a:schemeClr val="accent1"/>
+          </a:effectRef>
+          <a:fontRef idx="minor">
+            <a:schemeClr val="lt1"/>
+          </a:fontRef>
+        </p:style>
+        <p:txBody>
+          <a:bodyPr rtlCol="0" anchor="ctr"/>
+          <a:lstStyle/>
+          <a:p>
+            <a:pPr algn="ctr"/>
+            <a:endParaRPr lang="fr-FR"/>
+          </a:p>
+        </p:txBody>
+      </p:sp>
+      <p:sp>
+        <p:nvSpPr>
+          <p:cNvPr id="18" name="Organigramme : Terminateur 17">
+            <a:extLst>
+              <a:ext uri="{FF2B5EF4-FFF2-40B4-BE49-F238E27FC236}">
+                <a16:creationId xmlns:a16="http://schemas.microsoft.com/office/drawing/2014/main" id="{94612B86-F314-49DF-924D-9F7692DB9F35}"/>
+              </a:ext>
+            </a:extLst>
+          </p:cNvPr>
+          <p:cNvSpPr/>
+          <p:nvPr/>
+        </p:nvSpPr>
+        <p:spPr>
+          <a:xfrm rot="16200000">
+            <a:off x="2476143" y="2991946"/>
+            <a:ext cx="358260" cy="85725"/>
+          </a:xfrm>
+          <a:prstGeom prst="flowChartTerminator">
+            <a:avLst/>
+          </a:prstGeom>
+          <a:solidFill>
+            <a:srgbClr val="A8135A"/>
+          </a:solidFill>
+          <a:ln>
+            <a:solidFill>
+              <a:schemeClr val="tx1"/>
+            </a:solidFill>
+          </a:ln>
+        </p:spPr>
+        <p:style>
+          <a:lnRef idx="2">
+            <a:schemeClr val="accent1">
+              <a:shade val="50000"/>
+            </a:schemeClr>
+          </a:lnRef>
+          <a:fillRef idx="1">
+            <a:schemeClr val="accent1"/>
+          </a:fillRef>
+          <a:effectRef idx="0">
+            <a:schemeClr val="accent1"/>
+          </a:effectRef>
+          <a:fontRef idx="minor">
+            <a:schemeClr val="lt1"/>
+          </a:fontRef>
+        </p:style>
+        <p:txBody>
+          <a:bodyPr rtlCol="0" anchor="ctr"/>
+          <a:lstStyle/>
+          <a:p>
+            <a:pPr algn="ctr"/>
+            <a:endParaRPr lang="fr-FR"/>
+          </a:p>
+        </p:txBody>
+      </p:sp>
+      <p:sp>
+        <p:nvSpPr>
           <p:cNvPr id="19" name="Organigramme : Terminateur 18">
             <a:extLst>
               <a:ext uri="{FF2B5EF4-FFF2-40B4-BE49-F238E27FC236}">
@@ -11579,7 +12454,7 @@
         </p:nvSpPr>
         <p:spPr>
           <a:xfrm rot="16200000">
-            <a:off x="1846358" y="3013801"/>
+            <a:off x="1827878" y="2991946"/>
             <a:ext cx="358260" cy="85725"/>
           </a:xfrm>
           <a:prstGeom prst="flowChartTerminator">
@@ -11726,7 +12601,7 @@
         </p:nvSpPr>
         <p:spPr>
           <a:xfrm rot="16200000">
-            <a:off x="1221044" y="2995776"/>
+            <a:off x="1184952" y="2991946"/>
             <a:ext cx="358260" cy="85725"/>
           </a:xfrm>
           <a:prstGeom prst="flowChartTerminator">
@@ -11872,7 +12747,7 @@
         </p:nvSpPr>
         <p:spPr>
           <a:xfrm>
-            <a:off x="1781685" y="2521978"/>
+            <a:off x="799177" y="1996681"/>
             <a:ext cx="1129785" cy="307777"/>
           </a:xfrm>
           <a:prstGeom prst="rect">
@@ -11910,7 +12785,7 @@
         </p:nvSpPr>
         <p:spPr>
           <a:xfrm>
-            <a:off x="3031245" y="2524528"/>
+            <a:off x="1349247" y="2551614"/>
             <a:ext cx="1315521" cy="307777"/>
           </a:xfrm>
           <a:prstGeom prst="rect">
@@ -11948,7 +12823,7 @@
         </p:nvSpPr>
         <p:spPr>
           <a:xfrm>
-            <a:off x="4354508" y="3523843"/>
+            <a:off x="5972996" y="4151057"/>
             <a:ext cx="1315522" cy="738664"/>
           </a:xfrm>
           <a:prstGeom prst="rect">
@@ -12132,10 +13007,414 @@
         </p:nvSpPr>
         <p:spPr>
           <a:xfrm>
-            <a:off x="4730211" y="2918761"/>
+            <a:off x="5621466" y="2916694"/>
             <a:ext cx="564118" cy="542925"/>
           </a:xfrm>
           <a:prstGeom prst="ellipse">
+            <a:avLst/>
+          </a:prstGeom>
+          <a:solidFill>
+            <a:srgbClr val="A8135A"/>
+          </a:solidFill>
+          <a:ln>
+            <a:solidFill>
+              <a:schemeClr val="tx1"/>
+            </a:solidFill>
+          </a:ln>
+        </p:spPr>
+        <p:style>
+          <a:lnRef idx="2">
+            <a:schemeClr val="accent1">
+              <a:shade val="50000"/>
+            </a:schemeClr>
+          </a:lnRef>
+          <a:fillRef idx="1">
+            <a:schemeClr val="accent1"/>
+          </a:fillRef>
+          <a:effectRef idx="0">
+            <a:schemeClr val="accent1"/>
+          </a:effectRef>
+          <a:fontRef idx="minor">
+            <a:schemeClr val="lt1"/>
+          </a:fontRef>
+        </p:style>
+        <p:txBody>
+          <a:bodyPr rtlCol="0" anchor="ctr"/>
+          <a:lstStyle/>
+          <a:p>
+            <a:pPr algn="ctr"/>
+            <a:endParaRPr lang="fr-FR"/>
+          </a:p>
+        </p:txBody>
+      </p:sp>
+      <p:cxnSp>
+        <p:nvCxnSpPr>
+          <p:cNvPr id="4" name="Connecteur droit avec flèche 3">
+            <a:extLst>
+              <a:ext uri="{FF2B5EF4-FFF2-40B4-BE49-F238E27FC236}">
+                <a16:creationId xmlns:a16="http://schemas.microsoft.com/office/drawing/2014/main" id="{03D15D86-7BAD-4B70-BB4F-C40BCD474AB3}"/>
+              </a:ext>
+            </a:extLst>
+          </p:cNvPr>
+          <p:cNvCxnSpPr>
+            <a:stCxn id="5" idx="3"/>
+            <a:endCxn id="12" idx="2"/>
+          </p:cNvCxnSpPr>
+          <p:nvPr/>
+        </p:nvCxnSpPr>
+        <p:spPr>
+          <a:xfrm flipH="1" flipV="1">
+            <a:off x="1364070" y="2304458"/>
+            <a:ext cx="13" cy="551221"/>
+          </a:xfrm>
+          <a:prstGeom prst="straightConnector1">
+            <a:avLst/>
+          </a:prstGeom>
+          <a:ln w="28575">
+            <a:solidFill>
+              <a:srgbClr val="A51258"/>
+            </a:solidFill>
+            <a:tailEnd type="triangle"/>
+          </a:ln>
+        </p:spPr>
+        <p:style>
+          <a:lnRef idx="1">
+            <a:schemeClr val="accent1"/>
+          </a:lnRef>
+          <a:fillRef idx="0">
+            <a:schemeClr val="accent1"/>
+          </a:fillRef>
+          <a:effectRef idx="0">
+            <a:schemeClr val="accent1"/>
+          </a:effectRef>
+          <a:fontRef idx="minor">
+            <a:schemeClr val="tx1"/>
+          </a:fontRef>
+        </p:style>
+      </p:cxnSp>
+      <p:sp>
+        <p:nvSpPr>
+          <p:cNvPr id="20" name="ZoneTexte 19">
+            <a:extLst>
+              <a:ext uri="{FF2B5EF4-FFF2-40B4-BE49-F238E27FC236}">
+                <a16:creationId xmlns:a16="http://schemas.microsoft.com/office/drawing/2014/main" id="{C3DC0E1A-4026-4E51-B444-A2AA1EC23DF4}"/>
+              </a:ext>
+            </a:extLst>
+          </p:cNvPr>
+          <p:cNvSpPr txBox="1"/>
+          <p:nvPr/>
+        </p:nvSpPr>
+        <p:spPr>
+          <a:xfrm>
+            <a:off x="1997513" y="1780232"/>
+            <a:ext cx="1315521" cy="523220"/>
+          </a:xfrm>
+          <a:prstGeom prst="rect">
+            <a:avLst/>
+          </a:prstGeom>
+          <a:noFill/>
+        </p:spPr>
+        <p:txBody>
+          <a:bodyPr wrap="square" rtlCol="0">
+            <a:spAutoFit/>
+          </a:bodyPr>
+          <a:lstStyle/>
+          <a:p>
+            <a:pPr algn="ctr"/>
+            <a:r>
+              <a:rPr lang="fr-FR" sz="1400" dirty="0">
+                <a:latin typeface="Eras Medium ITC" panose="020B0602030504020804" pitchFamily="34" charset="0"/>
+              </a:rPr>
+              <a:t>Taches personnelles</a:t>
+            </a:r>
+          </a:p>
+        </p:txBody>
+      </p:sp>
+      <p:cxnSp>
+        <p:nvCxnSpPr>
+          <p:cNvPr id="21" name="Connecteur droit avec flèche 20">
+            <a:extLst>
+              <a:ext uri="{FF2B5EF4-FFF2-40B4-BE49-F238E27FC236}">
+                <a16:creationId xmlns:a16="http://schemas.microsoft.com/office/drawing/2014/main" id="{7840FEB0-6F58-4A72-8E39-76D7C38EA6A3}"/>
+              </a:ext>
+            </a:extLst>
+          </p:cNvPr>
+          <p:cNvCxnSpPr>
+            <a:cxnSpLocks/>
+            <a:stCxn id="18" idx="3"/>
+            <a:endCxn id="20" idx="2"/>
+          </p:cNvCxnSpPr>
+          <p:nvPr/>
+        </p:nvCxnSpPr>
+        <p:spPr>
+          <a:xfrm flipV="1">
+            <a:off x="2655274" y="2303452"/>
+            <a:ext cx="0" cy="552227"/>
+          </a:xfrm>
+          <a:prstGeom prst="straightConnector1">
+            <a:avLst/>
+          </a:prstGeom>
+          <a:ln w="28575">
+            <a:solidFill>
+              <a:srgbClr val="A51258"/>
+            </a:solidFill>
+            <a:tailEnd type="triangle"/>
+          </a:ln>
+        </p:spPr>
+        <p:style>
+          <a:lnRef idx="1">
+            <a:schemeClr val="accent1"/>
+          </a:lnRef>
+          <a:fillRef idx="0">
+            <a:schemeClr val="accent1"/>
+          </a:fillRef>
+          <a:effectRef idx="0">
+            <a:schemeClr val="accent1"/>
+          </a:effectRef>
+          <a:fontRef idx="minor">
+            <a:schemeClr val="tx1"/>
+          </a:fontRef>
+        </p:style>
+      </p:cxnSp>
+      <p:sp>
+        <p:nvSpPr>
+          <p:cNvPr id="23" name="Ellipse 22">
+            <a:extLst>
+              <a:ext uri="{FF2B5EF4-FFF2-40B4-BE49-F238E27FC236}">
+                <a16:creationId xmlns:a16="http://schemas.microsoft.com/office/drawing/2014/main" id="{ACC7BA16-860D-4293-8075-FC7E0E2ADB32}"/>
+              </a:ext>
+            </a:extLst>
+          </p:cNvPr>
+          <p:cNvSpPr/>
+          <p:nvPr/>
+        </p:nvSpPr>
+        <p:spPr>
+          <a:xfrm>
+            <a:off x="2974335" y="2918760"/>
+            <a:ext cx="564118" cy="542925"/>
+          </a:xfrm>
+          <a:prstGeom prst="ellipse">
+            <a:avLst/>
+          </a:prstGeom>
+          <a:solidFill>
+            <a:srgbClr val="A8135A"/>
+          </a:solidFill>
+          <a:ln>
+            <a:solidFill>
+              <a:schemeClr val="tx1"/>
+            </a:solidFill>
+          </a:ln>
+        </p:spPr>
+        <p:style>
+          <a:lnRef idx="2">
+            <a:schemeClr val="accent1">
+              <a:shade val="50000"/>
+            </a:schemeClr>
+          </a:lnRef>
+          <a:fillRef idx="1">
+            <a:schemeClr val="accent1"/>
+          </a:fillRef>
+          <a:effectRef idx="0">
+            <a:schemeClr val="accent1"/>
+          </a:effectRef>
+          <a:fontRef idx="minor">
+            <a:schemeClr val="lt1"/>
+          </a:fontRef>
+        </p:style>
+        <p:txBody>
+          <a:bodyPr rtlCol="0" anchor="ctr"/>
+          <a:lstStyle/>
+          <a:p>
+            <a:pPr algn="ctr"/>
+            <a:endParaRPr lang="fr-FR"/>
+          </a:p>
+        </p:txBody>
+      </p:sp>
+      <p:sp>
+        <p:nvSpPr>
+          <p:cNvPr id="24" name="ZoneTexte 23">
+            <a:extLst>
+              <a:ext uri="{FF2B5EF4-FFF2-40B4-BE49-F238E27FC236}">
+                <a16:creationId xmlns:a16="http://schemas.microsoft.com/office/drawing/2014/main" id="{D5C5B391-8991-4DF8-AB7A-4AF7DEAE8DB5}"/>
+              </a:ext>
+            </a:extLst>
+          </p:cNvPr>
+          <p:cNvSpPr txBox="1"/>
+          <p:nvPr/>
+        </p:nvSpPr>
+        <p:spPr>
+          <a:xfrm>
+            <a:off x="2538467" y="3466775"/>
+            <a:ext cx="1435854" cy="523220"/>
+          </a:xfrm>
+          <a:prstGeom prst="rect">
+            <a:avLst/>
+          </a:prstGeom>
+          <a:noFill/>
+        </p:spPr>
+        <p:txBody>
+          <a:bodyPr wrap="square" rtlCol="0">
+            <a:spAutoFit/>
+          </a:bodyPr>
+          <a:lstStyle/>
+          <a:p>
+            <a:pPr algn="ctr"/>
+            <a:r>
+              <a:rPr lang="fr-FR" sz="1400" dirty="0">
+                <a:latin typeface="Eras Medium ITC" panose="020B0602030504020804" pitchFamily="34" charset="0"/>
+              </a:rPr>
+              <a:t>Langage de programmation </a:t>
+            </a:r>
+          </a:p>
+        </p:txBody>
+      </p:sp>
+      <p:sp>
+        <p:nvSpPr>
+          <p:cNvPr id="31" name="ZoneTexte 30">
+            <a:extLst>
+              <a:ext uri="{FF2B5EF4-FFF2-40B4-BE49-F238E27FC236}">
+                <a16:creationId xmlns:a16="http://schemas.microsoft.com/office/drawing/2014/main" id="{0EB7216C-B84F-47A0-96F8-77D97570434F}"/>
+              </a:ext>
+            </a:extLst>
+          </p:cNvPr>
+          <p:cNvSpPr txBox="1"/>
+          <p:nvPr/>
+        </p:nvSpPr>
+        <p:spPr>
+          <a:xfrm>
+            <a:off x="3000408" y="2313377"/>
+            <a:ext cx="1591374" cy="523220"/>
+          </a:xfrm>
+          <a:prstGeom prst="rect">
+            <a:avLst/>
+          </a:prstGeom>
+          <a:noFill/>
+        </p:spPr>
+        <p:txBody>
+          <a:bodyPr wrap="square" rtlCol="0">
+            <a:spAutoFit/>
+          </a:bodyPr>
+          <a:lstStyle/>
+          <a:p>
+            <a:pPr algn="ctr"/>
+            <a:r>
+              <a:rPr lang="fr-FR" sz="1400" dirty="0">
+                <a:latin typeface="Eras Medium ITC" panose="020B0602030504020804" pitchFamily="34" charset="0"/>
+              </a:rPr>
+              <a:t>1</a:t>
+            </a:r>
+            <a:r>
+              <a:rPr lang="fr-FR" sz="1400" baseline="30000" dirty="0">
+                <a:latin typeface="Eras Medium ITC" panose="020B0602030504020804" pitchFamily="34" charset="0"/>
+              </a:rPr>
+              <a:t>er </a:t>
+            </a:r>
+            <a:r>
+              <a:rPr lang="fr-FR" sz="1400" dirty="0">
+                <a:latin typeface="Eras Medium ITC" panose="020B0602030504020804" pitchFamily="34" charset="0"/>
+              </a:rPr>
+              <a:t>environnement</a:t>
+            </a:r>
+          </a:p>
+        </p:txBody>
+      </p:sp>
+      <p:sp>
+        <p:nvSpPr>
+          <p:cNvPr id="29" name="Rectangle 28">
+            <a:extLst>
+              <a:ext uri="{FF2B5EF4-FFF2-40B4-BE49-F238E27FC236}">
+                <a16:creationId xmlns:a16="http://schemas.microsoft.com/office/drawing/2014/main" id="{4C59B2C0-D027-40BD-A8EA-8FEDD6126FA6}"/>
+              </a:ext>
+            </a:extLst>
+          </p:cNvPr>
+          <p:cNvSpPr/>
+          <p:nvPr/>
+        </p:nvSpPr>
+        <p:spPr>
+          <a:xfrm>
+            <a:off x="3389765" y="5426945"/>
+            <a:ext cx="2231701" cy="369332"/>
+          </a:xfrm>
+          <a:prstGeom prst="rect">
+            <a:avLst/>
+          </a:prstGeom>
+        </p:spPr>
+        <p:txBody>
+          <a:bodyPr wrap="none">
+            <a:spAutoFit/>
+          </a:bodyPr>
+          <a:lstStyle/>
+          <a:p>
+            <a:r>
+              <a:rPr lang="fr-FR" b="1" dirty="0">
+                <a:solidFill>
+                  <a:srgbClr val="A51258"/>
+                </a:solidFill>
+                <a:effectLst>
+                  <a:outerShdw blurRad="38100" dist="38100" dir="2700000" algn="tl">
+                    <a:srgbClr val="000000">
+                      <a:alpha val="43137"/>
+                    </a:srgbClr>
+                  </a:outerShdw>
+                </a:effectLst>
+                <a:latin typeface="Eras Medium ITC" panose="020B0602030504020804" pitchFamily="34" charset="0"/>
+              </a:rPr>
+              <a:t>2</a:t>
+            </a:r>
+            <a:r>
+              <a:rPr lang="fr-FR" b="1" baseline="30000" dirty="0">
+                <a:solidFill>
+                  <a:srgbClr val="A51258"/>
+                </a:solidFill>
+                <a:effectLst>
+                  <a:outerShdw blurRad="38100" dist="38100" dir="2700000" algn="tl">
+                    <a:srgbClr val="000000">
+                      <a:alpha val="43137"/>
+                    </a:srgbClr>
+                  </a:outerShdw>
+                </a:effectLst>
+                <a:latin typeface="Eras Medium ITC" panose="020B0602030504020804" pitchFamily="34" charset="0"/>
+              </a:rPr>
+              <a:t>ème </a:t>
+            </a:r>
+            <a:r>
+              <a:rPr lang="fr-FR" b="1" dirty="0">
+                <a:solidFill>
+                  <a:srgbClr val="A51258"/>
+                </a:solidFill>
+                <a:effectLst>
+                  <a:outerShdw blurRad="38100" dist="38100" dir="2700000" algn="tl">
+                    <a:srgbClr val="000000">
+                      <a:alpha val="43137"/>
+                    </a:srgbClr>
+                  </a:outerShdw>
+                </a:effectLst>
+                <a:latin typeface="Eras Medium ITC" panose="020B0602030504020804" pitchFamily="34" charset="0"/>
+              </a:rPr>
+              <a:t>environnement</a:t>
+            </a:r>
+            <a:endParaRPr lang="fr-FR" dirty="0"/>
+          </a:p>
+        </p:txBody>
+      </p:sp>
+      <p:sp>
+        <p:nvSpPr>
+          <p:cNvPr id="33" name="Organigramme : Terminateur 32">
+            <a:extLst>
+              <a:ext uri="{FF2B5EF4-FFF2-40B4-BE49-F238E27FC236}">
+                <a16:creationId xmlns:a16="http://schemas.microsoft.com/office/drawing/2014/main" id="{0468469B-3B5B-4A66-A87B-3CBE7DC2B237}"/>
+              </a:ext>
+            </a:extLst>
+          </p:cNvPr>
+          <p:cNvSpPr/>
+          <p:nvPr/>
+        </p:nvSpPr>
+        <p:spPr>
+          <a:xfrm rot="16200000">
+            <a:off x="4154793" y="2991945"/>
+            <a:ext cx="358260" cy="85725"/>
+          </a:xfrm>
+          <a:prstGeom prst="flowChartTerminator">
             <a:avLst/>
           </a:prstGeom>
           <a:solidFill>
@@ -14863,7 +16142,7 @@
         <p:spPr>
           <a:xfrm>
             <a:off x="4867669" y="1631532"/>
-            <a:ext cx="3799332" cy="3139321"/>
+            <a:ext cx="3799332" cy="3970318"/>
           </a:xfrm>
           <a:prstGeom prst="rect">
             <a:avLst/>
@@ -14908,7 +16187,7 @@
               <a:rPr lang="fr-FR" dirty="0">
                 <a:latin typeface="Eras Medium ITC" panose="020B0602030504020804" pitchFamily="34" charset="0"/>
               </a:rPr>
-              <a:t>Allumé une LED correspondante dans la seconde si UID correct.</a:t>
+              <a:t>Allumé ou éteindre une LED correspondante dans la seconde selon l'état du capteur.</a:t>
             </a:r>
           </a:p>
           <a:p>
@@ -14920,7 +16199,7 @@
               <a:rPr lang="fr-FR" dirty="0">
                 <a:latin typeface="Eras Medium ITC" panose="020B0602030504020804" pitchFamily="34" charset="0"/>
               </a:rPr>
-              <a:t>Si 4 UID corrects, ouvrir la gâche électrique et envoyer l’ordre de fin partie à l’application de supervision.</a:t>
+              <a:t>Si 4 UID corrects, ouvrir la gâche électrique et envoyer l’ordre de fin partie à l’application de supervision via un système client socket.</a:t>
             </a:r>
           </a:p>
           <a:p>
@@ -14932,7 +16211,7 @@
               <a:rPr lang="fr-FR" dirty="0">
                 <a:latin typeface="Eras Medium ITC" panose="020B0602030504020804" pitchFamily="34" charset="0"/>
               </a:rPr>
-              <a:t>Détecté l’ordre de fin de partie dans l’application de supervision.</a:t>
+              <a:t>Détecté l’ordre de fin de partie dans l’application de supervision via un système serveur socket.</a:t>
             </a:r>
           </a:p>
         </p:txBody>
@@ -15854,7 +17133,7 @@
                 </a:effectLst>
                 <a:latin typeface="Eras Medium ITC" panose="020B0602030504020804" pitchFamily="34" charset="0"/>
               </a:rPr>
-              <a:t>développement 1</a:t>
+              <a:t>programmation: 1</a:t>
             </a:r>
             <a:r>
               <a:rPr lang="fr-FR" sz="3200" b="1" baseline="30000" dirty="0">
@@ -16716,7 +17995,7 @@
         <p:spPr>
           <a:xfrm>
             <a:off x="2059803" y="3697092"/>
-            <a:ext cx="2889820" cy="0"/>
+            <a:ext cx="2925471" cy="0"/>
           </a:xfrm>
           <a:prstGeom prst="straightConnector1">
             <a:avLst/>
@@ -16770,7 +18049,7 @@
         </p:blipFill>
         <p:spPr>
           <a:xfrm>
-            <a:off x="4949623" y="3011420"/>
+            <a:off x="4985274" y="3011420"/>
             <a:ext cx="1310396" cy="1371344"/>
           </a:xfrm>
           <a:prstGeom prst="rect">
@@ -17176,7 +18455,7 @@
                 </a:effectLst>
                 <a:latin typeface="Eras Medium ITC" panose="020B0602030504020804" pitchFamily="34" charset="0"/>
               </a:rPr>
-              <a:t>développement 2</a:t>
+              <a:t>programmation: 2</a:t>
             </a:r>
             <a:r>
               <a:rPr lang="fr-FR" sz="3200" b="1" baseline="30000" dirty="0">
@@ -17885,7 +19164,7 @@
         <p:spPr>
           <a:xfrm flipV="1">
             <a:off x="2061511" y="2000822"/>
-            <a:ext cx="1537093" cy="1"/>
+            <a:ext cx="2042398" cy="1"/>
           </a:xfrm>
           <a:prstGeom prst="straightConnector1">
             <a:avLst/>
@@ -18182,7 +19461,7 @@
         <p:spPr>
           <a:xfrm>
             <a:off x="2059803" y="5393362"/>
-            <a:ext cx="4581520" cy="0"/>
+            <a:ext cx="4441900" cy="0"/>
           </a:xfrm>
           <a:prstGeom prst="straightConnector1">
             <a:avLst/>
@@ -18286,7 +19565,7 @@
         </p:blipFill>
         <p:spPr>
           <a:xfrm>
-            <a:off x="3598604" y="1726785"/>
+            <a:off x="4103909" y="1726785"/>
             <a:ext cx="2756146" cy="548074"/>
           </a:xfrm>
           <a:prstGeom prst="rect">
@@ -18345,7 +19624,7 @@
         </p:blipFill>
         <p:spPr>
           <a:xfrm>
-            <a:off x="6641323" y="4525848"/>
+            <a:off x="6501703" y="4525848"/>
             <a:ext cx="1726396" cy="1735028"/>
           </a:xfrm>
           <a:prstGeom prst="rect">
@@ -18442,10 +19721,10 @@
       </p:pic>
       <p:sp>
         <p:nvSpPr>
-          <p:cNvPr id="2" name="ZoneTexte 1">
-            <a:extLst>
-              <a:ext uri="{FF2B5EF4-FFF2-40B4-BE49-F238E27FC236}">
-                <a16:creationId xmlns:a16="http://schemas.microsoft.com/office/drawing/2014/main" id="{144597CC-5B36-42C7-952E-C2CE1E34CACD}"/>
+          <p:cNvPr id="3" name="ZoneTexte 2">
+            <a:extLst>
+              <a:ext uri="{FF2B5EF4-FFF2-40B4-BE49-F238E27FC236}">
+                <a16:creationId xmlns:a16="http://schemas.microsoft.com/office/drawing/2014/main" id="{1582123C-25BF-42F1-97F8-35FFB48DFFAA}"/>
               </a:ext>
             </a:extLst>
           </p:cNvPr>
@@ -18454,13 +19733,43 @@
         </p:nvSpPr>
         <p:spPr>
           <a:xfrm>
-            <a:off x="2587752" y="143435"/>
-            <a:ext cx="6437376" cy="646331"/>
+            <a:off x="2477079" y="168260"/>
+            <a:ext cx="6848856" cy="584775"/>
           </a:xfrm>
           <a:prstGeom prst="rect">
             <a:avLst/>
           </a:prstGeom>
           <a:noFill/>
+          <a:ln>
+            <a:noFill/>
+          </a:ln>
+          <a:effectLst>
+            <a:glow rad="63500">
+              <a:schemeClr val="accent4">
+                <a:satMod val="175000"/>
+                <a:alpha val="40000"/>
+              </a:schemeClr>
+            </a:glow>
+            <a:outerShdw blurRad="50800" dist="38100" dir="5400000" algn="t" rotWithShape="0">
+              <a:prstClr val="black">
+                <a:alpha val="40000"/>
+              </a:prstClr>
+            </a:outerShdw>
+          </a:effectLst>
+          <a:scene3d>
+            <a:camera prst="orthographicFront">
+              <a:rot lat="0" lon="0" rev="0"/>
+            </a:camera>
+            <a:lightRig rig="soft" dir="t">
+              <a:rot lat="0" lon="0" rev="0"/>
+            </a:lightRig>
+          </a:scene3d>
+          <a:sp3d contourW="44450" prstMaterial="matte">
+            <a:bevelT w="63500" h="63500" prst="artDeco"/>
+            <a:contourClr>
+              <a:srgbClr val="FFFFFF"/>
+            </a:contourClr>
+          </a:sp3d>
         </p:spPr>
         <p:txBody>
           <a:bodyPr wrap="square" rtlCol="0">
@@ -18470,32 +19779,18 @@
           <a:p>
             <a:pPr algn="ctr"/>
             <a:r>
-              <a:rPr lang="fr-FR" sz="3600" b="1" dirty="0">
+              <a:rPr lang="fr-FR" sz="3200" b="1" dirty="0">
                 <a:solidFill>
                   <a:srgbClr val="A51258"/>
                 </a:solidFill>
-                <a:effectLst>
-                  <a:outerShdw blurRad="38100" dist="38100" dir="2700000" algn="tl">
-                    <a:srgbClr val="000000">
-                      <a:alpha val="43137"/>
-                    </a:srgbClr>
-                  </a:outerShdw>
-                </a:effectLst>
                 <a:latin typeface="Eras Medium ITC" panose="020B0602030504020804" pitchFamily="34" charset="0"/>
               </a:rPr>
-              <a:t>Câblage</a:t>
+              <a:t>Librairie</a:t>
             </a:r>
             <a:endParaRPr lang="fr-FR" sz="2800" b="1" dirty="0">
               <a:solidFill>
                 <a:srgbClr val="A51258"/>
               </a:solidFill>
-              <a:effectLst>
-                <a:outerShdw blurRad="38100" dist="38100" dir="2700000" algn="tl">
-                  <a:srgbClr val="000000">
-                    <a:alpha val="43137"/>
-                  </a:srgbClr>
-                </a:outerShdw>
-              </a:effectLst>
               <a:latin typeface="Eras Medium ITC" panose="020B0602030504020804" pitchFamily="34" charset="0"/>
             </a:endParaRPr>
           </a:p>
@@ -18503,10 +19798,10 @@
       </p:sp>
       <p:sp>
         <p:nvSpPr>
-          <p:cNvPr id="6" name="Organigramme : Terminateur 5">
-            <a:extLst>
-              <a:ext uri="{FF2B5EF4-FFF2-40B4-BE49-F238E27FC236}">
-                <a16:creationId xmlns:a16="http://schemas.microsoft.com/office/drawing/2014/main" id="{D0388349-375C-432D-95E5-4335229F72C4}"/>
+          <p:cNvPr id="5" name="Rectangle 4">
+            <a:extLst>
+              <a:ext uri="{FF2B5EF4-FFF2-40B4-BE49-F238E27FC236}">
+                <a16:creationId xmlns:a16="http://schemas.microsoft.com/office/drawing/2014/main" id="{E8071899-BAB1-4FE1-A456-5AC697088E0D}"/>
               </a:ext>
             </a:extLst>
           </p:cNvPr>
@@ -18515,20 +19810,23 @@
         </p:nvSpPr>
         <p:spPr>
           <a:xfrm>
-            <a:off x="11405115" y="1514475"/>
-            <a:ext cx="358260" cy="85725"/>
-          </a:xfrm>
-          <a:prstGeom prst="flowChartTerminator">
-            <a:avLst/>
-          </a:prstGeom>
-          <a:solidFill>
-            <a:srgbClr val="A8135A"/>
-          </a:solidFill>
-          <a:ln>
+            <a:off x="367308" y="1122121"/>
+            <a:ext cx="1850002" cy="752399"/>
+          </a:xfrm>
+          <a:prstGeom prst="rect">
+            <a:avLst/>
+          </a:prstGeom>
+          <a:noFill/>
+          <a:ln w="28575">
             <a:solidFill>
-              <a:schemeClr val="bg1"/>
+              <a:srgbClr val="A51258"/>
             </a:solidFill>
           </a:ln>
+          <a:effectLst>
+            <a:glow rad="50800">
+              <a:schemeClr val="tx1"/>
+            </a:glow>
+          </a:effectLst>
         </p:spPr>
         <p:style>
           <a:lnRef idx="2">
@@ -18551,38 +19849,236 @@
           <a:lstStyle/>
           <a:p>
             <a:pPr algn="ctr"/>
-            <a:endParaRPr lang="fr-FR"/>
-          </a:p>
-        </p:txBody>
-      </p:sp>
-      <p:sp>
-        <p:nvSpPr>
-          <p:cNvPr id="7" name="Rectangle 6">
-            <a:extLst>
-              <a:ext uri="{FF2B5EF4-FFF2-40B4-BE49-F238E27FC236}">
-                <a16:creationId xmlns:a16="http://schemas.microsoft.com/office/drawing/2014/main" id="{7965C92B-62A3-4F91-80E9-84A7357D8ED7}"/>
-              </a:ext>
-            </a:extLst>
-          </p:cNvPr>
-          <p:cNvSpPr/>
-          <p:nvPr/>
-        </p:nvSpPr>
-        <p:spPr>
-          <a:xfrm>
-            <a:off x="11658600" y="753035"/>
-            <a:ext cx="104775" cy="5614778"/>
+            <a:r>
+              <a:rPr lang="fr-FR" sz="1200" dirty="0">
+                <a:solidFill>
+                  <a:srgbClr val="A51258"/>
+                </a:solidFill>
+              </a:rPr>
+              <a:t>pi-rc522</a:t>
+            </a:r>
+            <a:r>
+              <a:rPr lang="fr-FR" sz="1200" dirty="0">
+                <a:solidFill>
+                  <a:schemeClr val="tx1"/>
+                </a:solidFill>
+              </a:rPr>
+              <a:t> est une librairie sous </a:t>
+            </a:r>
+            <a:r>
+              <a:rPr lang="fr-FR" sz="1200" dirty="0">
+                <a:solidFill>
+                  <a:srgbClr val="A51258"/>
+                </a:solidFill>
+              </a:rPr>
+              <a:t>licence MIT </a:t>
+            </a:r>
+            <a:r>
+              <a:rPr lang="fr-FR" sz="1200" dirty="0">
+                <a:solidFill>
+                  <a:schemeClr val="tx1"/>
+                </a:solidFill>
+              </a:rPr>
+              <a:t>pour le</a:t>
+            </a:r>
+            <a:r>
+              <a:rPr lang="fr-FR" sz="1200" dirty="0">
+                <a:solidFill>
+                  <a:srgbClr val="A51258"/>
+                </a:solidFill>
+              </a:rPr>
+              <a:t> Python</a:t>
+            </a:r>
+          </a:p>
+        </p:txBody>
+      </p:sp>
+      <p:pic>
+        <p:nvPicPr>
+          <p:cNvPr id="6" name="Image 5" descr="Une image contenant dessin, signe&#10;&#10;Description générée automatiquement">
+            <a:extLst>
+              <a:ext uri="{FF2B5EF4-FFF2-40B4-BE49-F238E27FC236}">
+                <a16:creationId xmlns:a16="http://schemas.microsoft.com/office/drawing/2014/main" id="{1476270C-68DA-4E1A-A34E-FB102FA05834}"/>
+              </a:ext>
+            </a:extLst>
+          </p:cNvPr>
+          <p:cNvPicPr>
+            <a:picLocks noChangeAspect="1"/>
+          </p:cNvPicPr>
+          <p:nvPr/>
+        </p:nvPicPr>
+        <p:blipFill>
+          <a:blip r:embed="rId3"/>
+          <a:stretch>
+            <a:fillRect/>
+          </a:stretch>
+        </p:blipFill>
+        <p:spPr>
+          <a:xfrm>
+            <a:off x="3284053" y="944237"/>
+            <a:ext cx="1486846" cy="1108165"/>
           </a:xfrm>
           <a:prstGeom prst="rect">
             <a:avLst/>
           </a:prstGeom>
-          <a:solidFill>
-            <a:schemeClr val="bg1"/>
-          </a:solidFill>
-          <a:ln>
+        </p:spPr>
+      </p:pic>
+      <p:cxnSp>
+        <p:nvCxnSpPr>
+          <p:cNvPr id="8" name="Connecteur droit avec flèche 7">
+            <a:extLst>
+              <a:ext uri="{FF2B5EF4-FFF2-40B4-BE49-F238E27FC236}">
+                <a16:creationId xmlns:a16="http://schemas.microsoft.com/office/drawing/2014/main" id="{8991D987-C960-4F9B-B5A3-ED2CD4D77C48}"/>
+              </a:ext>
+            </a:extLst>
+          </p:cNvPr>
+          <p:cNvCxnSpPr>
+            <a:cxnSpLocks/>
+            <a:stCxn id="5" idx="3"/>
+            <a:endCxn id="6" idx="1"/>
+          </p:cNvCxnSpPr>
+          <p:nvPr/>
+        </p:nvCxnSpPr>
+        <p:spPr>
+          <a:xfrm flipV="1">
+            <a:off x="2217310" y="1498320"/>
+            <a:ext cx="1066743" cy="1"/>
+          </a:xfrm>
+          <a:prstGeom prst="straightConnector1">
+            <a:avLst/>
+          </a:prstGeom>
+          <a:ln w="38100">
             <a:solidFill>
-              <a:schemeClr val="bg1"/>
+              <a:srgbClr val="A51258"/>
+            </a:solidFill>
+            <a:tailEnd type="triangle"/>
+          </a:ln>
+          <a:effectLst>
+            <a:glow rad="50800">
+              <a:schemeClr val="tx1"/>
+            </a:glow>
+          </a:effectLst>
+        </p:spPr>
+        <p:style>
+          <a:lnRef idx="1">
+            <a:schemeClr val="accent1"/>
+          </a:lnRef>
+          <a:fillRef idx="0">
+            <a:schemeClr val="accent1"/>
+          </a:fillRef>
+          <a:effectRef idx="0">
+            <a:schemeClr val="accent1"/>
+          </a:effectRef>
+          <a:fontRef idx="minor">
+            <a:schemeClr val="tx1"/>
+          </a:fontRef>
+        </p:style>
+      </p:cxnSp>
+      <p:pic>
+        <p:nvPicPr>
+          <p:cNvPr id="19" name="Image 18" descr="Une image contenant moniteur, intérieur, écran, noir&#10;&#10;Description générée automatiquement">
+            <a:extLst>
+              <a:ext uri="{FF2B5EF4-FFF2-40B4-BE49-F238E27FC236}">
+                <a16:creationId xmlns:a16="http://schemas.microsoft.com/office/drawing/2014/main" id="{78013C0C-D50E-4F62-A056-A002A217DCDE}"/>
+              </a:ext>
+            </a:extLst>
+          </p:cNvPr>
+          <p:cNvPicPr>
+            <a:picLocks noChangeAspect="1"/>
+          </p:cNvPicPr>
+          <p:nvPr/>
+        </p:nvPicPr>
+        <p:blipFill>
+          <a:blip r:embed="rId4"/>
+          <a:stretch>
+            <a:fillRect/>
+          </a:stretch>
+        </p:blipFill>
+        <p:spPr>
+          <a:xfrm>
+            <a:off x="556725" y="4723757"/>
+            <a:ext cx="4041872" cy="2024244"/>
+          </a:xfrm>
+          <a:prstGeom prst="rect">
+            <a:avLst/>
+          </a:prstGeom>
+          <a:ln w="38100">
+            <a:solidFill>
+              <a:srgbClr val="A51258"/>
             </a:solidFill>
           </a:ln>
+        </p:spPr>
+      </p:pic>
+      <p:pic>
+        <p:nvPicPr>
+          <p:cNvPr id="21" name="Image 20">
+            <a:extLst>
+              <a:ext uri="{FF2B5EF4-FFF2-40B4-BE49-F238E27FC236}">
+                <a16:creationId xmlns:a16="http://schemas.microsoft.com/office/drawing/2014/main" id="{900F7095-20DC-455F-BC6B-604E670A9783}"/>
+              </a:ext>
+            </a:extLst>
+          </p:cNvPr>
+          <p:cNvPicPr>
+            <a:picLocks noChangeAspect="1"/>
+          </p:cNvPicPr>
+          <p:nvPr/>
+        </p:nvPicPr>
+        <p:blipFill>
+          <a:blip r:embed="rId5"/>
+          <a:stretch>
+            <a:fillRect/>
+          </a:stretch>
+        </p:blipFill>
+        <p:spPr>
+          <a:xfrm>
+            <a:off x="5269770" y="930917"/>
+            <a:ext cx="4211613" cy="3601135"/>
+          </a:xfrm>
+          <a:prstGeom prst="rect">
+            <a:avLst/>
+          </a:prstGeom>
+          <a:ln w="28575">
+            <a:solidFill>
+              <a:srgbClr val="A51258"/>
+            </a:solidFill>
+          </a:ln>
+          <a:effectLst>
+            <a:glow>
+              <a:schemeClr val="bg1"/>
+            </a:glow>
+          </a:effectLst>
+        </p:spPr>
+      </p:pic>
+      <p:sp>
+        <p:nvSpPr>
+          <p:cNvPr id="26" name="Rectangle 25">
+            <a:extLst>
+              <a:ext uri="{FF2B5EF4-FFF2-40B4-BE49-F238E27FC236}">
+                <a16:creationId xmlns:a16="http://schemas.microsoft.com/office/drawing/2014/main" id="{8FD411F7-8FA0-48E4-817D-10CB94BCD191}"/>
+              </a:ext>
+            </a:extLst>
+          </p:cNvPr>
+          <p:cNvSpPr/>
+          <p:nvPr/>
+        </p:nvSpPr>
+        <p:spPr>
+          <a:xfrm>
+            <a:off x="6450575" y="5359679"/>
+            <a:ext cx="1850002" cy="752399"/>
+          </a:xfrm>
+          <a:prstGeom prst="rect">
+            <a:avLst/>
+          </a:prstGeom>
+          <a:noFill/>
+          <a:ln w="28575">
+            <a:solidFill>
+              <a:srgbClr val="A51258"/>
+            </a:solidFill>
+          </a:ln>
+          <a:effectLst>
+            <a:glow rad="50800">
+              <a:schemeClr val="tx1"/>
+            </a:glow>
+          </a:effectLst>
         </p:spPr>
         <p:style>
           <a:lnRef idx="2">
@@ -18605,16 +20101,125 @@
           <a:lstStyle/>
           <a:p>
             <a:pPr algn="ctr"/>
-            <a:endParaRPr lang="fr-FR"/>
-          </a:p>
-        </p:txBody>
-      </p:sp>
-      <p:sp>
-        <p:nvSpPr>
-          <p:cNvPr id="9" name="Ellipse 8">
-            <a:extLst>
-              <a:ext uri="{FF2B5EF4-FFF2-40B4-BE49-F238E27FC236}">
-                <a16:creationId xmlns:a16="http://schemas.microsoft.com/office/drawing/2014/main" id="{76D06B21-1630-4698-BFB5-5F24222D7239}"/>
+            <a:r>
+              <a:rPr lang="fr-FR" sz="1200" dirty="0">
+                <a:solidFill>
+                  <a:srgbClr val="A51258"/>
+                </a:solidFill>
+              </a:rPr>
+              <a:t>Exemples</a:t>
+            </a:r>
+          </a:p>
+        </p:txBody>
+      </p:sp>
+      <p:cxnSp>
+        <p:nvCxnSpPr>
+          <p:cNvPr id="27" name="Connecteur droit avec flèche 26">
+            <a:extLst>
+              <a:ext uri="{FF2B5EF4-FFF2-40B4-BE49-F238E27FC236}">
+                <a16:creationId xmlns:a16="http://schemas.microsoft.com/office/drawing/2014/main" id="{9EA8D079-5BB8-4541-BAA5-902C067C3205}"/>
+              </a:ext>
+            </a:extLst>
+          </p:cNvPr>
+          <p:cNvCxnSpPr>
+            <a:cxnSpLocks/>
+            <a:stCxn id="26" idx="0"/>
+            <a:endCxn id="21" idx="2"/>
+          </p:cNvCxnSpPr>
+          <p:nvPr/>
+        </p:nvCxnSpPr>
+        <p:spPr>
+          <a:xfrm flipV="1">
+            <a:off x="7375576" y="4532052"/>
+            <a:ext cx="1" cy="827627"/>
+          </a:xfrm>
+          <a:prstGeom prst="straightConnector1">
+            <a:avLst/>
+          </a:prstGeom>
+          <a:ln w="38100">
+            <a:solidFill>
+              <a:srgbClr val="A51258"/>
+            </a:solidFill>
+            <a:tailEnd type="triangle"/>
+          </a:ln>
+          <a:effectLst>
+            <a:glow rad="50800">
+              <a:schemeClr val="tx1"/>
+            </a:glow>
+          </a:effectLst>
+        </p:spPr>
+        <p:style>
+          <a:lnRef idx="1">
+            <a:schemeClr val="accent1"/>
+          </a:lnRef>
+          <a:fillRef idx="0">
+            <a:schemeClr val="accent1"/>
+          </a:fillRef>
+          <a:effectRef idx="0">
+            <a:schemeClr val="accent1"/>
+          </a:effectRef>
+          <a:fontRef idx="minor">
+            <a:schemeClr val="tx1"/>
+          </a:fontRef>
+        </p:style>
+      </p:cxnSp>
+      <p:cxnSp>
+        <p:nvCxnSpPr>
+          <p:cNvPr id="30" name="Connecteur droit avec flèche 29">
+            <a:extLst>
+              <a:ext uri="{FF2B5EF4-FFF2-40B4-BE49-F238E27FC236}">
+                <a16:creationId xmlns:a16="http://schemas.microsoft.com/office/drawing/2014/main" id="{B1D6E6A8-FC45-4AFC-AAC2-664A3ECDE1DF}"/>
+              </a:ext>
+            </a:extLst>
+          </p:cNvPr>
+          <p:cNvCxnSpPr>
+            <a:cxnSpLocks/>
+            <a:stCxn id="26" idx="1"/>
+            <a:endCxn id="19" idx="3"/>
+          </p:cNvCxnSpPr>
+          <p:nvPr/>
+        </p:nvCxnSpPr>
+        <p:spPr>
+          <a:xfrm flipH="1">
+            <a:off x="4598597" y="5735879"/>
+            <a:ext cx="1851978" cy="0"/>
+          </a:xfrm>
+          <a:prstGeom prst="straightConnector1">
+            <a:avLst/>
+          </a:prstGeom>
+          <a:ln w="38100">
+            <a:solidFill>
+              <a:srgbClr val="A51258"/>
+            </a:solidFill>
+            <a:tailEnd type="triangle"/>
+          </a:ln>
+          <a:effectLst>
+            <a:glow rad="50800">
+              <a:schemeClr val="tx1"/>
+            </a:glow>
+          </a:effectLst>
+        </p:spPr>
+        <p:style>
+          <a:lnRef idx="1">
+            <a:schemeClr val="accent1"/>
+          </a:lnRef>
+          <a:fillRef idx="0">
+            <a:schemeClr val="accent1"/>
+          </a:fillRef>
+          <a:effectRef idx="0">
+            <a:schemeClr val="accent1"/>
+          </a:effectRef>
+          <a:fontRef idx="minor">
+            <a:schemeClr val="tx1"/>
+          </a:fontRef>
+        </p:style>
+      </p:cxnSp>
+      <p:sp>
+        <p:nvSpPr>
+          <p:cNvPr id="34" name="Rectangle 33">
+            <a:extLst>
+              <a:ext uri="{FF2B5EF4-FFF2-40B4-BE49-F238E27FC236}">
+                <a16:creationId xmlns:a16="http://schemas.microsoft.com/office/drawing/2014/main" id="{FE8A38AC-578F-4101-BB2A-5429A32B752B}"/>
               </a:ext>
             </a:extLst>
           </p:cNvPr>
@@ -18623,20 +20228,23 @@
         </p:nvSpPr>
         <p:spPr>
           <a:xfrm>
-            <a:off x="11428928" y="5851700"/>
-            <a:ext cx="564118" cy="542925"/>
-          </a:xfrm>
-          <a:prstGeom prst="ellipse">
-            <a:avLst/>
-          </a:prstGeom>
-          <a:solidFill>
-            <a:schemeClr val="bg1"/>
-          </a:solidFill>
-          <a:ln>
+            <a:off x="367308" y="2922939"/>
+            <a:ext cx="1850002" cy="752399"/>
+          </a:xfrm>
+          <a:prstGeom prst="rect">
+            <a:avLst/>
+          </a:prstGeom>
+          <a:noFill/>
+          <a:ln w="28575">
             <a:solidFill>
-              <a:schemeClr val="bg1"/>
+              <a:srgbClr val="A51258"/>
             </a:solidFill>
           </a:ln>
+          <a:effectLst>
+            <a:glow rad="50800">
+              <a:schemeClr val="tx1"/>
+            </a:glow>
+          </a:effectLst>
         </p:spPr>
         <p:style>
           <a:lnRef idx="2">
@@ -18659,16 +20267,132 @@
           <a:lstStyle/>
           <a:p>
             <a:pPr algn="ctr"/>
-            <a:endParaRPr lang="fr-FR"/>
-          </a:p>
-        </p:txBody>
-      </p:sp>
-      <p:sp>
-        <p:nvSpPr>
-          <p:cNvPr id="10" name="Organigramme : Terminateur 9">
-            <a:extLst>
-              <a:ext uri="{FF2B5EF4-FFF2-40B4-BE49-F238E27FC236}">
-                <a16:creationId xmlns:a16="http://schemas.microsoft.com/office/drawing/2014/main" id="{CB8C87E6-B87B-4E15-81CC-6DBA23DB12CA}"/>
+            <a:r>
+              <a:rPr lang="fr-FR" sz="1200" dirty="0">
+                <a:solidFill>
+                  <a:srgbClr val="A51258"/>
+                </a:solidFill>
+              </a:rPr>
+              <a:t>Facilite </a:t>
+            </a:r>
+            <a:r>
+              <a:rPr lang="fr-FR" sz="1200" dirty="0">
+                <a:solidFill>
+                  <a:schemeClr val="tx1"/>
+                </a:solidFill>
+              </a:rPr>
+              <a:t>l’utilisation des lecteurs RFID RC-522</a:t>
+            </a:r>
+          </a:p>
+        </p:txBody>
+      </p:sp>
+      <p:cxnSp>
+        <p:nvCxnSpPr>
+          <p:cNvPr id="35" name="Connecteur droit avec flèche 34">
+            <a:extLst>
+              <a:ext uri="{FF2B5EF4-FFF2-40B4-BE49-F238E27FC236}">
+                <a16:creationId xmlns:a16="http://schemas.microsoft.com/office/drawing/2014/main" id="{B5957FC1-7DE0-4701-AB56-118B48A89468}"/>
+              </a:ext>
+            </a:extLst>
+          </p:cNvPr>
+          <p:cNvCxnSpPr>
+            <a:cxnSpLocks/>
+            <a:stCxn id="5" idx="2"/>
+            <a:endCxn id="34" idx="0"/>
+          </p:cNvCxnSpPr>
+          <p:nvPr/>
+        </p:nvCxnSpPr>
+        <p:spPr>
+          <a:xfrm>
+            <a:off x="1292309" y="1874520"/>
+            <a:ext cx="0" cy="1048419"/>
+          </a:xfrm>
+          <a:prstGeom prst="straightConnector1">
+            <a:avLst/>
+          </a:prstGeom>
+          <a:ln w="38100">
+            <a:solidFill>
+              <a:srgbClr val="A51258"/>
+            </a:solidFill>
+            <a:tailEnd type="triangle"/>
+          </a:ln>
+          <a:effectLst>
+            <a:glow rad="50800">
+              <a:schemeClr val="tx1"/>
+            </a:glow>
+          </a:effectLst>
+        </p:spPr>
+        <p:style>
+          <a:lnRef idx="1">
+            <a:schemeClr val="accent1"/>
+          </a:lnRef>
+          <a:fillRef idx="0">
+            <a:schemeClr val="accent1"/>
+          </a:fillRef>
+          <a:effectRef idx="0">
+            <a:schemeClr val="accent1"/>
+          </a:effectRef>
+          <a:fontRef idx="minor">
+            <a:schemeClr val="tx1"/>
+          </a:fontRef>
+        </p:style>
+      </p:cxnSp>
+      <p:cxnSp>
+        <p:nvCxnSpPr>
+          <p:cNvPr id="38" name="Connecteur droit avec flèche 37">
+            <a:extLst>
+              <a:ext uri="{FF2B5EF4-FFF2-40B4-BE49-F238E27FC236}">
+                <a16:creationId xmlns:a16="http://schemas.microsoft.com/office/drawing/2014/main" id="{85E766C0-203C-4472-B192-909211381607}"/>
+              </a:ext>
+            </a:extLst>
+          </p:cNvPr>
+          <p:cNvCxnSpPr>
+            <a:cxnSpLocks/>
+            <a:stCxn id="34" idx="3"/>
+          </p:cNvCxnSpPr>
+          <p:nvPr/>
+        </p:nvCxnSpPr>
+        <p:spPr>
+          <a:xfrm>
+            <a:off x="2217310" y="3299139"/>
+            <a:ext cx="4233265" cy="2060540"/>
+          </a:xfrm>
+          <a:prstGeom prst="straightConnector1">
+            <a:avLst/>
+          </a:prstGeom>
+          <a:ln w="38100">
+            <a:solidFill>
+              <a:srgbClr val="A51258"/>
+            </a:solidFill>
+            <a:tailEnd type="triangle"/>
+          </a:ln>
+          <a:effectLst>
+            <a:glow rad="50800">
+              <a:schemeClr val="tx1"/>
+            </a:glow>
+          </a:effectLst>
+        </p:spPr>
+        <p:style>
+          <a:lnRef idx="1">
+            <a:schemeClr val="accent1"/>
+          </a:lnRef>
+          <a:fillRef idx="0">
+            <a:schemeClr val="accent1"/>
+          </a:fillRef>
+          <a:effectRef idx="0">
+            <a:schemeClr val="accent1"/>
+          </a:effectRef>
+          <a:fontRef idx="minor">
+            <a:schemeClr val="tx1"/>
+          </a:fontRef>
+        </p:style>
+      </p:cxnSp>
+      <p:sp>
+        <p:nvSpPr>
+          <p:cNvPr id="15" name="Rectangle 14">
+            <a:extLst>
+              <a:ext uri="{FF2B5EF4-FFF2-40B4-BE49-F238E27FC236}">
+                <a16:creationId xmlns:a16="http://schemas.microsoft.com/office/drawing/2014/main" id="{39F0D42D-15DF-4ED4-BF05-4AA440D940B1}"/>
               </a:ext>
             </a:extLst>
           </p:cNvPr>
@@ -18677,20 +20401,23 @@
         </p:nvSpPr>
         <p:spPr>
           <a:xfrm>
-            <a:off x="11405114" y="2347824"/>
-            <a:ext cx="358259" cy="85725"/>
-          </a:xfrm>
-          <a:prstGeom prst="flowChartTerminator">
-            <a:avLst/>
-          </a:prstGeom>
-          <a:solidFill>
-            <a:srgbClr val="A8135A"/>
-          </a:solidFill>
-          <a:ln>
+            <a:off x="3102475" y="2606485"/>
+            <a:ext cx="1850002" cy="752399"/>
+          </a:xfrm>
+          <a:prstGeom prst="rect">
+            <a:avLst/>
+          </a:prstGeom>
+          <a:noFill/>
+          <a:ln w="28575">
             <a:solidFill>
-              <a:schemeClr val="bg1"/>
+              <a:srgbClr val="A51258"/>
             </a:solidFill>
           </a:ln>
+          <a:effectLst>
+            <a:glow rad="50800">
+              <a:schemeClr val="tx1"/>
+            </a:glow>
+          </a:effectLst>
         </p:spPr>
         <p:style>
           <a:lnRef idx="2">
@@ -18713,396 +20440,93 @@
           <a:lstStyle/>
           <a:p>
             <a:pPr algn="ctr"/>
-            <a:endParaRPr lang="fr-FR"/>
-          </a:p>
-        </p:txBody>
-      </p:sp>
-      <p:sp>
-        <p:nvSpPr>
-          <p:cNvPr id="11" name="ZoneTexte 10">
-            <a:extLst>
-              <a:ext uri="{FF2B5EF4-FFF2-40B4-BE49-F238E27FC236}">
-                <a16:creationId xmlns:a16="http://schemas.microsoft.com/office/drawing/2014/main" id="{470680A5-31CA-4A5F-A91F-7E3BEF289E7E}"/>
-              </a:ext>
-            </a:extLst>
-          </p:cNvPr>
-          <p:cNvSpPr txBox="1"/>
-          <p:nvPr/>
-        </p:nvSpPr>
-        <p:spPr>
-          <a:xfrm>
-            <a:off x="10299143" y="558449"/>
-            <a:ext cx="1129785" cy="461665"/>
-          </a:xfrm>
-          <a:prstGeom prst="rect">
-            <a:avLst/>
-          </a:prstGeom>
-          <a:noFill/>
-        </p:spPr>
-        <p:txBody>
-          <a:bodyPr wrap="square" rtlCol="0">
-            <a:spAutoFit/>
-          </a:bodyPr>
-          <a:lstStyle/>
-          <a:p>
-            <a:pPr algn="r"/>
             <a:r>
               <a:rPr lang="fr-FR" sz="1200" dirty="0">
-                <a:latin typeface="Eras Medium ITC" panose="020B0602030504020804" pitchFamily="34" charset="0"/>
+                <a:solidFill>
+                  <a:srgbClr val="A51258"/>
+                </a:solidFill>
               </a:rPr>
-              <a:t>Présentation du projet</a:t>
-            </a:r>
-          </a:p>
-        </p:txBody>
-      </p:sp>
-      <p:sp>
-        <p:nvSpPr>
-          <p:cNvPr id="12" name="ZoneTexte 11">
-            <a:extLst>
-              <a:ext uri="{FF2B5EF4-FFF2-40B4-BE49-F238E27FC236}">
-                <a16:creationId xmlns:a16="http://schemas.microsoft.com/office/drawing/2014/main" id="{118F324A-9355-4439-8D28-46B0B893CC58}"/>
-              </a:ext>
-            </a:extLst>
-          </p:cNvPr>
-          <p:cNvSpPr txBox="1"/>
-          <p:nvPr/>
-        </p:nvSpPr>
-        <p:spPr>
-          <a:xfrm>
-            <a:off x="10275329" y="1418837"/>
-            <a:ext cx="1129785" cy="276999"/>
-          </a:xfrm>
-          <a:prstGeom prst="rect">
-            <a:avLst/>
-          </a:prstGeom>
-          <a:noFill/>
-        </p:spPr>
-        <p:txBody>
-          <a:bodyPr wrap="square" rtlCol="0">
-            <a:spAutoFit/>
-          </a:bodyPr>
-          <a:lstStyle/>
-          <a:p>
-            <a:pPr algn="r"/>
+              <a:t>« Logiciels libres </a:t>
+            </a:r>
             <a:r>
               <a:rPr lang="fr-FR" sz="1200" dirty="0">
-                <a:latin typeface="Eras Medium ITC" panose="020B0602030504020804" pitchFamily="34" charset="0"/>
+                <a:solidFill>
+                  <a:schemeClr val="tx1"/>
+                </a:solidFill>
               </a:rPr>
-              <a:t>Générale</a:t>
-            </a:r>
-          </a:p>
-        </p:txBody>
-      </p:sp>
-      <p:sp>
-        <p:nvSpPr>
-          <p:cNvPr id="13" name="ZoneTexte 12">
-            <a:extLst>
-              <a:ext uri="{FF2B5EF4-FFF2-40B4-BE49-F238E27FC236}">
-                <a16:creationId xmlns:a16="http://schemas.microsoft.com/office/drawing/2014/main" id="{B0B65B09-BAE9-45E1-8DDD-BE198E82EA10}"/>
-              </a:ext>
-            </a:extLst>
-          </p:cNvPr>
-          <p:cNvSpPr txBox="1"/>
-          <p:nvPr/>
-        </p:nvSpPr>
-        <p:spPr>
-          <a:xfrm>
-            <a:off x="10310812" y="2252186"/>
-            <a:ext cx="1129785" cy="276999"/>
-          </a:xfrm>
-          <a:prstGeom prst="rect">
-            <a:avLst/>
-          </a:prstGeom>
-          <a:noFill/>
-        </p:spPr>
-        <p:txBody>
-          <a:bodyPr wrap="square" rtlCol="0">
-            <a:spAutoFit/>
-          </a:bodyPr>
-          <a:lstStyle/>
-          <a:p>
-            <a:pPr algn="r"/>
+              <a:t>et</a:t>
+            </a:r>
             <a:r>
               <a:rPr lang="fr-FR" sz="1200" dirty="0">
-                <a:latin typeface="Eras Medium ITC" panose="020B0602030504020804" pitchFamily="34" charset="0"/>
+                <a:solidFill>
+                  <a:srgbClr val="A51258"/>
+                </a:solidFill>
               </a:rPr>
-              <a:t>Personnalisée</a:t>
-            </a:r>
-          </a:p>
-        </p:txBody>
-      </p:sp>
-      <p:sp>
-        <p:nvSpPr>
-          <p:cNvPr id="14" name="ZoneTexte 13">
-            <a:extLst>
-              <a:ext uri="{FF2B5EF4-FFF2-40B4-BE49-F238E27FC236}">
-                <a16:creationId xmlns:a16="http://schemas.microsoft.com/office/drawing/2014/main" id="{B5E860DF-2164-46BA-A256-EAAC919881DC}"/>
-              </a:ext>
-            </a:extLst>
-          </p:cNvPr>
-          <p:cNvSpPr txBox="1"/>
-          <p:nvPr/>
-        </p:nvSpPr>
-        <p:spPr>
-          <a:xfrm>
-            <a:off x="10113406" y="3241822"/>
-            <a:ext cx="1315522" cy="461665"/>
-          </a:xfrm>
-          <a:prstGeom prst="rect">
-            <a:avLst/>
-          </a:prstGeom>
-          <a:noFill/>
-        </p:spPr>
-        <p:txBody>
-          <a:bodyPr wrap="square" rtlCol="0">
-            <a:spAutoFit/>
-          </a:bodyPr>
-          <a:lstStyle/>
-          <a:p>
-            <a:pPr algn="r"/>
-            <a:r>
-              <a:rPr lang="fr-FR" sz="1200" dirty="0">
-                <a:latin typeface="Eras Medium ITC" panose="020B0602030504020804" pitchFamily="34" charset="0"/>
-              </a:rPr>
-              <a:t>Diagramme de cas d’utilisation</a:t>
-            </a:r>
-          </a:p>
-        </p:txBody>
-      </p:sp>
-      <p:sp>
-        <p:nvSpPr>
-          <p:cNvPr id="15" name="ZoneTexte 14">
-            <a:extLst>
-              <a:ext uri="{FF2B5EF4-FFF2-40B4-BE49-F238E27FC236}">
-                <a16:creationId xmlns:a16="http://schemas.microsoft.com/office/drawing/2014/main" id="{0E549171-6603-40D1-AACC-954D9ECD3358}"/>
-              </a:ext>
-            </a:extLst>
-          </p:cNvPr>
-          <p:cNvSpPr txBox="1"/>
-          <p:nvPr/>
-        </p:nvSpPr>
-        <p:spPr>
-          <a:xfrm>
-            <a:off x="10299143" y="5892329"/>
-            <a:ext cx="1129785" cy="461665"/>
-          </a:xfrm>
-          <a:prstGeom prst="rect">
-            <a:avLst/>
-          </a:prstGeom>
-          <a:noFill/>
-        </p:spPr>
-        <p:txBody>
-          <a:bodyPr wrap="square" rtlCol="0">
-            <a:spAutoFit/>
-          </a:bodyPr>
-          <a:lstStyle/>
-          <a:p>
-            <a:pPr algn="r"/>
-            <a:r>
-              <a:rPr lang="fr-FR" sz="1200" dirty="0">
-                <a:latin typeface="Eras Medium ITC" panose="020B0602030504020804" pitchFamily="34" charset="0"/>
-              </a:rPr>
-              <a:t>Les tâches personnelles</a:t>
-            </a:r>
-          </a:p>
-        </p:txBody>
-      </p:sp>
-      <p:sp>
-        <p:nvSpPr>
-          <p:cNvPr id="16" name="Rectangle 15">
-            <a:extLst>
-              <a:ext uri="{FF2B5EF4-FFF2-40B4-BE49-F238E27FC236}">
-                <a16:creationId xmlns:a16="http://schemas.microsoft.com/office/drawing/2014/main" id="{1D13FD37-1228-4A08-9F72-D32CBA322FEC}"/>
-              </a:ext>
-            </a:extLst>
-          </p:cNvPr>
-          <p:cNvSpPr/>
-          <p:nvPr/>
-        </p:nvSpPr>
-        <p:spPr>
-          <a:xfrm>
-            <a:off x="11658600" y="955383"/>
-            <a:ext cx="104773" cy="2245810"/>
-          </a:xfrm>
-          <a:prstGeom prst="rect">
-            <a:avLst/>
-          </a:prstGeom>
-          <a:solidFill>
-            <a:srgbClr val="A8135A"/>
-          </a:solidFill>
-          <a:ln>
+              <a:t> open source »</a:t>
+            </a:r>
+            <a:endParaRPr lang="fr-FR" sz="1200" dirty="0">
+              <a:solidFill>
+                <a:schemeClr val="tx1"/>
+              </a:solidFill>
+            </a:endParaRPr>
+          </a:p>
+        </p:txBody>
+      </p:sp>
+      <p:cxnSp>
+        <p:nvCxnSpPr>
+          <p:cNvPr id="18" name="Connecteur droit avec flèche 17">
+            <a:extLst>
+              <a:ext uri="{FF2B5EF4-FFF2-40B4-BE49-F238E27FC236}">
+                <a16:creationId xmlns:a16="http://schemas.microsoft.com/office/drawing/2014/main" id="{E2066C5F-E3BB-4FDC-8651-5E634143B6B2}"/>
+              </a:ext>
+            </a:extLst>
+          </p:cNvPr>
+          <p:cNvCxnSpPr>
+            <a:cxnSpLocks/>
+            <a:stCxn id="6" idx="2"/>
+            <a:endCxn id="15" idx="0"/>
+          </p:cNvCxnSpPr>
+          <p:nvPr/>
+        </p:nvCxnSpPr>
+        <p:spPr>
+          <a:xfrm>
+            <a:off x="4027476" y="2052402"/>
+            <a:ext cx="0" cy="554083"/>
+          </a:xfrm>
+          <a:prstGeom prst="straightConnector1">
+            <a:avLst/>
+          </a:prstGeom>
+          <a:ln w="38100">
             <a:solidFill>
-              <a:schemeClr val="bg1"/>
+              <a:srgbClr val="A51258"/>
             </a:solidFill>
+            <a:tailEnd type="triangle"/>
           </a:ln>
+          <a:effectLst>
+            <a:glow rad="50800">
+              <a:schemeClr val="tx1"/>
+            </a:glow>
+          </a:effectLst>
         </p:spPr>
         <p:style>
-          <a:lnRef idx="2">
-            <a:schemeClr val="accent1">
-              <a:shade val="50000"/>
-            </a:schemeClr>
+          <a:lnRef idx="1">
+            <a:schemeClr val="accent1"/>
           </a:lnRef>
-          <a:fillRef idx="1">
+          <a:fillRef idx="0">
             <a:schemeClr val="accent1"/>
           </a:fillRef>
           <a:effectRef idx="0">
             <a:schemeClr val="accent1"/>
           </a:effectRef>
           <a:fontRef idx="minor">
-            <a:schemeClr val="lt1"/>
+            <a:schemeClr val="tx1"/>
           </a:fontRef>
         </p:style>
-        <p:txBody>
-          <a:bodyPr rtlCol="0" anchor="ctr"/>
-          <a:lstStyle/>
-          <a:p>
-            <a:pPr algn="ctr"/>
-            <a:endParaRPr lang="fr-FR"/>
-          </a:p>
-        </p:txBody>
-      </p:sp>
-      <p:sp>
-        <p:nvSpPr>
-          <p:cNvPr id="17" name="Ellipse 16">
-            <a:extLst>
-              <a:ext uri="{FF2B5EF4-FFF2-40B4-BE49-F238E27FC236}">
-                <a16:creationId xmlns:a16="http://schemas.microsoft.com/office/drawing/2014/main" id="{9F704096-5C9D-41FD-B6A4-68CA21735651}"/>
-              </a:ext>
-            </a:extLst>
-          </p:cNvPr>
-          <p:cNvSpPr/>
-          <p:nvPr/>
-        </p:nvSpPr>
-        <p:spPr>
-          <a:xfrm>
-            <a:off x="11428928" y="550687"/>
-            <a:ext cx="564118" cy="542925"/>
-          </a:xfrm>
-          <a:prstGeom prst="ellipse">
-            <a:avLst/>
-          </a:prstGeom>
-          <a:solidFill>
-            <a:srgbClr val="A8135A"/>
-          </a:solidFill>
-          <a:ln>
-            <a:solidFill>
-              <a:schemeClr val="bg1"/>
-            </a:solidFill>
-          </a:ln>
-        </p:spPr>
-        <p:style>
-          <a:lnRef idx="2">
-            <a:schemeClr val="accent1">
-              <a:shade val="50000"/>
-            </a:schemeClr>
-          </a:lnRef>
-          <a:fillRef idx="1">
-            <a:schemeClr val="accent1"/>
-          </a:fillRef>
-          <a:effectRef idx="0">
-            <a:schemeClr val="accent1"/>
-          </a:effectRef>
-          <a:fontRef idx="minor">
-            <a:schemeClr val="lt1"/>
-          </a:fontRef>
-        </p:style>
-        <p:txBody>
-          <a:bodyPr rtlCol="0" anchor="ctr"/>
-          <a:lstStyle/>
-          <a:p>
-            <a:pPr algn="ctr"/>
-            <a:endParaRPr lang="fr-FR"/>
-          </a:p>
-        </p:txBody>
-      </p:sp>
-      <p:sp>
-        <p:nvSpPr>
-          <p:cNvPr id="8" name="Ellipse 7">
-            <a:extLst>
-              <a:ext uri="{FF2B5EF4-FFF2-40B4-BE49-F238E27FC236}">
-                <a16:creationId xmlns:a16="http://schemas.microsoft.com/office/drawing/2014/main" id="{527A32BE-E971-4F22-BE27-E8B13A47BF8B}"/>
-              </a:ext>
-            </a:extLst>
-          </p:cNvPr>
-          <p:cNvSpPr/>
-          <p:nvPr/>
-        </p:nvSpPr>
-        <p:spPr>
-          <a:xfrm>
-            <a:off x="11428928" y="3201193"/>
-            <a:ext cx="564118" cy="542925"/>
-          </a:xfrm>
-          <a:prstGeom prst="ellipse">
-            <a:avLst/>
-          </a:prstGeom>
-          <a:solidFill>
-            <a:srgbClr val="A8135A"/>
-          </a:solidFill>
-          <a:ln>
-            <a:solidFill>
-              <a:schemeClr val="bg1"/>
-            </a:solidFill>
-          </a:ln>
-        </p:spPr>
-        <p:style>
-          <a:lnRef idx="2">
-            <a:schemeClr val="accent1">
-              <a:shade val="50000"/>
-            </a:schemeClr>
-          </a:lnRef>
-          <a:fillRef idx="1">
-            <a:schemeClr val="accent1"/>
-          </a:fillRef>
-          <a:effectRef idx="0">
-            <a:schemeClr val="accent1"/>
-          </a:effectRef>
-          <a:fontRef idx="minor">
-            <a:schemeClr val="lt1"/>
-          </a:fontRef>
-        </p:style>
-        <p:txBody>
-          <a:bodyPr rtlCol="0" anchor="ctr"/>
-          <a:lstStyle/>
-          <a:p>
-            <a:pPr algn="ctr"/>
-            <a:endParaRPr lang="fr-FR"/>
-          </a:p>
-        </p:txBody>
-      </p:sp>
-      <p:pic>
-        <p:nvPicPr>
-          <p:cNvPr id="20" name="Image 19" descr="Une image contenant ordinateur&#10;&#10;Description générée automatiquement">
-            <a:extLst>
-              <a:ext uri="{FF2B5EF4-FFF2-40B4-BE49-F238E27FC236}">
-                <a16:creationId xmlns:a16="http://schemas.microsoft.com/office/drawing/2014/main" id="{2CECDA03-D18F-459D-A3E6-1C306067CAC0}"/>
-              </a:ext>
-            </a:extLst>
-          </p:cNvPr>
-          <p:cNvPicPr>
-            <a:picLocks noChangeAspect="1"/>
-          </p:cNvPicPr>
-          <p:nvPr/>
-        </p:nvPicPr>
-        <p:blipFill>
-          <a:blip r:embed="rId3"/>
-          <a:stretch>
-            <a:fillRect/>
-          </a:stretch>
-        </p:blipFill>
-        <p:spPr>
-          <a:xfrm>
-            <a:off x="1729603" y="859862"/>
-            <a:ext cx="6717629" cy="5998138"/>
-          </a:xfrm>
-          <a:prstGeom prst="rect">
-            <a:avLst/>
-          </a:prstGeom>
-        </p:spPr>
-      </p:pic>
+      </p:cxnSp>
     </p:spTree>
     <p:extLst>
       <p:ext uri="{BB962C8B-B14F-4D97-AF65-F5344CB8AC3E}">
-        <p14:creationId xmlns:p14="http://schemas.microsoft.com/office/powerpoint/2010/main" val="3484094220"/>
+        <p14:creationId xmlns:p14="http://schemas.microsoft.com/office/powerpoint/2010/main" val="3952120001"/>
       </p:ext>
     </p:extLst>
   </p:cSld>
@@ -19217,21 +20641,8 @@
             <a:pPr algn="ctr"/>
             <a:r>
               <a:rPr lang="fr-FR" sz="3600" b="1" dirty="0">
-                <a:effectLst>
-                  <a:outerShdw blurRad="38100" dist="38100" dir="2700000" algn="tl">
-                    <a:srgbClr val="000000">
-                      <a:alpha val="43137"/>
-                    </a:srgbClr>
-                  </a:outerShdw>
-                </a:effectLst>
-                <a:latin typeface="Eras Medium ITC" panose="020B0602030504020804" pitchFamily="34" charset="0"/>
-              </a:rPr>
-              <a:t>Diagramme de cas </a:t>
-            </a:r>
-            <a:r>
-              <a:rPr lang="fr-FR" sz="3600" b="1" dirty="0">
                 <a:solidFill>
-                  <a:srgbClr val="A31257"/>
+                  <a:srgbClr val="A51258"/>
                 </a:solidFill>
                 <a:effectLst>
                   <a:outerShdw blurRad="38100" dist="38100" dir="2700000" algn="tl">
@@ -19242,53 +20653,24 @@
                 </a:effectLst>
                 <a:latin typeface="Eras Medium ITC" panose="020B0602030504020804" pitchFamily="34" charset="0"/>
               </a:rPr>
-              <a:t>d’utilisation</a:t>
-            </a:r>
-            <a:r>
-              <a:rPr lang="fr-FR" sz="3600" b="1" dirty="0">
-                <a:effectLst>
-                  <a:outerShdw blurRad="38100" dist="38100" dir="2700000" algn="tl">
-                    <a:srgbClr val="000000">
-                      <a:alpha val="43137"/>
-                    </a:srgbClr>
-                  </a:outerShdw>
-                </a:effectLst>
-                <a:latin typeface="Eras Medium ITC" panose="020B0602030504020804" pitchFamily="34" charset="0"/>
-              </a:rPr>
-              <a:t>  </a:t>
-            </a:r>
-          </a:p>
-        </p:txBody>
-      </p:sp>
-      <p:pic>
-        <p:nvPicPr>
-          <p:cNvPr id="5" name="Image 4" descr="Une image contenant texte, carte, capture d’écran&#10;&#10;Description générée automatiquement">
-            <a:extLst>
-              <a:ext uri="{FF2B5EF4-FFF2-40B4-BE49-F238E27FC236}">
-                <a16:creationId xmlns:a16="http://schemas.microsoft.com/office/drawing/2014/main" id="{F3CC10DC-37D4-43BE-BB94-2AA6BA44EF0A}"/>
-              </a:ext>
-            </a:extLst>
-          </p:cNvPr>
-          <p:cNvPicPr>
-            <a:picLocks noChangeAspect="1"/>
-          </p:cNvPicPr>
-          <p:nvPr/>
-        </p:nvPicPr>
-        <p:blipFill rotWithShape="1">
-          <a:blip r:embed="rId3"/>
-          <a:srcRect l="1206" t="3761" r="2523" b="2393"/>
-          <a:stretch/>
-        </p:blipFill>
-        <p:spPr>
-          <a:xfrm>
-            <a:off x="2796424" y="1022694"/>
-            <a:ext cx="4798345" cy="5405538"/>
-          </a:xfrm>
-          <a:prstGeom prst="rect">
-            <a:avLst/>
-          </a:prstGeom>
-        </p:spPr>
-      </p:pic>
+              <a:t>Câblage</a:t>
+            </a:r>
+            <a:endParaRPr lang="fr-FR" sz="2800" b="1" dirty="0">
+              <a:solidFill>
+                <a:srgbClr val="A51258"/>
+              </a:solidFill>
+              <a:effectLst>
+                <a:outerShdw blurRad="38100" dist="38100" dir="2700000" algn="tl">
+                  <a:srgbClr val="000000">
+                    <a:alpha val="43137"/>
+                  </a:srgbClr>
+                </a:outerShdw>
+              </a:effectLst>
+              <a:latin typeface="Eras Medium ITC" panose="020B0602030504020804" pitchFamily="34" charset="0"/>
+            </a:endParaRPr>
+          </a:p>
+        </p:txBody>
+      </p:sp>
       <p:sp>
         <p:nvSpPr>
           <p:cNvPr id="6" name="Organigramme : Terminateur 5">
@@ -19857,10 +21239,40 @@
           </a:p>
         </p:txBody>
       </p:sp>
+      <p:pic>
+        <p:nvPicPr>
+          <p:cNvPr id="20" name="Image 19" descr="Une image contenant ordinateur&#10;&#10;Description générée automatiquement">
+            <a:extLst>
+              <a:ext uri="{FF2B5EF4-FFF2-40B4-BE49-F238E27FC236}">
+                <a16:creationId xmlns:a16="http://schemas.microsoft.com/office/drawing/2014/main" id="{2CECDA03-D18F-459D-A3E6-1C306067CAC0}"/>
+              </a:ext>
+            </a:extLst>
+          </p:cNvPr>
+          <p:cNvPicPr>
+            <a:picLocks noChangeAspect="1"/>
+          </p:cNvPicPr>
+          <p:nvPr/>
+        </p:nvPicPr>
+        <p:blipFill>
+          <a:blip r:embed="rId3"/>
+          <a:stretch>
+            <a:fillRect/>
+          </a:stretch>
+        </p:blipFill>
+        <p:spPr>
+          <a:xfrm>
+            <a:off x="1729603" y="859862"/>
+            <a:ext cx="6717629" cy="5998138"/>
+          </a:xfrm>
+          <a:prstGeom prst="rect">
+            <a:avLst/>
+          </a:prstGeom>
+        </p:spPr>
+      </p:pic>
     </p:spTree>
     <p:extLst>
       <p:ext uri="{BB962C8B-B14F-4D97-AF65-F5344CB8AC3E}">
-        <p14:creationId xmlns:p14="http://schemas.microsoft.com/office/powerpoint/2010/main" val="1377170629"/>
+        <p14:creationId xmlns:p14="http://schemas.microsoft.com/office/powerpoint/2010/main" val="3484094220"/>
       </p:ext>
     </p:extLst>
   </p:cSld>

</xml_diff>